<commit_message>
Update figures for simulation due to addition of 'v26, S003b'
</commit_message>
<xml_diff>
--- a/report/RO-MAN/figures/ROMAN-figures.pptx
+++ b/report/RO-MAN/figures/ROMAN-figures.pptx
@@ -10,7 +10,7 @@
   <p:sldIdLst>
     <p:sldId id="259" r:id="rId2"/>
     <p:sldId id="258" r:id="rId3"/>
-    <p:sldId id="260" r:id="rId4"/>
+    <p:sldId id="262" r:id="rId4"/>
     <p:sldId id="256" r:id="rId5"/>
     <p:sldId id="257" r:id="rId6"/>
     <p:sldId id="261" r:id="rId7"/>
@@ -213,7 +213,7 @@
           <a:p>
             <a:fld id="{3F89A295-6F9E-4D51-AE54-61E02A4CE380}" type="datetimeFigureOut">
               <a:rPr lang="en-US" smtClean="0"/>
-              <a:t>3/8/2020</a:t>
+              <a:t>3/9/2020</a:t>
             </a:fld>
             <a:endParaRPr lang="en-US"/>
           </a:p>
@@ -848,7 +848,7 @@
     </p:spTree>
     <p:extLst>
       <p:ext uri="{BB962C8B-B14F-4D97-AF65-F5344CB8AC3E}">
-        <p14:creationId xmlns:p14="http://schemas.microsoft.com/office/powerpoint/2010/main" val="3660685847"/>
+        <p14:creationId xmlns:p14="http://schemas.microsoft.com/office/powerpoint/2010/main" val="117914431"/>
       </p:ext>
     </p:extLst>
   </p:cSld>
@@ -1375,7 +1375,7 @@
           <a:p>
             <a:fld id="{F4E53FB3-0E6D-400E-94D0-294D549E0F65}" type="datetimeFigureOut">
               <a:rPr lang="en-US" smtClean="0"/>
-              <a:t>3/8/2020</a:t>
+              <a:t>3/9/2020</a:t>
             </a:fld>
             <a:endParaRPr lang="en-US"/>
           </a:p>
@@ -1573,7 +1573,7 @@
           <a:p>
             <a:fld id="{F4E53FB3-0E6D-400E-94D0-294D549E0F65}" type="datetimeFigureOut">
               <a:rPr lang="en-US" smtClean="0"/>
-              <a:t>3/8/2020</a:t>
+              <a:t>3/9/2020</a:t>
             </a:fld>
             <a:endParaRPr lang="en-US"/>
           </a:p>
@@ -1781,7 +1781,7 @@
           <a:p>
             <a:fld id="{F4E53FB3-0E6D-400E-94D0-294D549E0F65}" type="datetimeFigureOut">
               <a:rPr lang="en-US" smtClean="0"/>
-              <a:t>3/8/2020</a:t>
+              <a:t>3/9/2020</a:t>
             </a:fld>
             <a:endParaRPr lang="en-US"/>
           </a:p>
@@ -1979,7 +1979,7 @@
           <a:p>
             <a:fld id="{F4E53FB3-0E6D-400E-94D0-294D549E0F65}" type="datetimeFigureOut">
               <a:rPr lang="en-US" smtClean="0"/>
-              <a:t>3/8/2020</a:t>
+              <a:t>3/9/2020</a:t>
             </a:fld>
             <a:endParaRPr lang="en-US"/>
           </a:p>
@@ -2254,7 +2254,7 @@
           <a:p>
             <a:fld id="{F4E53FB3-0E6D-400E-94D0-294D549E0F65}" type="datetimeFigureOut">
               <a:rPr lang="en-US" smtClean="0"/>
-              <a:t>3/8/2020</a:t>
+              <a:t>3/9/2020</a:t>
             </a:fld>
             <a:endParaRPr lang="en-US"/>
           </a:p>
@@ -2519,7 +2519,7 @@
           <a:p>
             <a:fld id="{F4E53FB3-0E6D-400E-94D0-294D549E0F65}" type="datetimeFigureOut">
               <a:rPr lang="en-US" smtClean="0"/>
-              <a:t>3/8/2020</a:t>
+              <a:t>3/9/2020</a:t>
             </a:fld>
             <a:endParaRPr lang="en-US"/>
           </a:p>
@@ -2931,7 +2931,7 @@
           <a:p>
             <a:fld id="{F4E53FB3-0E6D-400E-94D0-294D549E0F65}" type="datetimeFigureOut">
               <a:rPr lang="en-US" smtClean="0"/>
-              <a:t>3/8/2020</a:t>
+              <a:t>3/9/2020</a:t>
             </a:fld>
             <a:endParaRPr lang="en-US"/>
           </a:p>
@@ -3072,7 +3072,7 @@
           <a:p>
             <a:fld id="{F4E53FB3-0E6D-400E-94D0-294D549E0F65}" type="datetimeFigureOut">
               <a:rPr lang="en-US" smtClean="0"/>
-              <a:t>3/8/2020</a:t>
+              <a:t>3/9/2020</a:t>
             </a:fld>
             <a:endParaRPr lang="en-US"/>
           </a:p>
@@ -3185,7 +3185,7 @@
           <a:p>
             <a:fld id="{F4E53FB3-0E6D-400E-94D0-294D549E0F65}" type="datetimeFigureOut">
               <a:rPr lang="en-US" smtClean="0"/>
-              <a:t>3/8/2020</a:t>
+              <a:t>3/9/2020</a:t>
             </a:fld>
             <a:endParaRPr lang="en-US"/>
           </a:p>
@@ -3496,7 +3496,7 @@
           <a:p>
             <a:fld id="{F4E53FB3-0E6D-400E-94D0-294D549E0F65}" type="datetimeFigureOut">
               <a:rPr lang="en-US" smtClean="0"/>
-              <a:t>3/8/2020</a:t>
+              <a:t>3/9/2020</a:t>
             </a:fld>
             <a:endParaRPr lang="en-US"/>
           </a:p>
@@ -3784,7 +3784,7 @@
           <a:p>
             <a:fld id="{F4E53FB3-0E6D-400E-94D0-294D549E0F65}" type="datetimeFigureOut">
               <a:rPr lang="en-US" smtClean="0"/>
-              <a:t>3/8/2020</a:t>
+              <a:t>3/9/2020</a:t>
             </a:fld>
             <a:endParaRPr lang="en-US"/>
           </a:p>
@@ -4025,7 +4025,7 @@
           <a:p>
             <a:fld id="{F4E53FB3-0E6D-400E-94D0-294D549E0F65}" type="datetimeFigureOut">
               <a:rPr lang="en-US" smtClean="0"/>
-              <a:t>3/8/2020</a:t>
+              <a:t>3/9/2020</a:t>
             </a:fld>
             <a:endParaRPr lang="en-US"/>
           </a:p>
@@ -4444,10 +4444,10 @@
       </p:grpSpPr>
       <p:pic>
         <p:nvPicPr>
-          <p:cNvPr id="3" name="Picture 2" descr="A picture containing colorful, flying, kite&#10;&#10;Description automatically generated">
-            <a:extLst>
-              <a:ext uri="{FF2B5EF4-FFF2-40B4-BE49-F238E27FC236}">
-                <a16:creationId xmlns:a16="http://schemas.microsoft.com/office/drawing/2014/main" id="{6CD345BD-1AB5-4D65-869F-140DA48208F9}"/>
+          <p:cNvPr id="4" name="Picture 3" descr="A close up of a colorful background&#10;&#10;Description automatically generated">
+            <a:extLst>
+              <a:ext uri="{FF2B5EF4-FFF2-40B4-BE49-F238E27FC236}">
+                <a16:creationId xmlns:a16="http://schemas.microsoft.com/office/drawing/2014/main" id="{32F31F15-2913-4F10-BCB0-4B4A4F593504}"/>
               </a:ext>
             </a:extLst>
           </p:cNvPr>
@@ -4470,8 +4470,8 @@
         </p:blipFill>
         <p:spPr>
           <a:xfrm>
-            <a:off x="1524001" y="0"/>
-            <a:ext cx="9133489" cy="6850117"/>
+            <a:off x="2213310" y="197529"/>
+            <a:ext cx="8689151" cy="6516863"/>
           </a:xfrm>
           <a:prstGeom prst="rect">
             <a:avLst/>
@@ -4510,10 +4510,10 @@
       </p:grpSpPr>
       <p:grpSp>
         <p:nvGrpSpPr>
-          <p:cNvPr id="2" name="Group 1">
-            <a:extLst>
-              <a:ext uri="{FF2B5EF4-FFF2-40B4-BE49-F238E27FC236}">
-                <a16:creationId xmlns:a16="http://schemas.microsoft.com/office/drawing/2014/main" id="{B288FEDF-7A69-4BDF-9A4E-3A03318C0EBC}"/>
+          <p:cNvPr id="7" name="Group 6">
+            <a:extLst>
+              <a:ext uri="{FF2B5EF4-FFF2-40B4-BE49-F238E27FC236}">
+                <a16:creationId xmlns:a16="http://schemas.microsoft.com/office/drawing/2014/main" id="{EB01FF39-776C-4784-B547-5082A73DFB57}"/>
               </a:ext>
             </a:extLst>
           </p:cNvPr>
@@ -4522,18 +4522,18 @@
         </p:nvGrpSpPr>
         <p:grpSpPr>
           <a:xfrm>
-            <a:off x="1108363" y="0"/>
-            <a:ext cx="9975274" cy="6858000"/>
-            <a:chOff x="1108363" y="0"/>
-            <a:chExt cx="9975274" cy="6858000"/>
+            <a:off x="1323215" y="0"/>
+            <a:ext cx="9179809" cy="6858000"/>
+            <a:chOff x="1323215" y="0"/>
+            <a:chExt cx="9179809" cy="6858000"/>
           </a:xfrm>
         </p:grpSpPr>
         <p:pic>
           <p:nvPicPr>
-            <p:cNvPr id="25" name="Picture 24" descr="A screenshot of a cell phone&#10;&#10;Description automatically generated">
+            <p:cNvPr id="4" name="Picture 3" descr="A screenshot of a cell phone&#10;&#10;Description automatically generated">
               <a:extLst>
                 <a:ext uri="{FF2B5EF4-FFF2-40B4-BE49-F238E27FC236}">
-                  <a16:creationId xmlns:a16="http://schemas.microsoft.com/office/drawing/2014/main" id="{15450889-A2BF-47CA-8A2C-20FAECF5C261}"/>
+                  <a16:creationId xmlns:a16="http://schemas.microsoft.com/office/drawing/2014/main" id="{2A9A48B9-2921-409D-8186-55DA405F9ECA}"/>
                 </a:ext>
               </a:extLst>
             </p:cNvPr>
@@ -4556,7 +4556,7 @@
           </p:blipFill>
           <p:spPr>
             <a:xfrm>
-              <a:off x="1108363" y="0"/>
+              <a:off x="1323215" y="0"/>
               <a:ext cx="4987637" cy="6858000"/>
             </a:xfrm>
             <a:prstGeom prst="rect">
@@ -4566,10 +4566,10 @@
         </p:pic>
         <p:pic>
           <p:nvPicPr>
-            <p:cNvPr id="27" name="Picture 26" descr="A close up of a logo&#10;&#10;Description automatically generated">
+            <p:cNvPr id="6" name="Picture 5" descr="A close up of a logo&#10;&#10;Description automatically generated">
               <a:extLst>
                 <a:ext uri="{FF2B5EF4-FFF2-40B4-BE49-F238E27FC236}">
-                  <a16:creationId xmlns:a16="http://schemas.microsoft.com/office/drawing/2014/main" id="{03AD3D24-EE60-4FC6-AF2E-6BAF9D9F4947}"/>
+                  <a16:creationId xmlns:a16="http://schemas.microsoft.com/office/drawing/2014/main" id="{A750D2B8-2475-4371-8DED-CF14279BDAC5}"/>
                 </a:ext>
               </a:extLst>
             </p:cNvPr>
@@ -4592,7 +4592,7 @@
           </p:blipFill>
           <p:spPr>
             <a:xfrm>
-              <a:off x="6096000" y="0"/>
+              <a:off x="5515387" y="0"/>
               <a:ext cx="4987637" cy="6858000"/>
             </a:xfrm>
             <a:prstGeom prst="rect">
@@ -4631,576 +4631,620 @@
           <a:chExt cx="0" cy="0"/>
         </a:xfrm>
       </p:grpSpPr>
-      <p:grpSp>
-        <p:nvGrpSpPr>
-          <p:cNvPr id="2" name="Group 1">
-            <a:extLst>
-              <a:ext uri="{FF2B5EF4-FFF2-40B4-BE49-F238E27FC236}">
-                <a16:creationId xmlns:a16="http://schemas.microsoft.com/office/drawing/2014/main" id="{AF69083D-8D84-4739-B077-3DDE12980A52}"/>
-              </a:ext>
-            </a:extLst>
-          </p:cNvPr>
-          <p:cNvGrpSpPr/>
+      <p:sp>
+        <p:nvSpPr>
+          <p:cNvPr id="4" name="TextBox 3">
+            <a:extLst>
+              <a:ext uri="{FF2B5EF4-FFF2-40B4-BE49-F238E27FC236}">
+                <a16:creationId xmlns:a16="http://schemas.microsoft.com/office/drawing/2014/main" id="{84701484-AC52-4013-A26D-C932C1EF0C35}"/>
+              </a:ext>
+            </a:extLst>
+          </p:cNvPr>
+          <p:cNvSpPr txBox="1"/>
           <p:nvPr/>
-        </p:nvGrpSpPr>
-        <p:grpSpPr>
+        </p:nvSpPr>
+        <p:spPr>
           <a:xfrm>
-            <a:off x="3123798" y="30704"/>
-            <a:ext cx="9269841" cy="6827297"/>
-            <a:chOff x="3123798" y="30704"/>
-            <a:chExt cx="9269841" cy="6827297"/>
+            <a:off x="9829911" y="1869999"/>
+            <a:ext cx="2563728" cy="830997"/>
           </a:xfrm>
-        </p:grpSpPr>
-        <p:sp>
-          <p:nvSpPr>
-            <p:cNvPr id="4" name="TextBox 3">
-              <a:extLst>
-                <a:ext uri="{FF2B5EF4-FFF2-40B4-BE49-F238E27FC236}">
-                  <a16:creationId xmlns:a16="http://schemas.microsoft.com/office/drawing/2014/main" id="{84701484-AC52-4013-A26D-C932C1EF0C35}"/>
-                </a:ext>
-              </a:extLst>
-            </p:cNvPr>
-            <p:cNvSpPr txBox="1"/>
-            <p:nvPr/>
-          </p:nvSpPr>
-          <p:spPr>
-            <a:xfrm>
-              <a:off x="9829911" y="1869999"/>
-              <a:ext cx="2563728" cy="830997"/>
-            </a:xfrm>
-            <a:prstGeom prst="rect">
-              <a:avLst/>
-            </a:prstGeom>
-            <a:noFill/>
-          </p:spPr>
-          <p:txBody>
-            <a:bodyPr wrap="square" rtlCol="0">
-              <a:spAutoFit/>
-            </a:bodyPr>
-            <a:lstStyle/>
-            <a:p>
-              <a:r>
-                <a:rPr lang="en-US" sz="2400" dirty="0"/>
-                <a:t>Rank by</a:t>
-              </a:r>
-            </a:p>
-            <a:p>
-              <a:r>
-                <a:rPr lang="en-US" sz="2400" dirty="0"/>
-                <a:t>Preference</a:t>
-              </a:r>
-            </a:p>
-          </p:txBody>
-        </p:sp>
-        <p:grpSp>
-          <p:nvGrpSpPr>
-            <p:cNvPr id="22" name="Group 21">
-              <a:extLst>
-                <a:ext uri="{FF2B5EF4-FFF2-40B4-BE49-F238E27FC236}">
-                  <a16:creationId xmlns:a16="http://schemas.microsoft.com/office/drawing/2014/main" id="{F240EDB1-05CB-4434-9E93-88E58239E97D}"/>
-                </a:ext>
-              </a:extLst>
-            </p:cNvPr>
-            <p:cNvGrpSpPr/>
-            <p:nvPr/>
-          </p:nvGrpSpPr>
-          <p:grpSpPr>
-            <a:xfrm>
-              <a:off x="3123798" y="30704"/>
-              <a:ext cx="7834935" cy="6827297"/>
-              <a:chOff x="3123798" y="30704"/>
-              <a:chExt cx="7834935" cy="6827297"/>
-            </a:xfrm>
-          </p:grpSpPr>
-          <p:pic>
-            <p:nvPicPr>
-              <p:cNvPr id="25" name="Picture 24" descr="A screenshot of a cell phone&#10;&#10;Description automatically generated">
-                <a:extLst>
-                  <a:ext uri="{FF2B5EF4-FFF2-40B4-BE49-F238E27FC236}">
-                    <a16:creationId xmlns:a16="http://schemas.microsoft.com/office/drawing/2014/main" id="{15450889-A2BF-47CA-8A2C-20FAECF5C261}"/>
-                  </a:ext>
-                </a:extLst>
-              </p:cNvPr>
-              <p:cNvPicPr>
-                <a:picLocks noChangeAspect="1"/>
-              </p:cNvPicPr>
-              <p:nvPr/>
-            </p:nvPicPr>
-            <p:blipFill rotWithShape="1">
-              <a:blip r:embed="rId3">
-                <a:extLst>
-                  <a:ext uri="{28A0092B-C50C-407E-A947-70E740481C1C}">
-                    <a14:useLocalDpi xmlns:a14="http://schemas.microsoft.com/office/drawing/2010/main" val="0"/>
-                  </a:ext>
-                </a:extLst>
-              </a:blip>
-              <a:srcRect l="9627" r="31966"/>
-              <a:stretch/>
-            </p:blipFill>
-            <p:spPr>
-              <a:xfrm>
-                <a:off x="4041697" y="492369"/>
-                <a:ext cx="2703984" cy="6365631"/>
-              </a:xfrm>
-              <a:prstGeom prst="rect">
-                <a:avLst/>
-              </a:prstGeom>
-            </p:spPr>
-          </p:pic>
-          <p:pic>
-            <p:nvPicPr>
-              <p:cNvPr id="27" name="Picture 26" descr="A close up of a logo&#10;&#10;Description automatically generated">
-                <a:extLst>
-                  <a:ext uri="{FF2B5EF4-FFF2-40B4-BE49-F238E27FC236}">
-                    <a16:creationId xmlns:a16="http://schemas.microsoft.com/office/drawing/2014/main" id="{03AD3D24-EE60-4FC6-AF2E-6BAF9D9F4947}"/>
-                  </a:ext>
-                </a:extLst>
-              </p:cNvPr>
-              <p:cNvPicPr>
-                <a:picLocks noChangeAspect="1"/>
-              </p:cNvPicPr>
-              <p:nvPr/>
-            </p:nvPicPr>
-            <p:blipFill rotWithShape="1">
-              <a:blip r:embed="rId4">
-                <a:extLst>
-                  <a:ext uri="{28A0092B-C50C-407E-A947-70E740481C1C}">
-                    <a14:useLocalDpi xmlns:a14="http://schemas.microsoft.com/office/drawing/2010/main" val="0"/>
-                  </a:ext>
-                </a:extLst>
-              </a:blip>
-              <a:srcRect l="8513" r="27044"/>
-              <a:stretch/>
-            </p:blipFill>
-            <p:spPr>
-              <a:xfrm>
-                <a:off x="6693458" y="492369"/>
-                <a:ext cx="2983411" cy="6365632"/>
-              </a:xfrm>
-              <a:prstGeom prst="rect">
-                <a:avLst/>
-              </a:prstGeom>
-            </p:spPr>
-          </p:pic>
-          <p:pic>
-            <p:nvPicPr>
-              <p:cNvPr id="5" name="Picture 4" descr="A close up of a logo&#10;&#10;Description automatically generated">
-                <a:extLst>
-                  <a:ext uri="{FF2B5EF4-FFF2-40B4-BE49-F238E27FC236}">
-                    <a16:creationId xmlns:a16="http://schemas.microsoft.com/office/drawing/2014/main" id="{9D32934A-3112-49B1-A9F0-E13A7327878D}"/>
-                  </a:ext>
-                </a:extLst>
-              </p:cNvPr>
-              <p:cNvPicPr>
-                <a:picLocks noChangeAspect="1"/>
-              </p:cNvPicPr>
-              <p:nvPr/>
-            </p:nvPicPr>
-            <p:blipFill rotWithShape="1">
-              <a:blip r:embed="rId4">
-                <a:extLst>
-                  <a:ext uri="{28A0092B-C50C-407E-A947-70E740481C1C}">
-                    <a14:useLocalDpi xmlns:a14="http://schemas.microsoft.com/office/drawing/2010/main" val="0"/>
-                  </a:ext>
-                </a:extLst>
-              </a:blip>
-              <a:srcRect l="73004" t="42701" r="17406" b="41504"/>
-              <a:stretch/>
-            </p:blipFill>
-            <p:spPr>
-              <a:xfrm>
-                <a:off x="9676869" y="2700996"/>
-                <a:ext cx="1281864" cy="2903050"/>
-              </a:xfrm>
-              <a:prstGeom prst="rect">
-                <a:avLst/>
-              </a:prstGeom>
-            </p:spPr>
-          </p:pic>
-          <p:sp>
-            <p:nvSpPr>
-              <p:cNvPr id="8" name="TextBox 7">
-                <a:extLst>
-                  <a:ext uri="{FF2B5EF4-FFF2-40B4-BE49-F238E27FC236}">
-                    <a16:creationId xmlns:a16="http://schemas.microsoft.com/office/drawing/2014/main" id="{2C7F735B-B575-44A3-9447-25DB41E4994B}"/>
-                  </a:ext>
-                </a:extLst>
-              </p:cNvPr>
-              <p:cNvSpPr txBox="1"/>
-              <p:nvPr/>
-            </p:nvSpPr>
-            <p:spPr>
-              <a:xfrm>
-                <a:off x="4486113" y="30704"/>
-                <a:ext cx="2106526" cy="461665"/>
-              </a:xfrm>
-              <a:prstGeom prst="rect">
-                <a:avLst/>
-              </a:prstGeom>
-              <a:noFill/>
-            </p:spPr>
-            <p:txBody>
-              <a:bodyPr wrap="square" rtlCol="0">
-                <a:spAutoFit/>
-              </a:bodyPr>
-              <a:lstStyle/>
-              <a:p>
-                <a:r>
-                  <a:rPr lang="en-US" sz="2400" dirty="0"/>
-                  <a:t>Ground-Truth</a:t>
-                </a:r>
-              </a:p>
-            </p:txBody>
-          </p:sp>
-          <p:sp>
-            <p:nvSpPr>
-              <p:cNvPr id="9" name="TextBox 8">
-                <a:extLst>
-                  <a:ext uri="{FF2B5EF4-FFF2-40B4-BE49-F238E27FC236}">
-                    <a16:creationId xmlns:a16="http://schemas.microsoft.com/office/drawing/2014/main" id="{2152F5F1-08CE-4CF2-ABC0-476F5618666B}"/>
-                  </a:ext>
-                </a:extLst>
-              </p:cNvPr>
-              <p:cNvSpPr txBox="1"/>
-              <p:nvPr/>
-            </p:nvSpPr>
-            <p:spPr>
-              <a:xfrm>
-                <a:off x="7158012" y="30704"/>
-                <a:ext cx="2106526" cy="461665"/>
-              </a:xfrm>
-              <a:prstGeom prst="rect">
-                <a:avLst/>
-              </a:prstGeom>
-              <a:noFill/>
-            </p:spPr>
-            <p:txBody>
-              <a:bodyPr wrap="square" rtlCol="0">
-                <a:spAutoFit/>
-              </a:bodyPr>
-              <a:lstStyle/>
-              <a:p>
-                <a:r>
-                  <a:rPr lang="en-US" sz="2400" dirty="0"/>
-                  <a:t>Reconstructed</a:t>
-                </a:r>
-              </a:p>
-            </p:txBody>
-          </p:sp>
-          <p:cxnSp>
-            <p:nvCxnSpPr>
-              <p:cNvPr id="15" name="Straight Connector 14">
-                <a:extLst>
-                  <a:ext uri="{FF2B5EF4-FFF2-40B4-BE49-F238E27FC236}">
-                    <a16:creationId xmlns:a16="http://schemas.microsoft.com/office/drawing/2014/main" id="{4F99AD08-4462-47CE-B2EF-881C2A06E75B}"/>
-                  </a:ext>
-                </a:extLst>
-              </p:cNvPr>
-              <p:cNvCxnSpPr>
-                <a:cxnSpLocks/>
-              </p:cNvCxnSpPr>
-              <p:nvPr/>
-            </p:nvCxnSpPr>
-            <p:spPr>
-              <a:xfrm>
-                <a:off x="3661985" y="635056"/>
-                <a:ext cx="0" cy="2377440"/>
-              </a:xfrm>
-              <a:prstGeom prst="line">
-                <a:avLst/>
-              </a:prstGeom>
-              <a:ln w="28575"/>
-            </p:spPr>
-            <p:style>
-              <a:lnRef idx="1">
-                <a:schemeClr val="dk1"/>
-              </a:lnRef>
-              <a:fillRef idx="0">
-                <a:schemeClr val="dk1"/>
-              </a:fillRef>
-              <a:effectRef idx="0">
-                <a:schemeClr val="dk1"/>
-              </a:effectRef>
-              <a:fontRef idx="minor">
-                <a:schemeClr val="tx1"/>
-              </a:fontRef>
-            </p:style>
-          </p:cxnSp>
-          <p:cxnSp>
-            <p:nvCxnSpPr>
-              <p:cNvPr id="16" name="Straight Connector 15">
-                <a:extLst>
-                  <a:ext uri="{FF2B5EF4-FFF2-40B4-BE49-F238E27FC236}">
-                    <a16:creationId xmlns:a16="http://schemas.microsoft.com/office/drawing/2014/main" id="{5456AEC6-A38A-47D8-82E1-235B469E53AD}"/>
-                  </a:ext>
-                </a:extLst>
-              </p:cNvPr>
-              <p:cNvCxnSpPr>
-                <a:cxnSpLocks/>
-              </p:cNvCxnSpPr>
-              <p:nvPr/>
-            </p:nvCxnSpPr>
-            <p:spPr>
-              <a:xfrm>
-                <a:off x="3661985" y="3136758"/>
-                <a:ext cx="0" cy="2286000"/>
-              </a:xfrm>
-              <a:prstGeom prst="line">
-                <a:avLst/>
-              </a:prstGeom>
-              <a:ln w="28575"/>
-            </p:spPr>
-            <p:style>
-              <a:lnRef idx="1">
-                <a:schemeClr val="dk1"/>
-              </a:lnRef>
-              <a:fillRef idx="0">
-                <a:schemeClr val="dk1"/>
-              </a:fillRef>
-              <a:effectRef idx="0">
-                <a:schemeClr val="dk1"/>
-              </a:effectRef>
-              <a:fontRef idx="minor">
-                <a:schemeClr val="tx1"/>
-              </a:fontRef>
-            </p:style>
-          </p:cxnSp>
-          <p:cxnSp>
-            <p:nvCxnSpPr>
-              <p:cNvPr id="17" name="Straight Connector 16">
-                <a:extLst>
-                  <a:ext uri="{FF2B5EF4-FFF2-40B4-BE49-F238E27FC236}">
-                    <a16:creationId xmlns:a16="http://schemas.microsoft.com/office/drawing/2014/main" id="{3C460043-689E-4E67-8884-90956338B727}"/>
-                  </a:ext>
-                </a:extLst>
-              </p:cNvPr>
-              <p:cNvCxnSpPr>
-                <a:cxnSpLocks/>
-              </p:cNvCxnSpPr>
-              <p:nvPr/>
-            </p:nvCxnSpPr>
-            <p:spPr>
-              <a:xfrm>
-                <a:off x="3661985" y="5539989"/>
-                <a:ext cx="0" cy="914400"/>
-              </a:xfrm>
-              <a:prstGeom prst="line">
-                <a:avLst/>
-              </a:prstGeom>
-              <a:ln w="28575"/>
-            </p:spPr>
-            <p:style>
-              <a:lnRef idx="1">
-                <a:schemeClr val="dk1"/>
-              </a:lnRef>
-              <a:fillRef idx="0">
-                <a:schemeClr val="dk1"/>
-              </a:fillRef>
-              <a:effectRef idx="0">
-                <a:schemeClr val="dk1"/>
-              </a:effectRef>
-              <a:fontRef idx="minor">
-                <a:schemeClr val="tx1"/>
-              </a:fontRef>
-            </p:style>
-          </p:cxnSp>
-          <p:sp>
-            <p:nvSpPr>
-              <p:cNvPr id="18" name="TextBox 17">
-                <a:extLst>
-                  <a:ext uri="{FF2B5EF4-FFF2-40B4-BE49-F238E27FC236}">
-                    <a16:creationId xmlns:a16="http://schemas.microsoft.com/office/drawing/2014/main" id="{037C4291-51A8-41CC-97E7-9BB3251F2965}"/>
-                  </a:ext>
-                </a:extLst>
-              </p:cNvPr>
-              <p:cNvSpPr txBox="1"/>
-              <p:nvPr/>
-            </p:nvSpPr>
-            <p:spPr>
-              <a:xfrm rot="16200000">
-                <a:off x="2666658" y="1494469"/>
-                <a:ext cx="1375948" cy="461665"/>
-              </a:xfrm>
-              <a:prstGeom prst="rect">
-                <a:avLst/>
-              </a:prstGeom>
-              <a:noFill/>
-            </p:spPr>
-            <p:txBody>
-              <a:bodyPr wrap="square" rtlCol="0">
-                <a:spAutoFit/>
-              </a:bodyPr>
-              <a:lstStyle/>
-              <a:p>
-                <a:r>
-                  <a:rPr lang="en-US" sz="2400" i="1" dirty="0"/>
-                  <a:t>SD = 2.1</a:t>
-                </a:r>
-              </a:p>
-            </p:txBody>
-          </p:sp>
-          <p:sp>
-            <p:nvSpPr>
-              <p:cNvPr id="19" name="TextBox 18">
-                <a:extLst>
-                  <a:ext uri="{FF2B5EF4-FFF2-40B4-BE49-F238E27FC236}">
-                    <a16:creationId xmlns:a16="http://schemas.microsoft.com/office/drawing/2014/main" id="{1666F773-3CB2-4F8B-AC5C-B3AB32AD72C7}"/>
-                  </a:ext>
-                </a:extLst>
-              </p:cNvPr>
-              <p:cNvSpPr txBox="1"/>
-              <p:nvPr/>
-            </p:nvSpPr>
-            <p:spPr>
-              <a:xfrm rot="16200000">
-                <a:off x="2666657" y="3921689"/>
-                <a:ext cx="1375948" cy="461665"/>
-              </a:xfrm>
-              <a:prstGeom prst="rect">
-                <a:avLst/>
-              </a:prstGeom>
-              <a:noFill/>
-            </p:spPr>
-            <p:txBody>
-              <a:bodyPr wrap="square" rtlCol="0">
-                <a:spAutoFit/>
-              </a:bodyPr>
-              <a:lstStyle/>
-              <a:p>
-                <a:r>
-                  <a:rPr lang="en-US" sz="2400" i="1" dirty="0"/>
-                  <a:t>SD = 1.1</a:t>
-                </a:r>
-              </a:p>
-            </p:txBody>
-          </p:sp>
-          <p:sp>
-            <p:nvSpPr>
-              <p:cNvPr id="20" name="TextBox 19">
-                <a:extLst>
-                  <a:ext uri="{FF2B5EF4-FFF2-40B4-BE49-F238E27FC236}">
-                    <a16:creationId xmlns:a16="http://schemas.microsoft.com/office/drawing/2014/main" id="{AAD9AC1F-3425-4970-8FF3-4199291F45D1}"/>
-                  </a:ext>
-                </a:extLst>
-              </p:cNvPr>
-              <p:cNvSpPr txBox="1"/>
-              <p:nvPr/>
-            </p:nvSpPr>
-            <p:spPr>
-              <a:xfrm rot="16200000">
-                <a:off x="2671155" y="5660934"/>
-                <a:ext cx="1375948" cy="461665"/>
-              </a:xfrm>
-              <a:prstGeom prst="rect">
-                <a:avLst/>
-              </a:prstGeom>
-              <a:noFill/>
-            </p:spPr>
-            <p:txBody>
-              <a:bodyPr wrap="square" rtlCol="0">
-                <a:spAutoFit/>
-              </a:bodyPr>
-              <a:lstStyle/>
-              <a:p>
-                <a:r>
-                  <a:rPr lang="en-US" sz="2400" i="1" dirty="0"/>
-                  <a:t>SD = 0.1</a:t>
-                </a:r>
-              </a:p>
-            </p:txBody>
-          </p:sp>
-          <p:cxnSp>
-            <p:nvCxnSpPr>
-              <p:cNvPr id="21" name="Straight Connector 20">
-                <a:extLst>
-                  <a:ext uri="{FF2B5EF4-FFF2-40B4-BE49-F238E27FC236}">
-                    <a16:creationId xmlns:a16="http://schemas.microsoft.com/office/drawing/2014/main" id="{BBC46255-8A99-490A-9A9D-C5FEDF7B6223}"/>
-                  </a:ext>
-                </a:extLst>
-              </p:cNvPr>
-              <p:cNvCxnSpPr>
-                <a:cxnSpLocks/>
-              </p:cNvCxnSpPr>
-              <p:nvPr/>
-            </p:nvCxnSpPr>
-            <p:spPr>
-              <a:xfrm>
-                <a:off x="4135899" y="3040632"/>
-                <a:ext cx="5394960" cy="0"/>
-              </a:xfrm>
-              <a:prstGeom prst="line">
-                <a:avLst/>
-              </a:prstGeom>
-              <a:ln w="28575">
-                <a:solidFill>
-                  <a:schemeClr val="bg1"/>
-                </a:solidFill>
-              </a:ln>
-            </p:spPr>
-            <p:style>
-              <a:lnRef idx="1">
-                <a:schemeClr val="dk1"/>
-              </a:lnRef>
-              <a:fillRef idx="0">
-                <a:schemeClr val="dk1"/>
-              </a:fillRef>
-              <a:effectRef idx="0">
-                <a:schemeClr val="dk1"/>
-              </a:effectRef>
-              <a:fontRef idx="minor">
-                <a:schemeClr val="tx1"/>
-              </a:fontRef>
-            </p:style>
-          </p:cxnSp>
-          <p:cxnSp>
-            <p:nvCxnSpPr>
-              <p:cNvPr id="24" name="Straight Connector 23">
-                <a:extLst>
-                  <a:ext uri="{FF2B5EF4-FFF2-40B4-BE49-F238E27FC236}">
-                    <a16:creationId xmlns:a16="http://schemas.microsoft.com/office/drawing/2014/main" id="{CF46BEA2-5756-490F-ACDA-85763B6BA204}"/>
-                  </a:ext>
-                </a:extLst>
-              </p:cNvPr>
-              <p:cNvCxnSpPr>
-                <a:cxnSpLocks/>
-              </p:cNvCxnSpPr>
-              <p:nvPr/>
-            </p:nvCxnSpPr>
-            <p:spPr>
-              <a:xfrm>
-                <a:off x="4062269" y="5479030"/>
-                <a:ext cx="5394960" cy="0"/>
-              </a:xfrm>
-              <a:prstGeom prst="line">
-                <a:avLst/>
-              </a:prstGeom>
-              <a:ln w="28575">
-                <a:solidFill>
-                  <a:schemeClr val="bg1"/>
-                </a:solidFill>
-              </a:ln>
-            </p:spPr>
-            <p:style>
-              <a:lnRef idx="1">
-                <a:schemeClr val="dk1"/>
-              </a:lnRef>
-              <a:fillRef idx="0">
-                <a:schemeClr val="dk1"/>
-              </a:fillRef>
-              <a:effectRef idx="0">
-                <a:schemeClr val="dk1"/>
-              </a:effectRef>
-              <a:fontRef idx="minor">
-                <a:schemeClr val="tx1"/>
-              </a:fontRef>
-            </p:style>
-          </p:cxnSp>
-        </p:grpSp>
-      </p:grpSp>
+          <a:prstGeom prst="rect">
+            <a:avLst/>
+          </a:prstGeom>
+          <a:noFill/>
+        </p:spPr>
+        <p:txBody>
+          <a:bodyPr wrap="square" rtlCol="0">
+            <a:spAutoFit/>
+          </a:bodyPr>
+          <a:lstStyle/>
+          <a:p>
+            <a:r>
+              <a:rPr lang="en-US" sz="2400" dirty="0"/>
+              <a:t>Rank by</a:t>
+            </a:r>
+          </a:p>
+          <a:p>
+            <a:r>
+              <a:rPr lang="en-US" sz="2400" dirty="0"/>
+              <a:t>Preference</a:t>
+            </a:r>
+          </a:p>
+        </p:txBody>
+      </p:sp>
+      <p:pic>
+        <p:nvPicPr>
+          <p:cNvPr id="5" name="Picture 4" descr="A close up of a logo&#10;&#10;Description automatically generated">
+            <a:extLst>
+              <a:ext uri="{FF2B5EF4-FFF2-40B4-BE49-F238E27FC236}">
+                <a16:creationId xmlns:a16="http://schemas.microsoft.com/office/drawing/2014/main" id="{9D32934A-3112-49B1-A9F0-E13A7327878D}"/>
+              </a:ext>
+            </a:extLst>
+          </p:cNvPr>
+          <p:cNvPicPr>
+            <a:picLocks noChangeAspect="1"/>
+          </p:cNvPicPr>
+          <p:nvPr/>
+        </p:nvPicPr>
+        <p:blipFill rotWithShape="1">
+          <a:blip r:embed="rId3">
+            <a:extLst>
+              <a:ext uri="{28A0092B-C50C-407E-A947-70E740481C1C}">
+                <a14:useLocalDpi xmlns:a14="http://schemas.microsoft.com/office/drawing/2010/main" val="0"/>
+              </a:ext>
+            </a:extLst>
+          </a:blip>
+          <a:srcRect l="73004" t="42701" r="17406" b="41504"/>
+          <a:stretch/>
+        </p:blipFill>
+        <p:spPr>
+          <a:xfrm>
+            <a:off x="9676869" y="2700996"/>
+            <a:ext cx="1281864" cy="2903050"/>
+          </a:xfrm>
+          <a:prstGeom prst="rect">
+            <a:avLst/>
+          </a:prstGeom>
+        </p:spPr>
+      </p:pic>
+      <p:sp>
+        <p:nvSpPr>
+          <p:cNvPr id="8" name="TextBox 7">
+            <a:extLst>
+              <a:ext uri="{FF2B5EF4-FFF2-40B4-BE49-F238E27FC236}">
+                <a16:creationId xmlns:a16="http://schemas.microsoft.com/office/drawing/2014/main" id="{2C7F735B-B575-44A3-9447-25DB41E4994B}"/>
+              </a:ext>
+            </a:extLst>
+          </p:cNvPr>
+          <p:cNvSpPr txBox="1"/>
+          <p:nvPr/>
+        </p:nvSpPr>
+        <p:spPr>
+          <a:xfrm>
+            <a:off x="4739337" y="171384"/>
+            <a:ext cx="2106526" cy="461665"/>
+          </a:xfrm>
+          <a:prstGeom prst="rect">
+            <a:avLst/>
+          </a:prstGeom>
+          <a:noFill/>
+        </p:spPr>
+        <p:txBody>
+          <a:bodyPr wrap="square" rtlCol="0">
+            <a:spAutoFit/>
+          </a:bodyPr>
+          <a:lstStyle/>
+          <a:p>
+            <a:r>
+              <a:rPr lang="en-US" sz="2400" dirty="0"/>
+              <a:t>Ground-Truth</a:t>
+            </a:r>
+          </a:p>
+        </p:txBody>
+      </p:sp>
+      <p:sp>
+        <p:nvSpPr>
+          <p:cNvPr id="9" name="TextBox 8">
+            <a:extLst>
+              <a:ext uri="{FF2B5EF4-FFF2-40B4-BE49-F238E27FC236}">
+                <a16:creationId xmlns:a16="http://schemas.microsoft.com/office/drawing/2014/main" id="{2152F5F1-08CE-4CF2-ABC0-476F5618666B}"/>
+              </a:ext>
+            </a:extLst>
+          </p:cNvPr>
+          <p:cNvSpPr txBox="1"/>
+          <p:nvPr/>
+        </p:nvSpPr>
+        <p:spPr>
+          <a:xfrm>
+            <a:off x="7242420" y="171384"/>
+            <a:ext cx="2106526" cy="461665"/>
+          </a:xfrm>
+          <a:prstGeom prst="rect">
+            <a:avLst/>
+          </a:prstGeom>
+          <a:noFill/>
+        </p:spPr>
+        <p:txBody>
+          <a:bodyPr wrap="square" rtlCol="0">
+            <a:spAutoFit/>
+          </a:bodyPr>
+          <a:lstStyle/>
+          <a:p>
+            <a:r>
+              <a:rPr lang="en-US" sz="2400" dirty="0"/>
+              <a:t>Reconstructed</a:t>
+            </a:r>
+          </a:p>
+        </p:txBody>
+      </p:sp>
+      <p:cxnSp>
+        <p:nvCxnSpPr>
+          <p:cNvPr id="15" name="Straight Connector 14">
+            <a:extLst>
+              <a:ext uri="{FF2B5EF4-FFF2-40B4-BE49-F238E27FC236}">
+                <a16:creationId xmlns:a16="http://schemas.microsoft.com/office/drawing/2014/main" id="{4F99AD08-4462-47CE-B2EF-881C2A06E75B}"/>
+              </a:ext>
+            </a:extLst>
+          </p:cNvPr>
+          <p:cNvCxnSpPr>
+            <a:cxnSpLocks/>
+          </p:cNvCxnSpPr>
+          <p:nvPr/>
+        </p:nvCxnSpPr>
+        <p:spPr>
+          <a:xfrm>
+            <a:off x="4238765" y="789804"/>
+            <a:ext cx="0" cy="2103120"/>
+          </a:xfrm>
+          <a:prstGeom prst="line">
+            <a:avLst/>
+          </a:prstGeom>
+          <a:ln w="28575"/>
+        </p:spPr>
+        <p:style>
+          <a:lnRef idx="1">
+            <a:schemeClr val="dk1"/>
+          </a:lnRef>
+          <a:fillRef idx="0">
+            <a:schemeClr val="dk1"/>
+          </a:fillRef>
+          <a:effectRef idx="0">
+            <a:schemeClr val="dk1"/>
+          </a:effectRef>
+          <a:fontRef idx="minor">
+            <a:schemeClr val="tx1"/>
+          </a:fontRef>
+        </p:style>
+      </p:cxnSp>
+      <p:cxnSp>
+        <p:nvCxnSpPr>
+          <p:cNvPr id="16" name="Straight Connector 15">
+            <a:extLst>
+              <a:ext uri="{FF2B5EF4-FFF2-40B4-BE49-F238E27FC236}">
+                <a16:creationId xmlns:a16="http://schemas.microsoft.com/office/drawing/2014/main" id="{5456AEC6-A38A-47D8-82E1-235B469E53AD}"/>
+              </a:ext>
+            </a:extLst>
+          </p:cNvPr>
+          <p:cNvCxnSpPr>
+            <a:cxnSpLocks/>
+          </p:cNvCxnSpPr>
+          <p:nvPr/>
+        </p:nvCxnSpPr>
+        <p:spPr>
+          <a:xfrm>
+            <a:off x="4238765" y="3136758"/>
+            <a:ext cx="0" cy="2011680"/>
+          </a:xfrm>
+          <a:prstGeom prst="line">
+            <a:avLst/>
+          </a:prstGeom>
+          <a:ln w="28575"/>
+        </p:spPr>
+        <p:style>
+          <a:lnRef idx="1">
+            <a:schemeClr val="dk1"/>
+          </a:lnRef>
+          <a:fillRef idx="0">
+            <a:schemeClr val="dk1"/>
+          </a:fillRef>
+          <a:effectRef idx="0">
+            <a:schemeClr val="dk1"/>
+          </a:effectRef>
+          <a:fontRef idx="minor">
+            <a:schemeClr val="tx1"/>
+          </a:fontRef>
+        </p:style>
+      </p:cxnSp>
+      <p:cxnSp>
+        <p:nvCxnSpPr>
+          <p:cNvPr id="17" name="Straight Connector 16">
+            <a:extLst>
+              <a:ext uri="{FF2B5EF4-FFF2-40B4-BE49-F238E27FC236}">
+                <a16:creationId xmlns:a16="http://schemas.microsoft.com/office/drawing/2014/main" id="{3C460043-689E-4E67-8884-90956338B727}"/>
+              </a:ext>
+            </a:extLst>
+          </p:cNvPr>
+          <p:cNvCxnSpPr>
+            <a:cxnSpLocks/>
+          </p:cNvCxnSpPr>
+          <p:nvPr/>
+        </p:nvCxnSpPr>
+        <p:spPr>
+          <a:xfrm>
+            <a:off x="4238765" y="5385243"/>
+            <a:ext cx="0" cy="1097280"/>
+          </a:xfrm>
+          <a:prstGeom prst="line">
+            <a:avLst/>
+          </a:prstGeom>
+          <a:ln w="28575"/>
+        </p:spPr>
+        <p:style>
+          <a:lnRef idx="1">
+            <a:schemeClr val="dk1"/>
+          </a:lnRef>
+          <a:fillRef idx="0">
+            <a:schemeClr val="dk1"/>
+          </a:fillRef>
+          <a:effectRef idx="0">
+            <a:schemeClr val="dk1"/>
+          </a:effectRef>
+          <a:fontRef idx="minor">
+            <a:schemeClr val="tx1"/>
+          </a:fontRef>
+        </p:style>
+      </p:cxnSp>
+      <p:sp>
+        <p:nvSpPr>
+          <p:cNvPr id="18" name="TextBox 17">
+            <a:extLst>
+              <a:ext uri="{FF2B5EF4-FFF2-40B4-BE49-F238E27FC236}">
+                <a16:creationId xmlns:a16="http://schemas.microsoft.com/office/drawing/2014/main" id="{037C4291-51A8-41CC-97E7-9BB3251F2965}"/>
+              </a:ext>
+            </a:extLst>
+          </p:cNvPr>
+          <p:cNvSpPr txBox="1"/>
+          <p:nvPr/>
+        </p:nvSpPr>
+        <p:spPr>
+          <a:xfrm rot="16200000">
+            <a:off x="3243438" y="1494469"/>
+            <a:ext cx="1375948" cy="461665"/>
+          </a:xfrm>
+          <a:prstGeom prst="rect">
+            <a:avLst/>
+          </a:prstGeom>
+          <a:noFill/>
+        </p:spPr>
+        <p:txBody>
+          <a:bodyPr wrap="square" rtlCol="0">
+            <a:spAutoFit/>
+          </a:bodyPr>
+          <a:lstStyle/>
+          <a:p>
+            <a:r>
+              <a:rPr lang="en-US" sz="2400" i="1" dirty="0"/>
+              <a:t>SD = 2.1</a:t>
+            </a:r>
+          </a:p>
+        </p:txBody>
+      </p:sp>
+      <p:sp>
+        <p:nvSpPr>
+          <p:cNvPr id="19" name="TextBox 18">
+            <a:extLst>
+              <a:ext uri="{FF2B5EF4-FFF2-40B4-BE49-F238E27FC236}">
+                <a16:creationId xmlns:a16="http://schemas.microsoft.com/office/drawing/2014/main" id="{1666F773-3CB2-4F8B-AC5C-B3AB32AD72C7}"/>
+              </a:ext>
+            </a:extLst>
+          </p:cNvPr>
+          <p:cNvSpPr txBox="1"/>
+          <p:nvPr/>
+        </p:nvSpPr>
+        <p:spPr>
+          <a:xfrm rot="16200000">
+            <a:off x="3243437" y="3921689"/>
+            <a:ext cx="1375948" cy="461665"/>
+          </a:xfrm>
+          <a:prstGeom prst="rect">
+            <a:avLst/>
+          </a:prstGeom>
+          <a:noFill/>
+        </p:spPr>
+        <p:txBody>
+          <a:bodyPr wrap="square" rtlCol="0">
+            <a:spAutoFit/>
+          </a:bodyPr>
+          <a:lstStyle/>
+          <a:p>
+            <a:r>
+              <a:rPr lang="en-US" sz="2400" i="1" dirty="0"/>
+              <a:t>SD = 1.1</a:t>
+            </a:r>
+          </a:p>
+        </p:txBody>
+      </p:sp>
+      <p:sp>
+        <p:nvSpPr>
+          <p:cNvPr id="20" name="TextBox 19">
+            <a:extLst>
+              <a:ext uri="{FF2B5EF4-FFF2-40B4-BE49-F238E27FC236}">
+                <a16:creationId xmlns:a16="http://schemas.microsoft.com/office/drawing/2014/main" id="{AAD9AC1F-3425-4970-8FF3-4199291F45D1}"/>
+              </a:ext>
+            </a:extLst>
+          </p:cNvPr>
+          <p:cNvSpPr txBox="1"/>
+          <p:nvPr/>
+        </p:nvSpPr>
+        <p:spPr>
+          <a:xfrm rot="16200000">
+            <a:off x="3247935" y="5660934"/>
+            <a:ext cx="1375948" cy="461665"/>
+          </a:xfrm>
+          <a:prstGeom prst="rect">
+            <a:avLst/>
+          </a:prstGeom>
+          <a:noFill/>
+        </p:spPr>
+        <p:txBody>
+          <a:bodyPr wrap="square" rtlCol="0">
+            <a:spAutoFit/>
+          </a:bodyPr>
+          <a:lstStyle/>
+          <a:p>
+            <a:r>
+              <a:rPr lang="en-US" sz="2400" i="1" dirty="0"/>
+              <a:t>SD = 0.1</a:t>
+            </a:r>
+          </a:p>
+        </p:txBody>
+      </p:sp>
+      <p:cxnSp>
+        <p:nvCxnSpPr>
+          <p:cNvPr id="21" name="Straight Connector 20">
+            <a:extLst>
+              <a:ext uri="{FF2B5EF4-FFF2-40B4-BE49-F238E27FC236}">
+                <a16:creationId xmlns:a16="http://schemas.microsoft.com/office/drawing/2014/main" id="{BBC46255-8A99-490A-9A9D-C5FEDF7B6223}"/>
+              </a:ext>
+            </a:extLst>
+          </p:cNvPr>
+          <p:cNvCxnSpPr>
+            <a:cxnSpLocks/>
+          </p:cNvCxnSpPr>
+          <p:nvPr/>
+        </p:nvCxnSpPr>
+        <p:spPr>
+          <a:xfrm>
+            <a:off x="4135899" y="3040632"/>
+            <a:ext cx="5394960" cy="0"/>
+          </a:xfrm>
+          <a:prstGeom prst="line">
+            <a:avLst/>
+          </a:prstGeom>
+          <a:ln w="28575">
+            <a:solidFill>
+              <a:schemeClr val="bg1"/>
+            </a:solidFill>
+          </a:ln>
+        </p:spPr>
+        <p:style>
+          <a:lnRef idx="1">
+            <a:schemeClr val="dk1"/>
+          </a:lnRef>
+          <a:fillRef idx="0">
+            <a:schemeClr val="dk1"/>
+          </a:fillRef>
+          <a:effectRef idx="0">
+            <a:schemeClr val="dk1"/>
+          </a:effectRef>
+          <a:fontRef idx="minor">
+            <a:schemeClr val="tx1"/>
+          </a:fontRef>
+        </p:style>
+      </p:cxnSp>
+      <p:cxnSp>
+        <p:nvCxnSpPr>
+          <p:cNvPr id="24" name="Straight Connector 23">
+            <a:extLst>
+              <a:ext uri="{FF2B5EF4-FFF2-40B4-BE49-F238E27FC236}">
+                <a16:creationId xmlns:a16="http://schemas.microsoft.com/office/drawing/2014/main" id="{CF46BEA2-5756-490F-ACDA-85763B6BA204}"/>
+              </a:ext>
+            </a:extLst>
+          </p:cNvPr>
+          <p:cNvCxnSpPr>
+            <a:cxnSpLocks/>
+          </p:cNvCxnSpPr>
+          <p:nvPr/>
+        </p:nvCxnSpPr>
+        <p:spPr>
+          <a:xfrm>
+            <a:off x="4062269" y="5479030"/>
+            <a:ext cx="5394960" cy="0"/>
+          </a:xfrm>
+          <a:prstGeom prst="line">
+            <a:avLst/>
+          </a:prstGeom>
+          <a:ln w="28575">
+            <a:solidFill>
+              <a:schemeClr val="bg1"/>
+            </a:solidFill>
+          </a:ln>
+        </p:spPr>
+        <p:style>
+          <a:lnRef idx="1">
+            <a:schemeClr val="dk1"/>
+          </a:lnRef>
+          <a:fillRef idx="0">
+            <a:schemeClr val="dk1"/>
+          </a:fillRef>
+          <a:effectRef idx="0">
+            <a:schemeClr val="dk1"/>
+          </a:effectRef>
+          <a:fontRef idx="minor">
+            <a:schemeClr val="tx1"/>
+          </a:fontRef>
+        </p:style>
+      </p:cxnSp>
+      <p:pic>
+        <p:nvPicPr>
+          <p:cNvPr id="23" name="Picture 22" descr="A close up of a logo&#10;&#10;Description automatically generated">
+            <a:extLst>
+              <a:ext uri="{FF2B5EF4-FFF2-40B4-BE49-F238E27FC236}">
+                <a16:creationId xmlns:a16="http://schemas.microsoft.com/office/drawing/2014/main" id="{B57390E1-164D-4064-95D4-45531DA48A67}"/>
+              </a:ext>
+            </a:extLst>
+          </p:cNvPr>
+          <p:cNvPicPr>
+            <a:picLocks noChangeAspect="1"/>
+          </p:cNvPicPr>
+          <p:nvPr/>
+        </p:nvPicPr>
+        <p:blipFill rotWithShape="1">
+          <a:blip r:embed="rId4">
+            <a:extLst>
+              <a:ext uri="{28A0092B-C50C-407E-A947-70E740481C1C}">
+                <a14:useLocalDpi xmlns:a14="http://schemas.microsoft.com/office/drawing/2010/main" val="0"/>
+              </a:ext>
+            </a:extLst>
+          </a:blip>
+          <a:srcRect l="12111" t="1003" r="30632" b="-109"/>
+          <a:stretch/>
+        </p:blipFill>
+        <p:spPr>
+          <a:xfrm>
+            <a:off x="7023581" y="581648"/>
+            <a:ext cx="2614711" cy="6222944"/>
+          </a:xfrm>
+          <a:prstGeom prst="rect">
+            <a:avLst/>
+          </a:prstGeom>
+        </p:spPr>
+      </p:pic>
+      <p:pic>
+        <p:nvPicPr>
+          <p:cNvPr id="26" name="Picture 25" descr="A screenshot of a cell phone&#10;&#10;Description automatically generated">
+            <a:extLst>
+              <a:ext uri="{FF2B5EF4-FFF2-40B4-BE49-F238E27FC236}">
+                <a16:creationId xmlns:a16="http://schemas.microsoft.com/office/drawing/2014/main" id="{A9CFAF1F-B529-4ACA-9E95-3BA644CA7899}"/>
+              </a:ext>
+            </a:extLst>
+          </p:cNvPr>
+          <p:cNvPicPr>
+            <a:picLocks noChangeAspect="1"/>
+          </p:cNvPicPr>
+          <p:nvPr/>
+        </p:nvPicPr>
+        <p:blipFill rotWithShape="1">
+          <a:blip r:embed="rId5">
+            <a:extLst>
+              <a:ext uri="{28A0092B-C50C-407E-A947-70E740481C1C}">
+                <a14:useLocalDpi xmlns:a14="http://schemas.microsoft.com/office/drawing/2010/main" val="0"/>
+              </a:ext>
+            </a:extLst>
+          </a:blip>
+          <a:srcRect l="11487" t="448" r="34299" b="448"/>
+          <a:stretch/>
+        </p:blipFill>
+        <p:spPr>
+          <a:xfrm>
+            <a:off x="4440486" y="581648"/>
+            <a:ext cx="2542510" cy="6205644"/>
+          </a:xfrm>
+          <a:prstGeom prst="rect">
+            <a:avLst/>
+          </a:prstGeom>
+        </p:spPr>
+      </p:pic>
+      <p:cxnSp>
+        <p:nvCxnSpPr>
+          <p:cNvPr id="28" name="Straight Connector 27">
+            <a:extLst>
+              <a:ext uri="{FF2B5EF4-FFF2-40B4-BE49-F238E27FC236}">
+                <a16:creationId xmlns:a16="http://schemas.microsoft.com/office/drawing/2014/main" id="{0C5DEA84-BE39-4138-8C9D-BCD9B9BD3863}"/>
+              </a:ext>
+            </a:extLst>
+          </p:cNvPr>
+          <p:cNvCxnSpPr>
+            <a:cxnSpLocks/>
+          </p:cNvCxnSpPr>
+          <p:nvPr/>
+        </p:nvCxnSpPr>
+        <p:spPr>
+          <a:xfrm>
+            <a:off x="4281909" y="2955891"/>
+            <a:ext cx="5394960" cy="0"/>
+          </a:xfrm>
+          <a:prstGeom prst="line">
+            <a:avLst/>
+          </a:prstGeom>
+          <a:ln w="28575">
+            <a:solidFill>
+              <a:schemeClr val="bg1"/>
+            </a:solidFill>
+          </a:ln>
+        </p:spPr>
+        <p:style>
+          <a:lnRef idx="1">
+            <a:schemeClr val="dk1"/>
+          </a:lnRef>
+          <a:fillRef idx="0">
+            <a:schemeClr val="dk1"/>
+          </a:fillRef>
+          <a:effectRef idx="0">
+            <a:schemeClr val="dk1"/>
+          </a:effectRef>
+          <a:fontRef idx="minor">
+            <a:schemeClr val="tx1"/>
+          </a:fontRef>
+        </p:style>
+      </p:cxnSp>
+      <p:cxnSp>
+        <p:nvCxnSpPr>
+          <p:cNvPr id="29" name="Straight Connector 28">
+            <a:extLst>
+              <a:ext uri="{FF2B5EF4-FFF2-40B4-BE49-F238E27FC236}">
+                <a16:creationId xmlns:a16="http://schemas.microsoft.com/office/drawing/2014/main" id="{8F50E44C-3843-49AD-972D-644428CC9E97}"/>
+              </a:ext>
+            </a:extLst>
+          </p:cNvPr>
+          <p:cNvCxnSpPr>
+            <a:cxnSpLocks/>
+          </p:cNvCxnSpPr>
+          <p:nvPr/>
+        </p:nvCxnSpPr>
+        <p:spPr>
+          <a:xfrm>
+            <a:off x="4243332" y="5310214"/>
+            <a:ext cx="5394960" cy="0"/>
+          </a:xfrm>
+          <a:prstGeom prst="line">
+            <a:avLst/>
+          </a:prstGeom>
+          <a:ln w="28575">
+            <a:solidFill>
+              <a:schemeClr val="bg1"/>
+            </a:solidFill>
+          </a:ln>
+        </p:spPr>
+        <p:style>
+          <a:lnRef idx="1">
+            <a:schemeClr val="dk1"/>
+          </a:lnRef>
+          <a:fillRef idx="0">
+            <a:schemeClr val="dk1"/>
+          </a:fillRef>
+          <a:effectRef idx="0">
+            <a:schemeClr val="dk1"/>
+          </a:effectRef>
+          <a:fontRef idx="minor">
+            <a:schemeClr val="tx1"/>
+          </a:fontRef>
+        </p:style>
+      </p:cxnSp>
     </p:spTree>
     <p:extLst>
       <p:ext uri="{BB962C8B-B14F-4D97-AF65-F5344CB8AC3E}">
-        <p14:creationId xmlns:p14="http://schemas.microsoft.com/office/powerpoint/2010/main" val="1837926949"/>
+        <p14:creationId xmlns:p14="http://schemas.microsoft.com/office/powerpoint/2010/main" val="889487962"/>
       </p:ext>
     </p:extLst>
   </p:cSld>

</xml_diff>

<commit_message>
Work on ROMAN20_PreferenceLearning_0311_YunShiuan_v3.docx: revise the social game setup
</commit_message>
<xml_diff>
--- a/report/RO-MAN/figures/ROMAN-figures.pptx
+++ b/report/RO-MAN/figures/ROMAN-figures.pptx
@@ -5,15 +5,17 @@
     <p:sldMasterId id="2147483648" r:id="rId1"/>
   </p:sldMasterIdLst>
   <p:notesMasterIdLst>
-    <p:notesMasterId r:id="rId8"/>
+    <p:notesMasterId r:id="rId10"/>
   </p:notesMasterIdLst>
   <p:sldIdLst>
-    <p:sldId id="259" r:id="rId2"/>
-    <p:sldId id="258" r:id="rId3"/>
-    <p:sldId id="262" r:id="rId4"/>
-    <p:sldId id="256" r:id="rId5"/>
-    <p:sldId id="257" r:id="rId6"/>
-    <p:sldId id="261" r:id="rId7"/>
+    <p:sldId id="263" r:id="rId2"/>
+    <p:sldId id="264" r:id="rId3"/>
+    <p:sldId id="259" r:id="rId4"/>
+    <p:sldId id="258" r:id="rId5"/>
+    <p:sldId id="262" r:id="rId6"/>
+    <p:sldId id="256" r:id="rId7"/>
+    <p:sldId id="257" r:id="rId8"/>
+    <p:sldId id="261" r:id="rId9"/>
   </p:sldIdLst>
   <p:sldSz cx="12192000" cy="6858000"/>
   <p:notesSz cx="6858000" cy="9144000"/>
@@ -213,7 +215,7 @@
           <a:p>
             <a:fld id="{3F89A295-6F9E-4D51-AE54-61E02A4CE380}" type="datetimeFigureOut">
               <a:rPr lang="en-US" smtClean="0"/>
-              <a:t>3/9/2020</a:t>
+              <a:t>3/11/2020</a:t>
             </a:fld>
             <a:endParaRPr lang="en-US"/>
           </a:p>
@@ -561,7 +563,7 @@
           <a:p>
             <a:fld id="{DA1463AA-A683-4C2A-8632-07FD5D698543}" type="slidenum">
               <a:rPr lang="en-US" smtClean="0"/>
-              <a:t>1</a:t>
+              <a:t>3</a:t>
             </a:fld>
             <a:endParaRPr lang="en-US"/>
           </a:p>
@@ -700,7 +702,7 @@
           <a:p>
             <a:fld id="{DA1463AA-A683-4C2A-8632-07FD5D698543}" type="slidenum">
               <a:rPr lang="en-US" smtClean="0"/>
-              <a:t>2</a:t>
+              <a:t>4</a:t>
             </a:fld>
             <a:endParaRPr lang="en-US"/>
           </a:p>
@@ -839,7 +841,7 @@
           <a:p>
             <a:fld id="{DA1463AA-A683-4C2A-8632-07FD5D698543}" type="slidenum">
               <a:rPr lang="en-US" smtClean="0"/>
-              <a:t>3</a:t>
+              <a:t>5</a:t>
             </a:fld>
             <a:endParaRPr lang="en-US"/>
           </a:p>
@@ -951,7 +953,7 @@
           <a:p>
             <a:fld id="{DA1463AA-A683-4C2A-8632-07FD5D698543}" type="slidenum">
               <a:rPr lang="en-US" smtClean="0"/>
-              <a:t>4</a:t>
+              <a:t>6</a:t>
             </a:fld>
             <a:endParaRPr lang="en-US"/>
           </a:p>
@@ -1070,7 +1072,7 @@
           <a:p>
             <a:fld id="{DA1463AA-A683-4C2A-8632-07FD5D698543}" type="slidenum">
               <a:rPr lang="en-US" smtClean="0"/>
-              <a:t>5</a:t>
+              <a:t>7</a:t>
             </a:fld>
             <a:endParaRPr lang="en-US"/>
           </a:p>
@@ -1209,7 +1211,7 @@
           <a:p>
             <a:fld id="{DA1463AA-A683-4C2A-8632-07FD5D698543}" type="slidenum">
               <a:rPr lang="en-US" smtClean="0"/>
-              <a:t>6</a:t>
+              <a:t>8</a:t>
             </a:fld>
             <a:endParaRPr lang="en-US"/>
           </a:p>
@@ -1375,7 +1377,7 @@
           <a:p>
             <a:fld id="{F4E53FB3-0E6D-400E-94D0-294D549E0F65}" type="datetimeFigureOut">
               <a:rPr lang="en-US" smtClean="0"/>
-              <a:t>3/9/2020</a:t>
+              <a:t>3/11/2020</a:t>
             </a:fld>
             <a:endParaRPr lang="en-US"/>
           </a:p>
@@ -1573,7 +1575,7 @@
           <a:p>
             <a:fld id="{F4E53FB3-0E6D-400E-94D0-294D549E0F65}" type="datetimeFigureOut">
               <a:rPr lang="en-US" smtClean="0"/>
-              <a:t>3/9/2020</a:t>
+              <a:t>3/11/2020</a:t>
             </a:fld>
             <a:endParaRPr lang="en-US"/>
           </a:p>
@@ -1781,7 +1783,7 @@
           <a:p>
             <a:fld id="{F4E53FB3-0E6D-400E-94D0-294D549E0F65}" type="datetimeFigureOut">
               <a:rPr lang="en-US" smtClean="0"/>
-              <a:t>3/9/2020</a:t>
+              <a:t>3/11/2020</a:t>
             </a:fld>
             <a:endParaRPr lang="en-US"/>
           </a:p>
@@ -1979,7 +1981,7 @@
           <a:p>
             <a:fld id="{F4E53FB3-0E6D-400E-94D0-294D549E0F65}" type="datetimeFigureOut">
               <a:rPr lang="en-US" smtClean="0"/>
-              <a:t>3/9/2020</a:t>
+              <a:t>3/11/2020</a:t>
             </a:fld>
             <a:endParaRPr lang="en-US"/>
           </a:p>
@@ -2254,7 +2256,7 @@
           <a:p>
             <a:fld id="{F4E53FB3-0E6D-400E-94D0-294D549E0F65}" type="datetimeFigureOut">
               <a:rPr lang="en-US" smtClean="0"/>
-              <a:t>3/9/2020</a:t>
+              <a:t>3/11/2020</a:t>
             </a:fld>
             <a:endParaRPr lang="en-US"/>
           </a:p>
@@ -2519,7 +2521,7 @@
           <a:p>
             <a:fld id="{F4E53FB3-0E6D-400E-94D0-294D549E0F65}" type="datetimeFigureOut">
               <a:rPr lang="en-US" smtClean="0"/>
-              <a:t>3/9/2020</a:t>
+              <a:t>3/11/2020</a:t>
             </a:fld>
             <a:endParaRPr lang="en-US"/>
           </a:p>
@@ -2931,7 +2933,7 @@
           <a:p>
             <a:fld id="{F4E53FB3-0E6D-400E-94D0-294D549E0F65}" type="datetimeFigureOut">
               <a:rPr lang="en-US" smtClean="0"/>
-              <a:t>3/9/2020</a:t>
+              <a:t>3/11/2020</a:t>
             </a:fld>
             <a:endParaRPr lang="en-US"/>
           </a:p>
@@ -3072,7 +3074,7 @@
           <a:p>
             <a:fld id="{F4E53FB3-0E6D-400E-94D0-294D549E0F65}" type="datetimeFigureOut">
               <a:rPr lang="en-US" smtClean="0"/>
-              <a:t>3/9/2020</a:t>
+              <a:t>3/11/2020</a:t>
             </a:fld>
             <a:endParaRPr lang="en-US"/>
           </a:p>
@@ -3185,7 +3187,7 @@
           <a:p>
             <a:fld id="{F4E53FB3-0E6D-400E-94D0-294D549E0F65}" type="datetimeFigureOut">
               <a:rPr lang="en-US" smtClean="0"/>
-              <a:t>3/9/2020</a:t>
+              <a:t>3/11/2020</a:t>
             </a:fld>
             <a:endParaRPr lang="en-US"/>
           </a:p>
@@ -3496,7 +3498,7 @@
           <a:p>
             <a:fld id="{F4E53FB3-0E6D-400E-94D0-294D549E0F65}" type="datetimeFigureOut">
               <a:rPr lang="en-US" smtClean="0"/>
-              <a:t>3/9/2020</a:t>
+              <a:t>3/11/2020</a:t>
             </a:fld>
             <a:endParaRPr lang="en-US"/>
           </a:p>
@@ -3784,7 +3786,7 @@
           <a:p>
             <a:fld id="{F4E53FB3-0E6D-400E-94D0-294D549E0F65}" type="datetimeFigureOut">
               <a:rPr lang="en-US" smtClean="0"/>
-              <a:t>3/9/2020</a:t>
+              <a:t>3/11/2020</a:t>
             </a:fld>
             <a:endParaRPr lang="en-US"/>
           </a:p>
@@ -4025,7 +4027,7 @@
           <a:p>
             <a:fld id="{F4E53FB3-0E6D-400E-94D0-294D549E0F65}" type="datetimeFigureOut">
               <a:rPr lang="en-US" smtClean="0"/>
-              <a:t>3/9/2020</a:t>
+              <a:t>3/11/2020</a:t>
             </a:fld>
             <a:endParaRPr lang="en-US"/>
           </a:p>
@@ -4426,6 +4428,2003 @@
 </file>
 
 <file path=ppt/slides/slide1.xml><?xml version="1.0" encoding="utf-8"?>
+<p:sld xmlns:a="http://schemas.openxmlformats.org/drawingml/2006/main" xmlns:r="http://schemas.openxmlformats.org/officeDocument/2006/relationships" xmlns:p="http://schemas.openxmlformats.org/presentationml/2006/main" show="0">
+  <p:cSld>
+    <p:spTree>
+      <p:nvGrpSpPr>
+        <p:cNvPr id="1" name=""/>
+        <p:cNvGrpSpPr/>
+        <p:nvPr/>
+      </p:nvGrpSpPr>
+      <p:grpSpPr>
+        <a:xfrm>
+          <a:off x="0" y="0"/>
+          <a:ext cx="0" cy="0"/>
+          <a:chOff x="0" y="0"/>
+          <a:chExt cx="0" cy="0"/>
+        </a:xfrm>
+      </p:grpSpPr>
+      <p:grpSp>
+        <p:nvGrpSpPr>
+          <p:cNvPr id="44" name="群組 43">
+            <a:extLst>
+              <a:ext uri="{FF2B5EF4-FFF2-40B4-BE49-F238E27FC236}">
+                <a16:creationId xmlns:a16="http://schemas.microsoft.com/office/drawing/2014/main" id="{8B56271E-0134-DD43-9BA3-88C48F40C473}"/>
+              </a:ext>
+            </a:extLst>
+          </p:cNvPr>
+          <p:cNvGrpSpPr/>
+          <p:nvPr/>
+        </p:nvGrpSpPr>
+        <p:grpSpPr>
+          <a:xfrm>
+            <a:off x="2198916" y="1360713"/>
+            <a:ext cx="7053941" cy="5203371"/>
+            <a:chOff x="3145971" y="859971"/>
+            <a:chExt cx="7239000" cy="5159827"/>
+          </a:xfrm>
+        </p:grpSpPr>
+        <p:grpSp>
+          <p:nvGrpSpPr>
+            <p:cNvPr id="41" name="群組 40">
+              <a:extLst>
+                <a:ext uri="{FF2B5EF4-FFF2-40B4-BE49-F238E27FC236}">
+                  <a16:creationId xmlns:a16="http://schemas.microsoft.com/office/drawing/2014/main" id="{7CD27707-320D-CF49-9C63-82D1937F501D}"/>
+                </a:ext>
+              </a:extLst>
+            </p:cNvPr>
+            <p:cNvGrpSpPr/>
+            <p:nvPr/>
+          </p:nvGrpSpPr>
+          <p:grpSpPr>
+            <a:xfrm>
+              <a:off x="3145971" y="859971"/>
+              <a:ext cx="7239000" cy="5159827"/>
+              <a:chOff x="3145971" y="859971"/>
+              <a:chExt cx="7239000" cy="5159827"/>
+            </a:xfrm>
+          </p:grpSpPr>
+          <p:grpSp>
+            <p:nvGrpSpPr>
+              <p:cNvPr id="21" name="群組 20">
+                <a:extLst>
+                  <a:ext uri="{FF2B5EF4-FFF2-40B4-BE49-F238E27FC236}">
+                    <a16:creationId xmlns:a16="http://schemas.microsoft.com/office/drawing/2014/main" id="{070EB3C3-0A24-D04D-BDD9-099D3B40FD00}"/>
+                  </a:ext>
+                </a:extLst>
+              </p:cNvPr>
+              <p:cNvGrpSpPr/>
+              <p:nvPr/>
+            </p:nvGrpSpPr>
+            <p:grpSpPr>
+              <a:xfrm>
+                <a:off x="3145971" y="859971"/>
+                <a:ext cx="7239000" cy="5159827"/>
+                <a:chOff x="3557429" y="1262741"/>
+                <a:chExt cx="6581843" cy="4615543"/>
+              </a:xfrm>
+            </p:grpSpPr>
+            <p:grpSp>
+              <p:nvGrpSpPr>
+                <p:cNvPr id="7" name="群組 6">
+                  <a:extLst>
+                    <a:ext uri="{FF2B5EF4-FFF2-40B4-BE49-F238E27FC236}">
+                      <a16:creationId xmlns:a16="http://schemas.microsoft.com/office/drawing/2014/main" id="{46E0B445-8B20-5B41-A740-8289361E0A07}"/>
+                    </a:ext>
+                  </a:extLst>
+                </p:cNvPr>
+                <p:cNvGrpSpPr/>
+                <p:nvPr/>
+              </p:nvGrpSpPr>
+              <p:grpSpPr>
+                <a:xfrm>
+                  <a:off x="3557429" y="1262741"/>
+                  <a:ext cx="6581843" cy="4615543"/>
+                  <a:chOff x="3524772" y="2242456"/>
+                  <a:chExt cx="6581843" cy="4615543"/>
+                </a:xfrm>
+              </p:grpSpPr>
+              <p:pic>
+                <p:nvPicPr>
+                  <p:cNvPr id="5" name="圖片 4">
+                    <a:extLst>
+                      <a:ext uri="{FF2B5EF4-FFF2-40B4-BE49-F238E27FC236}">
+                        <a16:creationId xmlns:a16="http://schemas.microsoft.com/office/drawing/2014/main" id="{BCCFB49B-2662-9646-AB86-3AE10AA454C7}"/>
+                      </a:ext>
+                    </a:extLst>
+                  </p:cNvPr>
+                  <p:cNvPicPr>
+                    <a:picLocks noChangeAspect="1"/>
+                  </p:cNvPicPr>
+                  <p:nvPr/>
+                </p:nvPicPr>
+                <p:blipFill rotWithShape="1">
+                  <a:blip r:embed="rId2"/>
+                  <a:srcRect l="17945" t="32698"/>
+                  <a:stretch/>
+                </p:blipFill>
+                <p:spPr>
+                  <a:xfrm>
+                    <a:off x="3524772" y="2242456"/>
+                    <a:ext cx="6581843" cy="4615543"/>
+                  </a:xfrm>
+                  <a:prstGeom prst="rect">
+                    <a:avLst/>
+                  </a:prstGeom>
+                </p:spPr>
+              </p:pic>
+              <p:sp>
+                <p:nvSpPr>
+                  <p:cNvPr id="14" name="文字方塊 13">
+                    <a:extLst>
+                      <a:ext uri="{FF2B5EF4-FFF2-40B4-BE49-F238E27FC236}">
+                        <a16:creationId xmlns:a16="http://schemas.microsoft.com/office/drawing/2014/main" id="{7C498FC1-7579-7F48-AB47-F68D7B45CDA2}"/>
+                      </a:ext>
+                    </a:extLst>
+                  </p:cNvPr>
+                  <p:cNvSpPr txBox="1"/>
+                  <p:nvPr/>
+                </p:nvSpPr>
+                <p:spPr>
+                  <a:xfrm>
+                    <a:off x="3980162" y="3189162"/>
+                    <a:ext cx="1190552" cy="430887"/>
+                  </a:xfrm>
+                  <a:prstGeom prst="rect">
+                    <a:avLst/>
+                  </a:prstGeom>
+                  <a:solidFill>
+                    <a:schemeClr val="tx1"/>
+                  </a:solidFill>
+                </p:spPr>
+                <p:txBody>
+                  <a:bodyPr wrap="square" rtlCol="0">
+                    <a:spAutoFit/>
+                  </a:bodyPr>
+                  <a:lstStyle/>
+                  <a:p>
+                    <a:pPr>
+                      <a:tabLst>
+                        <a:tab pos="487363" algn="l"/>
+                      </a:tabLst>
+                    </a:pPr>
+                    <a:r>
+                      <a:rPr kumimoji="1" lang="zh-CN" altLang="en-US" sz="2200" dirty="0">
+                        <a:solidFill>
+                          <a:srgbClr val="FF3AA6"/>
+                        </a:solidFill>
+                      </a:rPr>
+                      <a:t>小明</a:t>
+                    </a:r>
+                    <a:r>
+                      <a:rPr kumimoji="1" lang="en-US" altLang="zh-CN" sz="2200" dirty="0">
+                        <a:solidFill>
+                          <a:srgbClr val="FF3AA6"/>
+                        </a:solidFill>
+                      </a:rPr>
+                      <a:t>: 23</a:t>
+                    </a:r>
+                    <a:endParaRPr kumimoji="1" lang="zh-TW" altLang="en-US" sz="2200" dirty="0">
+                      <a:solidFill>
+                        <a:srgbClr val="FF3AA6"/>
+                      </a:solidFill>
+                    </a:endParaRPr>
+                  </a:p>
+                </p:txBody>
+              </p:sp>
+              <p:sp>
+                <p:nvSpPr>
+                  <p:cNvPr id="16" name="文字方塊 15">
+                    <a:extLst>
+                      <a:ext uri="{FF2B5EF4-FFF2-40B4-BE49-F238E27FC236}">
+                        <a16:creationId xmlns:a16="http://schemas.microsoft.com/office/drawing/2014/main" id="{C239229E-71E6-8144-B932-8991C2C8A58C}"/>
+                      </a:ext>
+                    </a:extLst>
+                  </p:cNvPr>
+                  <p:cNvSpPr txBox="1"/>
+                  <p:nvPr/>
+                </p:nvSpPr>
+                <p:spPr>
+                  <a:xfrm>
+                    <a:off x="3969276" y="3670851"/>
+                    <a:ext cx="1277638" cy="430887"/>
+                  </a:xfrm>
+                  <a:prstGeom prst="rect">
+                    <a:avLst/>
+                  </a:prstGeom>
+                  <a:solidFill>
+                    <a:schemeClr val="tx1"/>
+                  </a:solidFill>
+                </p:spPr>
+                <p:txBody>
+                  <a:bodyPr wrap="square" rtlCol="0">
+                    <a:spAutoFit/>
+                  </a:bodyPr>
+                  <a:lstStyle/>
+                  <a:p>
+                    <a:pPr>
+                      <a:tabLst>
+                        <a:tab pos="487363" algn="l"/>
+                      </a:tabLst>
+                    </a:pPr>
+                    <a:r>
+                      <a:rPr kumimoji="1" lang="zh-CN" altLang="en-US" sz="2200" dirty="0">
+                        <a:solidFill>
+                          <a:schemeClr val="accent4">
+                            <a:lumMod val="60000"/>
+                            <a:lumOff val="40000"/>
+                          </a:schemeClr>
+                        </a:solidFill>
+                      </a:rPr>
+                      <a:t>小美</a:t>
+                    </a:r>
+                    <a:r>
+                      <a:rPr kumimoji="1" lang="en-US" altLang="zh-CN" sz="2200" dirty="0">
+                        <a:solidFill>
+                          <a:schemeClr val="accent4">
+                            <a:lumMod val="60000"/>
+                            <a:lumOff val="40000"/>
+                          </a:schemeClr>
+                        </a:solidFill>
+                      </a:rPr>
+                      <a:t>: 26</a:t>
+                    </a:r>
+                    <a:endParaRPr kumimoji="1" lang="zh-TW" altLang="en-US" sz="2200" dirty="0">
+                      <a:solidFill>
+                        <a:schemeClr val="accent4">
+                          <a:lumMod val="60000"/>
+                          <a:lumOff val="40000"/>
+                        </a:schemeClr>
+                      </a:solidFill>
+                    </a:endParaRPr>
+                  </a:p>
+                </p:txBody>
+              </p:sp>
+              <p:sp>
+                <p:nvSpPr>
+                  <p:cNvPr id="17" name="文字方塊 16">
+                    <a:extLst>
+                      <a:ext uri="{FF2B5EF4-FFF2-40B4-BE49-F238E27FC236}">
+                        <a16:creationId xmlns:a16="http://schemas.microsoft.com/office/drawing/2014/main" id="{CA2D3485-F9C7-924F-B171-8CDE7714A838}"/>
+                      </a:ext>
+                    </a:extLst>
+                  </p:cNvPr>
+                  <p:cNvSpPr txBox="1"/>
+                  <p:nvPr/>
+                </p:nvSpPr>
+                <p:spPr>
+                  <a:xfrm>
+                    <a:off x="3980162" y="4165996"/>
+                    <a:ext cx="1190552" cy="430887"/>
+                  </a:xfrm>
+                  <a:prstGeom prst="rect">
+                    <a:avLst/>
+                  </a:prstGeom>
+                  <a:solidFill>
+                    <a:schemeClr val="tx1"/>
+                  </a:solidFill>
+                </p:spPr>
+                <p:txBody>
+                  <a:bodyPr wrap="square" rtlCol="0">
+                    <a:spAutoFit/>
+                  </a:bodyPr>
+                  <a:lstStyle/>
+                  <a:p>
+                    <a:pPr>
+                      <a:tabLst>
+                        <a:tab pos="487363" algn="l"/>
+                      </a:tabLst>
+                    </a:pPr>
+                    <a:r>
+                      <a:rPr kumimoji="1" lang="zh-CN" altLang="en-US" sz="2200" dirty="0">
+                        <a:solidFill>
+                          <a:schemeClr val="accent2">
+                            <a:lumMod val="75000"/>
+                          </a:schemeClr>
+                        </a:solidFill>
+                      </a:rPr>
+                      <a:t>小熊</a:t>
+                    </a:r>
+                    <a:r>
+                      <a:rPr kumimoji="1" lang="en-US" altLang="zh-CN" sz="2200" dirty="0">
+                        <a:solidFill>
+                          <a:schemeClr val="accent2">
+                            <a:lumMod val="75000"/>
+                          </a:schemeClr>
+                        </a:solidFill>
+                      </a:rPr>
+                      <a:t>: 18</a:t>
+                    </a:r>
+                    <a:endParaRPr kumimoji="1" lang="zh-TW" altLang="en-US" sz="2200" dirty="0">
+                      <a:solidFill>
+                        <a:schemeClr val="accent2">
+                          <a:lumMod val="75000"/>
+                        </a:schemeClr>
+                      </a:solidFill>
+                    </a:endParaRPr>
+                  </a:p>
+                </p:txBody>
+              </p:sp>
+              <p:sp>
+                <p:nvSpPr>
+                  <p:cNvPr id="18" name="文字方塊 17">
+                    <a:extLst>
+                      <a:ext uri="{FF2B5EF4-FFF2-40B4-BE49-F238E27FC236}">
+                        <a16:creationId xmlns:a16="http://schemas.microsoft.com/office/drawing/2014/main" id="{EFF2BBB2-2E5B-2844-B10A-6388B73A70B4}"/>
+                      </a:ext>
+                    </a:extLst>
+                  </p:cNvPr>
+                  <p:cNvSpPr txBox="1"/>
+                  <p:nvPr/>
+                </p:nvSpPr>
+                <p:spPr>
+                  <a:xfrm>
+                    <a:off x="3969276" y="4723648"/>
+                    <a:ext cx="1201438" cy="430887"/>
+                  </a:xfrm>
+                  <a:prstGeom prst="rect">
+                    <a:avLst/>
+                  </a:prstGeom>
+                  <a:solidFill>
+                    <a:schemeClr val="tx1"/>
+                  </a:solidFill>
+                </p:spPr>
+                <p:txBody>
+                  <a:bodyPr wrap="square" rtlCol="0">
+                    <a:spAutoFit/>
+                  </a:bodyPr>
+                  <a:lstStyle/>
+                  <a:p>
+                    <a:pPr>
+                      <a:tabLst>
+                        <a:tab pos="487363" algn="l"/>
+                      </a:tabLst>
+                    </a:pPr>
+                    <a:r>
+                      <a:rPr kumimoji="1" lang="zh-CN" altLang="en-US" sz="2200" dirty="0">
+                        <a:solidFill>
+                          <a:schemeClr val="accent6">
+                            <a:lumMod val="60000"/>
+                            <a:lumOff val="40000"/>
+                          </a:schemeClr>
+                        </a:solidFill>
+                      </a:rPr>
+                      <a:t>小樹</a:t>
+                    </a:r>
+                    <a:r>
+                      <a:rPr kumimoji="1" lang="en-US" altLang="zh-CN" sz="2200" dirty="0">
+                        <a:solidFill>
+                          <a:schemeClr val="accent6">
+                            <a:lumMod val="60000"/>
+                            <a:lumOff val="40000"/>
+                          </a:schemeClr>
+                        </a:solidFill>
+                      </a:rPr>
+                      <a:t>: 18</a:t>
+                    </a:r>
+                    <a:endParaRPr kumimoji="1" lang="zh-TW" altLang="en-US" sz="2200" dirty="0">
+                      <a:solidFill>
+                        <a:schemeClr val="accent6">
+                          <a:lumMod val="60000"/>
+                          <a:lumOff val="40000"/>
+                        </a:schemeClr>
+                      </a:solidFill>
+                    </a:endParaRPr>
+                  </a:p>
+                </p:txBody>
+              </p:sp>
+            </p:grpSp>
+            <p:pic>
+              <p:nvPicPr>
+                <p:cNvPr id="20" name="圖片 19">
+                  <a:extLst>
+                    <a:ext uri="{FF2B5EF4-FFF2-40B4-BE49-F238E27FC236}">
+                      <a16:creationId xmlns:a16="http://schemas.microsoft.com/office/drawing/2014/main" id="{60611A94-7022-E548-A93C-6A24CF621C43}"/>
+                    </a:ext>
+                  </a:extLst>
+                </p:cNvPr>
+                <p:cNvPicPr>
+                  <a:picLocks noChangeAspect="1"/>
+                </p:cNvPicPr>
+                <p:nvPr/>
+              </p:nvPicPr>
+              <p:blipFill>
+                <a:blip r:embed="rId3"/>
+                <a:stretch>
+                  <a:fillRect/>
+                </a:stretch>
+              </p:blipFill>
+              <p:spPr>
+                <a:xfrm>
+                  <a:off x="5203371" y="1445545"/>
+                  <a:ext cx="4333145" cy="4343245"/>
+                </a:xfrm>
+                <a:prstGeom prst="rect">
+                  <a:avLst/>
+                </a:prstGeom>
+              </p:spPr>
+            </p:pic>
+          </p:grpSp>
+          <p:pic>
+            <p:nvPicPr>
+              <p:cNvPr id="23" name="圖片 22">
+                <a:extLst>
+                  <a:ext uri="{FF2B5EF4-FFF2-40B4-BE49-F238E27FC236}">
+                    <a16:creationId xmlns:a16="http://schemas.microsoft.com/office/drawing/2014/main" id="{E8B12BD8-0C54-C245-B299-FD94AFDA6C82}"/>
+                  </a:ext>
+                </a:extLst>
+              </p:cNvPr>
+              <p:cNvPicPr>
+                <a:picLocks noChangeAspect="1"/>
+              </p:cNvPicPr>
+              <p:nvPr/>
+            </p:nvPicPr>
+            <p:blipFill>
+              <a:blip r:embed="rId4"/>
+              <a:stretch>
+                <a:fillRect/>
+              </a:stretch>
+            </p:blipFill>
+            <p:spPr>
+              <a:xfrm>
+                <a:off x="7317368" y="3191179"/>
+                <a:ext cx="324000" cy="334125"/>
+              </a:xfrm>
+              <a:prstGeom prst="rect">
+                <a:avLst/>
+              </a:prstGeom>
+            </p:spPr>
+          </p:pic>
+          <p:pic>
+            <p:nvPicPr>
+              <p:cNvPr id="25" name="圖片 24">
+                <a:extLst>
+                  <a:ext uri="{FF2B5EF4-FFF2-40B4-BE49-F238E27FC236}">
+                    <a16:creationId xmlns:a16="http://schemas.microsoft.com/office/drawing/2014/main" id="{F7D7B318-DCEF-A243-BC24-E838A56F3734}"/>
+                  </a:ext>
+                </a:extLst>
+              </p:cNvPr>
+              <p:cNvPicPr>
+                <a:picLocks noChangeAspect="1"/>
+              </p:cNvPicPr>
+              <p:nvPr/>
+            </p:nvPicPr>
+            <p:blipFill>
+              <a:blip r:embed="rId5"/>
+              <a:stretch>
+                <a:fillRect/>
+              </a:stretch>
+            </p:blipFill>
+            <p:spPr>
+              <a:xfrm>
+                <a:off x="7641368" y="1490438"/>
+                <a:ext cx="324000" cy="313875"/>
+              </a:xfrm>
+              <a:prstGeom prst="rect">
+                <a:avLst/>
+              </a:prstGeom>
+            </p:spPr>
+          </p:pic>
+          <p:pic>
+            <p:nvPicPr>
+              <p:cNvPr id="30" name="圖片 29">
+                <a:extLst>
+                  <a:ext uri="{FF2B5EF4-FFF2-40B4-BE49-F238E27FC236}">
+                    <a16:creationId xmlns:a16="http://schemas.microsoft.com/office/drawing/2014/main" id="{A430F302-6FA0-844A-BC79-37B258E1E00D}"/>
+                  </a:ext>
+                </a:extLst>
+              </p:cNvPr>
+              <p:cNvPicPr>
+                <a:picLocks noChangeAspect="1"/>
+              </p:cNvPicPr>
+              <p:nvPr/>
+            </p:nvPicPr>
+            <p:blipFill>
+              <a:blip r:embed="rId5"/>
+              <a:stretch>
+                <a:fillRect/>
+              </a:stretch>
+            </p:blipFill>
+            <p:spPr>
+              <a:xfrm>
+                <a:off x="5649920" y="2853405"/>
+                <a:ext cx="324000" cy="313875"/>
+              </a:xfrm>
+              <a:prstGeom prst="rect">
+                <a:avLst/>
+              </a:prstGeom>
+            </p:spPr>
+          </p:pic>
+          <p:pic>
+            <p:nvPicPr>
+              <p:cNvPr id="31" name="圖片 30">
+                <a:extLst>
+                  <a:ext uri="{FF2B5EF4-FFF2-40B4-BE49-F238E27FC236}">
+                    <a16:creationId xmlns:a16="http://schemas.microsoft.com/office/drawing/2014/main" id="{13F00B00-370D-B844-A19E-12D6EC08025B}"/>
+                  </a:ext>
+                </a:extLst>
+              </p:cNvPr>
+              <p:cNvPicPr>
+                <a:picLocks noChangeAspect="1"/>
+              </p:cNvPicPr>
+              <p:nvPr/>
+            </p:nvPicPr>
+            <p:blipFill>
+              <a:blip r:embed="rId5"/>
+              <a:stretch>
+                <a:fillRect/>
+              </a:stretch>
+            </p:blipFill>
+            <p:spPr>
+              <a:xfrm>
+                <a:off x="6984330" y="3874603"/>
+                <a:ext cx="328764" cy="318491"/>
+              </a:xfrm>
+              <a:prstGeom prst="rect">
+                <a:avLst/>
+              </a:prstGeom>
+            </p:spPr>
+          </p:pic>
+          <p:pic>
+            <p:nvPicPr>
+              <p:cNvPr id="32" name="圖片 31">
+                <a:extLst>
+                  <a:ext uri="{FF2B5EF4-FFF2-40B4-BE49-F238E27FC236}">
+                    <a16:creationId xmlns:a16="http://schemas.microsoft.com/office/drawing/2014/main" id="{907C7036-CE69-9340-8000-E979659AF9A8}"/>
+                  </a:ext>
+                </a:extLst>
+              </p:cNvPr>
+              <p:cNvPicPr>
+                <a:picLocks/>
+              </p:cNvPicPr>
+              <p:nvPr/>
+            </p:nvPicPr>
+            <p:blipFill>
+              <a:blip r:embed="rId5"/>
+              <a:stretch>
+                <a:fillRect/>
+              </a:stretch>
+            </p:blipFill>
+            <p:spPr>
+              <a:xfrm>
+                <a:off x="8958538" y="4538286"/>
+                <a:ext cx="347204" cy="335497"/>
+              </a:xfrm>
+              <a:prstGeom prst="rect">
+                <a:avLst/>
+              </a:prstGeom>
+            </p:spPr>
+          </p:pic>
+          <p:pic>
+            <p:nvPicPr>
+              <p:cNvPr id="34" name="圖片 33">
+                <a:extLst>
+                  <a:ext uri="{FF2B5EF4-FFF2-40B4-BE49-F238E27FC236}">
+                    <a16:creationId xmlns:a16="http://schemas.microsoft.com/office/drawing/2014/main" id="{71EF10EA-A172-284F-B239-2DC66ACCA9F2}"/>
+                  </a:ext>
+                </a:extLst>
+              </p:cNvPr>
+              <p:cNvPicPr>
+                <a:picLocks noChangeAspect="1"/>
+              </p:cNvPicPr>
+              <p:nvPr/>
+            </p:nvPicPr>
+            <p:blipFill>
+              <a:blip r:embed="rId6"/>
+              <a:stretch>
+                <a:fillRect/>
+              </a:stretch>
+            </p:blipFill>
+            <p:spPr>
+              <a:xfrm>
+                <a:off x="8338744" y="2543164"/>
+                <a:ext cx="288000" cy="258207"/>
+              </a:xfrm>
+              <a:prstGeom prst="rect">
+                <a:avLst/>
+              </a:prstGeom>
+            </p:spPr>
+          </p:pic>
+          <p:pic>
+            <p:nvPicPr>
+              <p:cNvPr id="36" name="圖片 35">
+                <a:extLst>
+                  <a:ext uri="{FF2B5EF4-FFF2-40B4-BE49-F238E27FC236}">
+                    <a16:creationId xmlns:a16="http://schemas.microsoft.com/office/drawing/2014/main" id="{89505CE0-EF87-1B45-ACD7-1E2047C86AE2}"/>
+                  </a:ext>
+                </a:extLst>
+              </p:cNvPr>
+              <p:cNvPicPr>
+                <a:picLocks noChangeAspect="1"/>
+              </p:cNvPicPr>
+              <p:nvPr/>
+            </p:nvPicPr>
+            <p:blipFill>
+              <a:blip r:embed="rId7"/>
+              <a:stretch>
+                <a:fillRect/>
+              </a:stretch>
+            </p:blipFill>
+            <p:spPr>
+              <a:xfrm>
+                <a:off x="7353368" y="4901284"/>
+                <a:ext cx="288000" cy="309334"/>
+              </a:xfrm>
+              <a:prstGeom prst="rect">
+                <a:avLst/>
+              </a:prstGeom>
+            </p:spPr>
+          </p:pic>
+          <p:pic>
+            <p:nvPicPr>
+              <p:cNvPr id="38" name="圖片 37">
+                <a:extLst>
+                  <a:ext uri="{FF2B5EF4-FFF2-40B4-BE49-F238E27FC236}">
+                    <a16:creationId xmlns:a16="http://schemas.microsoft.com/office/drawing/2014/main" id="{78AE461E-B02A-454B-ACA6-EA3627BCA358}"/>
+                  </a:ext>
+                </a:extLst>
+              </p:cNvPr>
+              <p:cNvPicPr>
+                <a:picLocks noChangeAspect="1"/>
+              </p:cNvPicPr>
+              <p:nvPr/>
+            </p:nvPicPr>
+            <p:blipFill>
+              <a:blip r:embed="rId8"/>
+              <a:stretch>
+                <a:fillRect/>
+              </a:stretch>
+            </p:blipFill>
+            <p:spPr>
+              <a:xfrm>
+                <a:off x="7019828" y="3201755"/>
+                <a:ext cx="267428" cy="288000"/>
+              </a:xfrm>
+              <a:prstGeom prst="rect">
+                <a:avLst/>
+              </a:prstGeom>
+            </p:spPr>
+          </p:pic>
+          <p:pic>
+            <p:nvPicPr>
+              <p:cNvPr id="40" name="圖片 39">
+                <a:extLst>
+                  <a:ext uri="{FF2B5EF4-FFF2-40B4-BE49-F238E27FC236}">
+                    <a16:creationId xmlns:a16="http://schemas.microsoft.com/office/drawing/2014/main" id="{B4B382F4-913E-DF47-9C9B-BC54B517B429}"/>
+                  </a:ext>
+                </a:extLst>
+              </p:cNvPr>
+              <p:cNvPicPr>
+                <a:picLocks noChangeAspect="1"/>
+              </p:cNvPicPr>
+              <p:nvPr/>
+            </p:nvPicPr>
+            <p:blipFill>
+              <a:blip r:embed="rId9"/>
+              <a:stretch>
+                <a:fillRect/>
+              </a:stretch>
+            </p:blipFill>
+            <p:spPr>
+              <a:xfrm>
+                <a:off x="8014801" y="3537858"/>
+                <a:ext cx="252000" cy="308000"/>
+              </a:xfrm>
+              <a:prstGeom prst="rect">
+                <a:avLst/>
+              </a:prstGeom>
+            </p:spPr>
+          </p:pic>
+        </p:grpSp>
+        <p:sp>
+          <p:nvSpPr>
+            <p:cNvPr id="42" name="文字方塊 41">
+              <a:extLst>
+                <a:ext uri="{FF2B5EF4-FFF2-40B4-BE49-F238E27FC236}">
+                  <a16:creationId xmlns:a16="http://schemas.microsoft.com/office/drawing/2014/main" id="{007CFB22-E161-0C4A-BBF4-1B07C78C1873}"/>
+                </a:ext>
+              </a:extLst>
+            </p:cNvPr>
+            <p:cNvSpPr txBox="1"/>
+            <p:nvPr/>
+          </p:nvSpPr>
+          <p:spPr>
+            <a:xfrm>
+              <a:off x="3298372" y="974700"/>
+              <a:ext cx="1407450" cy="954107"/>
+            </a:xfrm>
+            <a:prstGeom prst="rect">
+              <a:avLst/>
+            </a:prstGeom>
+            <a:solidFill>
+              <a:schemeClr val="tx1"/>
+            </a:solidFill>
+          </p:spPr>
+          <p:txBody>
+            <a:bodyPr wrap="square" rtlCol="0">
+              <a:spAutoFit/>
+            </a:bodyPr>
+            <a:lstStyle/>
+            <a:p>
+              <a:pPr algn="ctr">
+                <a:tabLst>
+                  <a:tab pos="487363" algn="l"/>
+                </a:tabLst>
+              </a:pPr>
+              <a:r>
+                <a:rPr kumimoji="1" lang="en-US" altLang="zh-CN" sz="2800" dirty="0">
+                  <a:solidFill>
+                    <a:srgbClr val="00B0F0"/>
+                  </a:solidFill>
+                </a:rPr>
+                <a:t>Current Score: 0</a:t>
+              </a:r>
+              <a:endParaRPr kumimoji="1" lang="zh-TW" altLang="en-US" sz="2800" dirty="0">
+                <a:solidFill>
+                  <a:srgbClr val="00B0F0"/>
+                </a:solidFill>
+              </a:endParaRPr>
+            </a:p>
+          </p:txBody>
+        </p:sp>
+      </p:grpSp>
+      <p:sp>
+        <p:nvSpPr>
+          <p:cNvPr id="55" name="文字方塊 54">
+            <a:extLst>
+              <a:ext uri="{FF2B5EF4-FFF2-40B4-BE49-F238E27FC236}">
+                <a16:creationId xmlns:a16="http://schemas.microsoft.com/office/drawing/2014/main" id="{B7975875-8E22-8546-A86B-2C511259894F}"/>
+              </a:ext>
+            </a:extLst>
+          </p:cNvPr>
+          <p:cNvSpPr txBox="1"/>
+          <p:nvPr/>
+        </p:nvSpPr>
+        <p:spPr>
+          <a:xfrm>
+            <a:off x="2137976" y="36168"/>
+            <a:ext cx="7801153" cy="1323439"/>
+          </a:xfrm>
+          <a:prstGeom prst="rect">
+            <a:avLst/>
+          </a:prstGeom>
+          <a:noFill/>
+        </p:spPr>
+        <p:txBody>
+          <a:bodyPr wrap="square" rtlCol="0">
+            <a:spAutoFit/>
+          </a:bodyPr>
+          <a:lstStyle/>
+          <a:p>
+            <a:r>
+              <a:rPr kumimoji="1" lang="en-US" altLang="zh-TW" sz="4000" dirty="0"/>
+              <a:t>“Each step costs 1 point, </a:t>
+            </a:r>
+          </a:p>
+          <a:p>
+            <a:r>
+              <a:rPr kumimoji="1" lang="en-US" altLang="zh-TW" sz="4000" dirty="0"/>
+              <a:t>which target do you want to reach?”</a:t>
+            </a:r>
+            <a:endParaRPr kumimoji="1" lang="zh-TW" altLang="en-US" sz="4000" dirty="0"/>
+          </a:p>
+        </p:txBody>
+      </p:sp>
+    </p:spTree>
+    <p:extLst>
+      <p:ext uri="{BB962C8B-B14F-4D97-AF65-F5344CB8AC3E}">
+        <p14:creationId xmlns:p14="http://schemas.microsoft.com/office/powerpoint/2010/main" val="259719821"/>
+      </p:ext>
+    </p:extLst>
+  </p:cSld>
+  <p:clrMapOvr>
+    <a:masterClrMapping/>
+  </p:clrMapOvr>
+</p:sld>
+</file>
+
+<file path=ppt/slides/slide2.xml><?xml version="1.0" encoding="utf-8"?>
+<p:sld xmlns:a="http://schemas.openxmlformats.org/drawingml/2006/main" xmlns:r="http://schemas.openxmlformats.org/officeDocument/2006/relationships" xmlns:p="http://schemas.openxmlformats.org/presentationml/2006/main">
+  <p:cSld>
+    <p:spTree>
+      <p:nvGrpSpPr>
+        <p:cNvPr id="1" name=""/>
+        <p:cNvGrpSpPr/>
+        <p:nvPr/>
+      </p:nvGrpSpPr>
+      <p:grpSpPr>
+        <a:xfrm>
+          <a:off x="0" y="0"/>
+          <a:ext cx="0" cy="0"/>
+          <a:chOff x="0" y="0"/>
+          <a:chExt cx="0" cy="0"/>
+        </a:xfrm>
+      </p:grpSpPr>
+      <p:grpSp>
+        <p:nvGrpSpPr>
+          <p:cNvPr id="4" name="Group 3">
+            <a:extLst>
+              <a:ext uri="{FF2B5EF4-FFF2-40B4-BE49-F238E27FC236}">
+                <a16:creationId xmlns:a16="http://schemas.microsoft.com/office/drawing/2014/main" id="{7969FE1E-2130-4271-A77F-CAE75C8A6664}"/>
+              </a:ext>
+            </a:extLst>
+          </p:cNvPr>
+          <p:cNvGrpSpPr/>
+          <p:nvPr/>
+        </p:nvGrpSpPr>
+        <p:grpSpPr>
+          <a:xfrm>
+            <a:off x="217716" y="250371"/>
+            <a:ext cx="8719456" cy="6400800"/>
+            <a:chOff x="217716" y="250371"/>
+            <a:chExt cx="8719456" cy="6400800"/>
+          </a:xfrm>
+        </p:grpSpPr>
+        <p:grpSp>
+          <p:nvGrpSpPr>
+            <p:cNvPr id="44" name="群組 43">
+              <a:extLst>
+                <a:ext uri="{FF2B5EF4-FFF2-40B4-BE49-F238E27FC236}">
+                  <a16:creationId xmlns:a16="http://schemas.microsoft.com/office/drawing/2014/main" id="{8B56271E-0134-DD43-9BA3-88C48F40C473}"/>
+                </a:ext>
+              </a:extLst>
+            </p:cNvPr>
+            <p:cNvGrpSpPr/>
+            <p:nvPr/>
+          </p:nvGrpSpPr>
+          <p:grpSpPr>
+            <a:xfrm>
+              <a:off x="217716" y="250371"/>
+              <a:ext cx="8719456" cy="6400800"/>
+              <a:chOff x="3145971" y="859971"/>
+              <a:chExt cx="7239000" cy="5159827"/>
+            </a:xfrm>
+          </p:grpSpPr>
+          <p:grpSp>
+            <p:nvGrpSpPr>
+              <p:cNvPr id="41" name="群組 40">
+                <a:extLst>
+                  <a:ext uri="{FF2B5EF4-FFF2-40B4-BE49-F238E27FC236}">
+                    <a16:creationId xmlns:a16="http://schemas.microsoft.com/office/drawing/2014/main" id="{7CD27707-320D-CF49-9C63-82D1937F501D}"/>
+                  </a:ext>
+                </a:extLst>
+              </p:cNvPr>
+              <p:cNvGrpSpPr/>
+              <p:nvPr/>
+            </p:nvGrpSpPr>
+            <p:grpSpPr>
+              <a:xfrm>
+                <a:off x="3145971" y="859971"/>
+                <a:ext cx="7239000" cy="5159827"/>
+                <a:chOff x="3145971" y="859971"/>
+                <a:chExt cx="7239000" cy="5159827"/>
+              </a:xfrm>
+            </p:grpSpPr>
+            <p:grpSp>
+              <p:nvGrpSpPr>
+                <p:cNvPr id="7" name="群組 6">
+                  <a:extLst>
+                    <a:ext uri="{FF2B5EF4-FFF2-40B4-BE49-F238E27FC236}">
+                      <a16:creationId xmlns:a16="http://schemas.microsoft.com/office/drawing/2014/main" id="{46E0B445-8B20-5B41-A740-8289361E0A07}"/>
+                    </a:ext>
+                  </a:extLst>
+                </p:cNvPr>
+                <p:cNvGrpSpPr/>
+                <p:nvPr/>
+              </p:nvGrpSpPr>
+              <p:grpSpPr>
+                <a:xfrm>
+                  <a:off x="3145971" y="859971"/>
+                  <a:ext cx="7239000" cy="5159827"/>
+                  <a:chOff x="3524772" y="2242456"/>
+                  <a:chExt cx="6581843" cy="4615543"/>
+                </a:xfrm>
+              </p:grpSpPr>
+              <p:pic>
+                <p:nvPicPr>
+                  <p:cNvPr id="5" name="圖片 4">
+                    <a:extLst>
+                      <a:ext uri="{FF2B5EF4-FFF2-40B4-BE49-F238E27FC236}">
+                        <a16:creationId xmlns:a16="http://schemas.microsoft.com/office/drawing/2014/main" id="{BCCFB49B-2662-9646-AB86-3AE10AA454C7}"/>
+                      </a:ext>
+                    </a:extLst>
+                  </p:cNvPr>
+                  <p:cNvPicPr>
+                    <a:picLocks noChangeAspect="1"/>
+                  </p:cNvPicPr>
+                  <p:nvPr/>
+                </p:nvPicPr>
+                <p:blipFill rotWithShape="1">
+                  <a:blip r:embed="rId2"/>
+                  <a:srcRect l="17945" t="32698"/>
+                  <a:stretch/>
+                </p:blipFill>
+                <p:spPr>
+                  <a:xfrm>
+                    <a:off x="3524772" y="2242456"/>
+                    <a:ext cx="6581843" cy="4615543"/>
+                  </a:xfrm>
+                  <a:prstGeom prst="rect">
+                    <a:avLst/>
+                  </a:prstGeom>
+                </p:spPr>
+              </p:pic>
+              <p:sp>
+                <p:nvSpPr>
+                  <p:cNvPr id="14" name="文字方塊 13">
+                    <a:extLst>
+                      <a:ext uri="{FF2B5EF4-FFF2-40B4-BE49-F238E27FC236}">
+                        <a16:creationId xmlns:a16="http://schemas.microsoft.com/office/drawing/2014/main" id="{7C498FC1-7579-7F48-AB47-F68D7B45CDA2}"/>
+                      </a:ext>
+                    </a:extLst>
+                  </p:cNvPr>
+                  <p:cNvSpPr txBox="1"/>
+                  <p:nvPr/>
+                </p:nvSpPr>
+                <p:spPr>
+                  <a:xfrm>
+                    <a:off x="3980162" y="3189162"/>
+                    <a:ext cx="1190552" cy="430887"/>
+                  </a:xfrm>
+                  <a:prstGeom prst="rect">
+                    <a:avLst/>
+                  </a:prstGeom>
+                  <a:solidFill>
+                    <a:schemeClr val="tx1"/>
+                  </a:solidFill>
+                </p:spPr>
+                <p:txBody>
+                  <a:bodyPr wrap="square" rtlCol="0">
+                    <a:spAutoFit/>
+                  </a:bodyPr>
+                  <a:lstStyle/>
+                  <a:p>
+                    <a:pPr>
+                      <a:tabLst>
+                        <a:tab pos="487363" algn="l"/>
+                      </a:tabLst>
+                    </a:pPr>
+                    <a:r>
+                      <a:rPr kumimoji="1" lang="zh-CN" altLang="en-US" sz="2200" dirty="0">
+                        <a:solidFill>
+                          <a:srgbClr val="FF3AA6"/>
+                        </a:solidFill>
+                      </a:rPr>
+                      <a:t>小明</a:t>
+                    </a:r>
+                    <a:r>
+                      <a:rPr kumimoji="1" lang="en-US" altLang="zh-CN" sz="2200" dirty="0">
+                        <a:solidFill>
+                          <a:srgbClr val="FF3AA6"/>
+                        </a:solidFill>
+                      </a:rPr>
+                      <a:t>: 23</a:t>
+                    </a:r>
+                    <a:endParaRPr kumimoji="1" lang="zh-TW" altLang="en-US" sz="2200" dirty="0">
+                      <a:solidFill>
+                        <a:srgbClr val="FF3AA6"/>
+                      </a:solidFill>
+                    </a:endParaRPr>
+                  </a:p>
+                </p:txBody>
+              </p:sp>
+              <p:sp>
+                <p:nvSpPr>
+                  <p:cNvPr id="18" name="文字方塊 17">
+                    <a:extLst>
+                      <a:ext uri="{FF2B5EF4-FFF2-40B4-BE49-F238E27FC236}">
+                        <a16:creationId xmlns:a16="http://schemas.microsoft.com/office/drawing/2014/main" id="{EFF2BBB2-2E5B-2844-B10A-6388B73A70B4}"/>
+                      </a:ext>
+                    </a:extLst>
+                  </p:cNvPr>
+                  <p:cNvSpPr txBox="1"/>
+                  <p:nvPr/>
+                </p:nvSpPr>
+                <p:spPr>
+                  <a:xfrm>
+                    <a:off x="3969276" y="4723648"/>
+                    <a:ext cx="1201438" cy="430887"/>
+                  </a:xfrm>
+                  <a:prstGeom prst="rect">
+                    <a:avLst/>
+                  </a:prstGeom>
+                  <a:solidFill>
+                    <a:schemeClr val="tx1"/>
+                  </a:solidFill>
+                </p:spPr>
+                <p:txBody>
+                  <a:bodyPr wrap="square" rtlCol="0">
+                    <a:spAutoFit/>
+                  </a:bodyPr>
+                  <a:lstStyle/>
+                  <a:p>
+                    <a:pPr>
+                      <a:tabLst>
+                        <a:tab pos="487363" algn="l"/>
+                      </a:tabLst>
+                    </a:pPr>
+                    <a:r>
+                      <a:rPr kumimoji="1" lang="zh-CN" altLang="en-US" sz="2200" dirty="0">
+                        <a:solidFill>
+                          <a:schemeClr val="accent6">
+                            <a:lumMod val="60000"/>
+                            <a:lumOff val="40000"/>
+                          </a:schemeClr>
+                        </a:solidFill>
+                      </a:rPr>
+                      <a:t>小樹</a:t>
+                    </a:r>
+                    <a:r>
+                      <a:rPr kumimoji="1" lang="en-US" altLang="zh-CN" sz="2200" dirty="0">
+                        <a:solidFill>
+                          <a:schemeClr val="accent6">
+                            <a:lumMod val="60000"/>
+                            <a:lumOff val="40000"/>
+                          </a:schemeClr>
+                        </a:solidFill>
+                      </a:rPr>
+                      <a:t>: 18</a:t>
+                    </a:r>
+                    <a:endParaRPr kumimoji="1" lang="zh-TW" altLang="en-US" sz="2200" dirty="0">
+                      <a:solidFill>
+                        <a:schemeClr val="accent6">
+                          <a:lumMod val="60000"/>
+                          <a:lumOff val="40000"/>
+                        </a:schemeClr>
+                      </a:solidFill>
+                    </a:endParaRPr>
+                  </a:p>
+                </p:txBody>
+              </p:sp>
+            </p:grpSp>
+            <p:pic>
+              <p:nvPicPr>
+                <p:cNvPr id="23" name="圖片 22">
+                  <a:extLst>
+                    <a:ext uri="{FF2B5EF4-FFF2-40B4-BE49-F238E27FC236}">
+                      <a16:creationId xmlns:a16="http://schemas.microsoft.com/office/drawing/2014/main" id="{E8B12BD8-0C54-C245-B299-FD94AFDA6C82}"/>
+                    </a:ext>
+                  </a:extLst>
+                </p:cNvPr>
+                <p:cNvPicPr>
+                  <a:picLocks noChangeAspect="1"/>
+                </p:cNvPicPr>
+                <p:nvPr/>
+              </p:nvPicPr>
+              <p:blipFill>
+                <a:blip r:embed="rId3"/>
+                <a:stretch>
+                  <a:fillRect/>
+                </a:stretch>
+              </p:blipFill>
+              <p:spPr>
+                <a:xfrm>
+                  <a:off x="7317368" y="3191179"/>
+                  <a:ext cx="324000" cy="334125"/>
+                </a:xfrm>
+                <a:prstGeom prst="rect">
+                  <a:avLst/>
+                </a:prstGeom>
+              </p:spPr>
+            </p:pic>
+            <p:pic>
+              <p:nvPicPr>
+                <p:cNvPr id="25" name="圖片 24">
+                  <a:extLst>
+                    <a:ext uri="{FF2B5EF4-FFF2-40B4-BE49-F238E27FC236}">
+                      <a16:creationId xmlns:a16="http://schemas.microsoft.com/office/drawing/2014/main" id="{F7D7B318-DCEF-A243-BC24-E838A56F3734}"/>
+                    </a:ext>
+                  </a:extLst>
+                </p:cNvPr>
+                <p:cNvPicPr>
+                  <a:picLocks noChangeAspect="1"/>
+                </p:cNvPicPr>
+                <p:nvPr/>
+              </p:nvPicPr>
+              <p:blipFill>
+                <a:blip r:embed="rId4"/>
+                <a:stretch>
+                  <a:fillRect/>
+                </a:stretch>
+              </p:blipFill>
+              <p:spPr>
+                <a:xfrm>
+                  <a:off x="7641368" y="1490438"/>
+                  <a:ext cx="324000" cy="313875"/>
+                </a:xfrm>
+                <a:prstGeom prst="rect">
+                  <a:avLst/>
+                </a:prstGeom>
+              </p:spPr>
+            </p:pic>
+            <p:pic>
+              <p:nvPicPr>
+                <p:cNvPr id="30" name="圖片 29">
+                  <a:extLst>
+                    <a:ext uri="{FF2B5EF4-FFF2-40B4-BE49-F238E27FC236}">
+                      <a16:creationId xmlns:a16="http://schemas.microsoft.com/office/drawing/2014/main" id="{A430F302-6FA0-844A-BC79-37B258E1E00D}"/>
+                    </a:ext>
+                  </a:extLst>
+                </p:cNvPr>
+                <p:cNvPicPr>
+                  <a:picLocks noChangeAspect="1"/>
+                </p:cNvPicPr>
+                <p:nvPr/>
+              </p:nvPicPr>
+              <p:blipFill>
+                <a:blip r:embed="rId4"/>
+                <a:stretch>
+                  <a:fillRect/>
+                </a:stretch>
+              </p:blipFill>
+              <p:spPr>
+                <a:xfrm>
+                  <a:off x="5649920" y="2853405"/>
+                  <a:ext cx="324000" cy="313875"/>
+                </a:xfrm>
+                <a:prstGeom prst="rect">
+                  <a:avLst/>
+                </a:prstGeom>
+              </p:spPr>
+            </p:pic>
+            <p:pic>
+              <p:nvPicPr>
+                <p:cNvPr id="31" name="圖片 30">
+                  <a:extLst>
+                    <a:ext uri="{FF2B5EF4-FFF2-40B4-BE49-F238E27FC236}">
+                      <a16:creationId xmlns:a16="http://schemas.microsoft.com/office/drawing/2014/main" id="{13F00B00-370D-B844-A19E-12D6EC08025B}"/>
+                    </a:ext>
+                  </a:extLst>
+                </p:cNvPr>
+                <p:cNvPicPr>
+                  <a:picLocks noChangeAspect="1"/>
+                </p:cNvPicPr>
+                <p:nvPr/>
+              </p:nvPicPr>
+              <p:blipFill>
+                <a:blip r:embed="rId4"/>
+                <a:stretch>
+                  <a:fillRect/>
+                </a:stretch>
+              </p:blipFill>
+              <p:spPr>
+                <a:xfrm>
+                  <a:off x="6984330" y="3874603"/>
+                  <a:ext cx="328764" cy="318491"/>
+                </a:xfrm>
+                <a:prstGeom prst="rect">
+                  <a:avLst/>
+                </a:prstGeom>
+              </p:spPr>
+            </p:pic>
+            <p:pic>
+              <p:nvPicPr>
+                <p:cNvPr id="32" name="圖片 31">
+                  <a:extLst>
+                    <a:ext uri="{FF2B5EF4-FFF2-40B4-BE49-F238E27FC236}">
+                      <a16:creationId xmlns:a16="http://schemas.microsoft.com/office/drawing/2014/main" id="{907C7036-CE69-9340-8000-E979659AF9A8}"/>
+                    </a:ext>
+                  </a:extLst>
+                </p:cNvPr>
+                <p:cNvPicPr>
+                  <a:picLocks noChangeAspect="1"/>
+                </p:cNvPicPr>
+                <p:nvPr/>
+              </p:nvPicPr>
+              <p:blipFill>
+                <a:blip r:embed="rId4"/>
+                <a:stretch>
+                  <a:fillRect/>
+                </a:stretch>
+              </p:blipFill>
+              <p:spPr>
+                <a:xfrm>
+                  <a:off x="8958539" y="4549324"/>
+                  <a:ext cx="324000" cy="313875"/>
+                </a:xfrm>
+                <a:prstGeom prst="rect">
+                  <a:avLst/>
+                </a:prstGeom>
+              </p:spPr>
+            </p:pic>
+            <p:pic>
+              <p:nvPicPr>
+                <p:cNvPr id="34" name="圖片 33">
+                  <a:extLst>
+                    <a:ext uri="{FF2B5EF4-FFF2-40B4-BE49-F238E27FC236}">
+                      <a16:creationId xmlns:a16="http://schemas.microsoft.com/office/drawing/2014/main" id="{71EF10EA-A172-284F-B239-2DC66ACCA9F2}"/>
+                    </a:ext>
+                  </a:extLst>
+                </p:cNvPr>
+                <p:cNvPicPr>
+                  <a:picLocks noChangeAspect="1"/>
+                </p:cNvPicPr>
+                <p:nvPr/>
+              </p:nvPicPr>
+              <p:blipFill>
+                <a:blip r:embed="rId5"/>
+                <a:stretch>
+                  <a:fillRect/>
+                </a:stretch>
+              </p:blipFill>
+              <p:spPr>
+                <a:xfrm>
+                  <a:off x="8338744" y="2543164"/>
+                  <a:ext cx="288000" cy="258207"/>
+                </a:xfrm>
+                <a:prstGeom prst="rect">
+                  <a:avLst/>
+                </a:prstGeom>
+              </p:spPr>
+            </p:pic>
+            <p:pic>
+              <p:nvPicPr>
+                <p:cNvPr id="36" name="圖片 35">
+                  <a:extLst>
+                    <a:ext uri="{FF2B5EF4-FFF2-40B4-BE49-F238E27FC236}">
+                      <a16:creationId xmlns:a16="http://schemas.microsoft.com/office/drawing/2014/main" id="{89505CE0-EF87-1B45-ACD7-1E2047C86AE2}"/>
+                    </a:ext>
+                  </a:extLst>
+                </p:cNvPr>
+                <p:cNvPicPr>
+                  <a:picLocks noChangeAspect="1"/>
+                </p:cNvPicPr>
+                <p:nvPr/>
+              </p:nvPicPr>
+              <p:blipFill>
+                <a:blip r:embed="rId6"/>
+                <a:stretch>
+                  <a:fillRect/>
+                </a:stretch>
+              </p:blipFill>
+              <p:spPr>
+                <a:xfrm>
+                  <a:off x="7353368" y="4901284"/>
+                  <a:ext cx="288000" cy="309334"/>
+                </a:xfrm>
+                <a:prstGeom prst="rect">
+                  <a:avLst/>
+                </a:prstGeom>
+              </p:spPr>
+            </p:pic>
+            <p:pic>
+              <p:nvPicPr>
+                <p:cNvPr id="38" name="圖片 37">
+                  <a:extLst>
+                    <a:ext uri="{FF2B5EF4-FFF2-40B4-BE49-F238E27FC236}">
+                      <a16:creationId xmlns:a16="http://schemas.microsoft.com/office/drawing/2014/main" id="{78AE461E-B02A-454B-ACA6-EA3627BCA358}"/>
+                    </a:ext>
+                  </a:extLst>
+                </p:cNvPr>
+                <p:cNvPicPr>
+                  <a:picLocks noChangeAspect="1"/>
+                </p:cNvPicPr>
+                <p:nvPr/>
+              </p:nvPicPr>
+              <p:blipFill>
+                <a:blip r:embed="rId7"/>
+                <a:stretch>
+                  <a:fillRect/>
+                </a:stretch>
+              </p:blipFill>
+              <p:spPr>
+                <a:xfrm>
+                  <a:off x="7019828" y="3201755"/>
+                  <a:ext cx="267428" cy="288000"/>
+                </a:xfrm>
+                <a:prstGeom prst="rect">
+                  <a:avLst/>
+                </a:prstGeom>
+              </p:spPr>
+            </p:pic>
+            <p:pic>
+              <p:nvPicPr>
+                <p:cNvPr id="40" name="圖片 39">
+                  <a:extLst>
+                    <a:ext uri="{FF2B5EF4-FFF2-40B4-BE49-F238E27FC236}">
+                      <a16:creationId xmlns:a16="http://schemas.microsoft.com/office/drawing/2014/main" id="{B4B382F4-913E-DF47-9C9B-BC54B517B429}"/>
+                    </a:ext>
+                  </a:extLst>
+                </p:cNvPr>
+                <p:cNvPicPr>
+                  <a:picLocks noChangeAspect="1"/>
+                </p:cNvPicPr>
+                <p:nvPr/>
+              </p:nvPicPr>
+              <p:blipFill>
+                <a:blip r:embed="rId8"/>
+                <a:stretch>
+                  <a:fillRect/>
+                </a:stretch>
+              </p:blipFill>
+              <p:spPr>
+                <a:xfrm>
+                  <a:off x="8014801" y="3537858"/>
+                  <a:ext cx="252000" cy="308000"/>
+                </a:xfrm>
+                <a:prstGeom prst="rect">
+                  <a:avLst/>
+                </a:prstGeom>
+              </p:spPr>
+            </p:pic>
+          </p:grpSp>
+          <p:sp>
+            <p:nvSpPr>
+              <p:cNvPr id="42" name="文字方塊 41">
+                <a:extLst>
+                  <a:ext uri="{FF2B5EF4-FFF2-40B4-BE49-F238E27FC236}">
+                    <a16:creationId xmlns:a16="http://schemas.microsoft.com/office/drawing/2014/main" id="{007CFB22-E161-0C4A-BBF4-1B07C78C1873}"/>
+                  </a:ext>
+                </a:extLst>
+              </p:cNvPr>
+              <p:cNvSpPr txBox="1"/>
+              <p:nvPr/>
+            </p:nvSpPr>
+            <p:spPr>
+              <a:xfrm>
+                <a:off x="3298372" y="974700"/>
+                <a:ext cx="1741686" cy="769127"/>
+              </a:xfrm>
+              <a:prstGeom prst="rect">
+                <a:avLst/>
+              </a:prstGeom>
+              <a:solidFill>
+                <a:schemeClr val="tx1"/>
+              </a:solidFill>
+            </p:spPr>
+            <p:txBody>
+              <a:bodyPr wrap="square" rtlCol="0">
+                <a:spAutoFit/>
+              </a:bodyPr>
+              <a:lstStyle/>
+              <a:p>
+                <a:pPr algn="ctr">
+                  <a:tabLst>
+                    <a:tab pos="487363" algn="l"/>
+                  </a:tabLst>
+                </a:pPr>
+                <a:r>
+                  <a:rPr kumimoji="1" lang="en-US" altLang="zh-CN" sz="2800" dirty="0">
+                    <a:solidFill>
+                      <a:srgbClr val="00B0F0"/>
+                    </a:solidFill>
+                  </a:rPr>
+                  <a:t>Final Score: 26-7=19</a:t>
+                </a:r>
+                <a:endParaRPr kumimoji="1" lang="zh-TW" altLang="en-US" sz="2800" dirty="0">
+                  <a:solidFill>
+                    <a:srgbClr val="00B0F0"/>
+                  </a:solidFill>
+                </a:endParaRPr>
+              </a:p>
+            </p:txBody>
+          </p:sp>
+        </p:grpSp>
+        <p:pic>
+          <p:nvPicPr>
+            <p:cNvPr id="3" name="圖片 2">
+              <a:extLst>
+                <a:ext uri="{FF2B5EF4-FFF2-40B4-BE49-F238E27FC236}">
+                  <a16:creationId xmlns:a16="http://schemas.microsoft.com/office/drawing/2014/main" id="{CD0221BF-DC57-8541-9893-316C67EB39EB}"/>
+                </a:ext>
+              </a:extLst>
+            </p:cNvPr>
+            <p:cNvPicPr>
+              <a:picLocks noChangeAspect="1"/>
+            </p:cNvPicPr>
+            <p:nvPr/>
+          </p:nvPicPr>
+          <p:blipFill>
+            <a:blip r:embed="rId9"/>
+            <a:stretch>
+              <a:fillRect/>
+            </a:stretch>
+          </p:blipFill>
+          <p:spPr>
+            <a:xfrm>
+              <a:off x="2398216" y="400776"/>
+              <a:ext cx="5844635" cy="6142662"/>
+            </a:xfrm>
+            <a:prstGeom prst="rect">
+              <a:avLst/>
+            </a:prstGeom>
+          </p:spPr>
+        </p:pic>
+        <p:sp>
+          <p:nvSpPr>
+            <p:cNvPr id="45" name="向右箭號 44">
+              <a:extLst>
+                <a:ext uri="{FF2B5EF4-FFF2-40B4-BE49-F238E27FC236}">
+                  <a16:creationId xmlns:a16="http://schemas.microsoft.com/office/drawing/2014/main" id="{7BE80E27-A79C-6C48-9C4A-1040610D761F}"/>
+                </a:ext>
+              </a:extLst>
+            </p:cNvPr>
+            <p:cNvSpPr/>
+            <p:nvPr/>
+          </p:nvSpPr>
+          <p:spPr>
+            <a:xfrm>
+              <a:off x="5573484" y="3222171"/>
+              <a:ext cx="304800" cy="338469"/>
+            </a:xfrm>
+            <a:prstGeom prst="rightArrow">
+              <a:avLst/>
+            </a:prstGeom>
+            <a:solidFill>
+              <a:srgbClr val="10E9F0"/>
+            </a:solidFill>
+            <a:ln>
+              <a:noFill/>
+            </a:ln>
+          </p:spPr>
+          <p:style>
+            <a:lnRef idx="2">
+              <a:schemeClr val="accent1">
+                <a:shade val="50000"/>
+              </a:schemeClr>
+            </a:lnRef>
+            <a:fillRef idx="1">
+              <a:schemeClr val="accent1"/>
+            </a:fillRef>
+            <a:effectRef idx="0">
+              <a:schemeClr val="accent1"/>
+            </a:effectRef>
+            <a:fontRef idx="minor">
+              <a:schemeClr val="lt1"/>
+            </a:fontRef>
+          </p:style>
+          <p:txBody>
+            <a:bodyPr rtlCol="0" anchor="ctr"/>
+            <a:lstStyle/>
+            <a:p>
+              <a:pPr algn="ctr"/>
+              <a:endParaRPr kumimoji="1" lang="zh-TW" altLang="en-US"/>
+            </a:p>
+          </p:txBody>
+        </p:sp>
+        <p:sp>
+          <p:nvSpPr>
+            <p:cNvPr id="47" name="向右箭號 46">
+              <a:extLst>
+                <a:ext uri="{FF2B5EF4-FFF2-40B4-BE49-F238E27FC236}">
+                  <a16:creationId xmlns:a16="http://schemas.microsoft.com/office/drawing/2014/main" id="{C6B9CC99-B83C-E045-89A6-CFD381A309A2}"/>
+                </a:ext>
+              </a:extLst>
+            </p:cNvPr>
+            <p:cNvSpPr/>
+            <p:nvPr/>
+          </p:nvSpPr>
+          <p:spPr>
+            <a:xfrm rot="5400000">
+              <a:off x="5693226" y="3494316"/>
+              <a:ext cx="304800" cy="338469"/>
+            </a:xfrm>
+            <a:prstGeom prst="rightArrow">
+              <a:avLst/>
+            </a:prstGeom>
+            <a:solidFill>
+              <a:srgbClr val="10E9F0"/>
+            </a:solidFill>
+            <a:ln>
+              <a:noFill/>
+            </a:ln>
+          </p:spPr>
+          <p:style>
+            <a:lnRef idx="2">
+              <a:schemeClr val="accent1">
+                <a:shade val="50000"/>
+              </a:schemeClr>
+            </a:lnRef>
+            <a:fillRef idx="1">
+              <a:schemeClr val="accent1"/>
+            </a:fillRef>
+            <a:effectRef idx="0">
+              <a:schemeClr val="accent1"/>
+            </a:effectRef>
+            <a:fontRef idx="minor">
+              <a:schemeClr val="lt1"/>
+            </a:fontRef>
+          </p:style>
+          <p:txBody>
+            <a:bodyPr rtlCol="0" anchor="ctr"/>
+            <a:lstStyle/>
+            <a:p>
+              <a:pPr algn="ctr"/>
+              <a:endParaRPr kumimoji="1" lang="zh-TW" altLang="en-US"/>
+            </a:p>
+          </p:txBody>
+        </p:sp>
+        <p:sp>
+          <p:nvSpPr>
+            <p:cNvPr id="49" name="向右箭號 48">
+              <a:extLst>
+                <a:ext uri="{FF2B5EF4-FFF2-40B4-BE49-F238E27FC236}">
+                  <a16:creationId xmlns:a16="http://schemas.microsoft.com/office/drawing/2014/main" id="{82DB7F11-4ACD-D647-9A76-6EE7CEC583FF}"/>
+                </a:ext>
+              </a:extLst>
+            </p:cNvPr>
+            <p:cNvSpPr/>
+            <p:nvPr/>
+          </p:nvSpPr>
+          <p:spPr>
+            <a:xfrm rot="5400000">
+              <a:off x="5693223" y="3886203"/>
+              <a:ext cx="304800" cy="338469"/>
+            </a:xfrm>
+            <a:prstGeom prst="rightArrow">
+              <a:avLst/>
+            </a:prstGeom>
+            <a:solidFill>
+              <a:srgbClr val="10E9F0"/>
+            </a:solidFill>
+            <a:ln>
+              <a:noFill/>
+            </a:ln>
+          </p:spPr>
+          <p:style>
+            <a:lnRef idx="2">
+              <a:schemeClr val="accent1">
+                <a:shade val="50000"/>
+              </a:schemeClr>
+            </a:lnRef>
+            <a:fillRef idx="1">
+              <a:schemeClr val="accent1"/>
+            </a:fillRef>
+            <a:effectRef idx="0">
+              <a:schemeClr val="accent1"/>
+            </a:effectRef>
+            <a:fontRef idx="minor">
+              <a:schemeClr val="lt1"/>
+            </a:fontRef>
+          </p:style>
+          <p:txBody>
+            <a:bodyPr rtlCol="0" anchor="ctr"/>
+            <a:lstStyle/>
+            <a:p>
+              <a:pPr algn="ctr"/>
+              <a:endParaRPr kumimoji="1" lang="zh-TW" altLang="en-US"/>
+            </a:p>
+          </p:txBody>
+        </p:sp>
+        <p:sp>
+          <p:nvSpPr>
+            <p:cNvPr id="50" name="向右箭號 49">
+              <a:extLst>
+                <a:ext uri="{FF2B5EF4-FFF2-40B4-BE49-F238E27FC236}">
+                  <a16:creationId xmlns:a16="http://schemas.microsoft.com/office/drawing/2014/main" id="{898B2944-8A51-1646-B7DF-C816765383D2}"/>
+                </a:ext>
+              </a:extLst>
+            </p:cNvPr>
+            <p:cNvSpPr/>
+            <p:nvPr/>
+          </p:nvSpPr>
+          <p:spPr>
+            <a:xfrm rot="5400000">
+              <a:off x="5693228" y="4317038"/>
+              <a:ext cx="304800" cy="338469"/>
+            </a:xfrm>
+            <a:prstGeom prst="rightArrow">
+              <a:avLst/>
+            </a:prstGeom>
+            <a:solidFill>
+              <a:srgbClr val="10E9F0"/>
+            </a:solidFill>
+            <a:ln>
+              <a:noFill/>
+            </a:ln>
+          </p:spPr>
+          <p:style>
+            <a:lnRef idx="2">
+              <a:schemeClr val="accent1">
+                <a:shade val="50000"/>
+              </a:schemeClr>
+            </a:lnRef>
+            <a:fillRef idx="1">
+              <a:schemeClr val="accent1"/>
+            </a:fillRef>
+            <a:effectRef idx="0">
+              <a:schemeClr val="accent1"/>
+            </a:effectRef>
+            <a:fontRef idx="minor">
+              <a:schemeClr val="lt1"/>
+            </a:fontRef>
+          </p:style>
+          <p:txBody>
+            <a:bodyPr rtlCol="0" anchor="ctr"/>
+            <a:lstStyle/>
+            <a:p>
+              <a:pPr algn="ctr"/>
+              <a:endParaRPr kumimoji="1" lang="zh-TW" altLang="en-US"/>
+            </a:p>
+          </p:txBody>
+        </p:sp>
+        <p:sp>
+          <p:nvSpPr>
+            <p:cNvPr id="51" name="向右箭號 50">
+              <a:extLst>
+                <a:ext uri="{FF2B5EF4-FFF2-40B4-BE49-F238E27FC236}">
+                  <a16:creationId xmlns:a16="http://schemas.microsoft.com/office/drawing/2014/main" id="{94F88719-0951-514B-AD34-98AF65CFB451}"/>
+                </a:ext>
+              </a:extLst>
+            </p:cNvPr>
+            <p:cNvSpPr/>
+            <p:nvPr/>
+          </p:nvSpPr>
+          <p:spPr>
+            <a:xfrm rot="5400000">
+              <a:off x="5704111" y="4730697"/>
+              <a:ext cx="304800" cy="338469"/>
+            </a:xfrm>
+            <a:prstGeom prst="rightArrow">
+              <a:avLst/>
+            </a:prstGeom>
+            <a:solidFill>
+              <a:srgbClr val="10E9F0"/>
+            </a:solidFill>
+            <a:ln>
+              <a:noFill/>
+            </a:ln>
+          </p:spPr>
+          <p:style>
+            <a:lnRef idx="2">
+              <a:schemeClr val="accent1">
+                <a:shade val="50000"/>
+              </a:schemeClr>
+            </a:lnRef>
+            <a:fillRef idx="1">
+              <a:schemeClr val="accent1"/>
+            </a:fillRef>
+            <a:effectRef idx="0">
+              <a:schemeClr val="accent1"/>
+            </a:effectRef>
+            <a:fontRef idx="minor">
+              <a:schemeClr val="lt1"/>
+            </a:fontRef>
+          </p:style>
+          <p:txBody>
+            <a:bodyPr rtlCol="0" anchor="ctr"/>
+            <a:lstStyle/>
+            <a:p>
+              <a:pPr algn="ctr"/>
+              <a:endParaRPr kumimoji="1" lang="zh-TW" altLang="en-US"/>
+            </a:p>
+          </p:txBody>
+        </p:sp>
+        <p:sp>
+          <p:nvSpPr>
+            <p:cNvPr id="52" name="向右箭號 51">
+              <a:extLst>
+                <a:ext uri="{FF2B5EF4-FFF2-40B4-BE49-F238E27FC236}">
+                  <a16:creationId xmlns:a16="http://schemas.microsoft.com/office/drawing/2014/main" id="{5AC73B4B-5899-F049-995D-0D8F601BF022}"/>
+                </a:ext>
+              </a:extLst>
+            </p:cNvPr>
+            <p:cNvSpPr/>
+            <p:nvPr/>
+          </p:nvSpPr>
+          <p:spPr>
+            <a:xfrm rot="5400000">
+              <a:off x="5714994" y="5144354"/>
+              <a:ext cx="304800" cy="338469"/>
+            </a:xfrm>
+            <a:prstGeom prst="rightArrow">
+              <a:avLst/>
+            </a:prstGeom>
+            <a:solidFill>
+              <a:srgbClr val="10E9F0"/>
+            </a:solidFill>
+            <a:ln>
+              <a:noFill/>
+            </a:ln>
+          </p:spPr>
+          <p:style>
+            <a:lnRef idx="2">
+              <a:schemeClr val="accent1">
+                <a:shade val="50000"/>
+              </a:schemeClr>
+            </a:lnRef>
+            <a:fillRef idx="1">
+              <a:schemeClr val="accent1"/>
+            </a:fillRef>
+            <a:effectRef idx="0">
+              <a:schemeClr val="accent1"/>
+            </a:effectRef>
+            <a:fontRef idx="minor">
+              <a:schemeClr val="lt1"/>
+            </a:fontRef>
+          </p:style>
+          <p:txBody>
+            <a:bodyPr rtlCol="0" anchor="ctr"/>
+            <a:lstStyle/>
+            <a:p>
+              <a:pPr algn="ctr"/>
+              <a:endParaRPr kumimoji="1" lang="zh-TW" altLang="en-US"/>
+            </a:p>
+          </p:txBody>
+        </p:sp>
+        <p:sp>
+          <p:nvSpPr>
+            <p:cNvPr id="53" name="向右箭號 52">
+              <a:extLst>
+                <a:ext uri="{FF2B5EF4-FFF2-40B4-BE49-F238E27FC236}">
+                  <a16:creationId xmlns:a16="http://schemas.microsoft.com/office/drawing/2014/main" id="{62661258-7B93-384F-9492-25B6A1F0980C}"/>
+                </a:ext>
+              </a:extLst>
+            </p:cNvPr>
+            <p:cNvSpPr/>
+            <p:nvPr/>
+          </p:nvSpPr>
+          <p:spPr>
+            <a:xfrm rot="10800000">
+              <a:off x="5551712" y="5301344"/>
+              <a:ext cx="304800" cy="338469"/>
+            </a:xfrm>
+            <a:prstGeom prst="rightArrow">
+              <a:avLst/>
+            </a:prstGeom>
+            <a:solidFill>
+              <a:srgbClr val="10E9F0"/>
+            </a:solidFill>
+            <a:ln>
+              <a:noFill/>
+            </a:ln>
+          </p:spPr>
+          <p:style>
+            <a:lnRef idx="2">
+              <a:schemeClr val="accent1">
+                <a:shade val="50000"/>
+              </a:schemeClr>
+            </a:lnRef>
+            <a:fillRef idx="1">
+              <a:schemeClr val="accent1"/>
+            </a:fillRef>
+            <a:effectRef idx="0">
+              <a:schemeClr val="accent1"/>
+            </a:effectRef>
+            <a:fontRef idx="minor">
+              <a:schemeClr val="lt1"/>
+            </a:fontRef>
+          </p:style>
+          <p:txBody>
+            <a:bodyPr rtlCol="0" anchor="ctr"/>
+            <a:lstStyle/>
+            <a:p>
+              <a:pPr algn="ctr"/>
+              <a:endParaRPr kumimoji="1" lang="zh-TW" altLang="en-US"/>
+            </a:p>
+          </p:txBody>
+        </p:sp>
+        <p:sp>
+          <p:nvSpPr>
+            <p:cNvPr id="2" name="TextBox 1">
+              <a:extLst>
+                <a:ext uri="{FF2B5EF4-FFF2-40B4-BE49-F238E27FC236}">
+                  <a16:creationId xmlns:a16="http://schemas.microsoft.com/office/drawing/2014/main" id="{E753BACE-D93F-4B7F-A744-134FD10230EF}"/>
+                </a:ext>
+              </a:extLst>
+            </p:cNvPr>
+            <p:cNvSpPr txBox="1"/>
+            <p:nvPr/>
+          </p:nvSpPr>
+          <p:spPr>
+            <a:xfrm>
+              <a:off x="806583" y="1589048"/>
+              <a:ext cx="1483805" cy="461665"/>
+            </a:xfrm>
+            <a:prstGeom prst="rect">
+              <a:avLst/>
+            </a:prstGeom>
+            <a:solidFill>
+              <a:schemeClr val="tx1"/>
+            </a:solidFill>
+          </p:spPr>
+          <p:txBody>
+            <a:bodyPr wrap="square" rtlCol="0">
+              <a:spAutoFit/>
+            </a:bodyPr>
+            <a:lstStyle/>
+            <a:p>
+              <a:r>
+                <a:rPr lang="en-US" sz="2400" b="1" dirty="0">
+                  <a:solidFill>
+                    <a:srgbClr val="F84576"/>
+                  </a:solidFill>
+                </a:rPr>
+                <a:t>Anne: 23</a:t>
+              </a:r>
+            </a:p>
+          </p:txBody>
+        </p:sp>
+        <p:sp>
+          <p:nvSpPr>
+            <p:cNvPr id="29" name="TextBox 28">
+              <a:extLst>
+                <a:ext uri="{FF2B5EF4-FFF2-40B4-BE49-F238E27FC236}">
+                  <a16:creationId xmlns:a16="http://schemas.microsoft.com/office/drawing/2014/main" id="{276DEE2E-CC16-4423-8272-7FA317338881}"/>
+                </a:ext>
+              </a:extLst>
+            </p:cNvPr>
+            <p:cNvSpPr txBox="1"/>
+            <p:nvPr/>
+          </p:nvSpPr>
+          <p:spPr>
+            <a:xfrm>
+              <a:off x="806583" y="2311212"/>
+              <a:ext cx="1591635" cy="461665"/>
+            </a:xfrm>
+            <a:prstGeom prst="rect">
+              <a:avLst/>
+            </a:prstGeom>
+            <a:solidFill>
+              <a:schemeClr val="tx1"/>
+            </a:solidFill>
+          </p:spPr>
+          <p:txBody>
+            <a:bodyPr wrap="square" rtlCol="0">
+              <a:spAutoFit/>
+            </a:bodyPr>
+            <a:lstStyle/>
+            <a:p>
+              <a:r>
+                <a:rPr lang="en-US" sz="2400" b="1" dirty="0">
+                  <a:solidFill>
+                    <a:srgbClr val="D6C688"/>
+                  </a:solidFill>
+                </a:rPr>
+                <a:t>Ben: 26</a:t>
+              </a:r>
+            </a:p>
+          </p:txBody>
+        </p:sp>
+        <p:sp>
+          <p:nvSpPr>
+            <p:cNvPr id="33" name="TextBox 32">
+              <a:extLst>
+                <a:ext uri="{FF2B5EF4-FFF2-40B4-BE49-F238E27FC236}">
+                  <a16:creationId xmlns:a16="http://schemas.microsoft.com/office/drawing/2014/main" id="{1F1FEB8F-6BD2-4CF1-A3A3-EE1083B7C4E8}"/>
+                </a:ext>
+              </a:extLst>
+            </p:cNvPr>
+            <p:cNvSpPr txBox="1"/>
+            <p:nvPr/>
+          </p:nvSpPr>
+          <p:spPr>
+            <a:xfrm>
+              <a:off x="806583" y="3037874"/>
+              <a:ext cx="1591635" cy="461665"/>
+            </a:xfrm>
+            <a:prstGeom prst="rect">
+              <a:avLst/>
+            </a:prstGeom>
+            <a:solidFill>
+              <a:schemeClr val="tx1"/>
+            </a:solidFill>
+          </p:spPr>
+          <p:txBody>
+            <a:bodyPr wrap="square" rtlCol="0">
+              <a:spAutoFit/>
+            </a:bodyPr>
+            <a:lstStyle/>
+            <a:p>
+              <a:r>
+                <a:rPr lang="en-US" sz="2400" b="1" dirty="0">
+                  <a:solidFill>
+                    <a:srgbClr val="B26A42"/>
+                  </a:solidFill>
+                </a:rPr>
+                <a:t>Matt: 18</a:t>
+              </a:r>
+            </a:p>
+          </p:txBody>
+        </p:sp>
+        <p:sp>
+          <p:nvSpPr>
+            <p:cNvPr id="35" name="TextBox 34">
+              <a:extLst>
+                <a:ext uri="{FF2B5EF4-FFF2-40B4-BE49-F238E27FC236}">
+                  <a16:creationId xmlns:a16="http://schemas.microsoft.com/office/drawing/2014/main" id="{D852391A-8C4E-4368-8038-B8F5DD753809}"/>
+                </a:ext>
+              </a:extLst>
+            </p:cNvPr>
+            <p:cNvSpPr txBox="1"/>
+            <p:nvPr/>
+          </p:nvSpPr>
+          <p:spPr>
+            <a:xfrm>
+              <a:off x="806583" y="3731653"/>
+              <a:ext cx="1483805" cy="461665"/>
+            </a:xfrm>
+            <a:prstGeom prst="rect">
+              <a:avLst/>
+            </a:prstGeom>
+            <a:solidFill>
+              <a:schemeClr val="tx1"/>
+            </a:solidFill>
+          </p:spPr>
+          <p:txBody>
+            <a:bodyPr wrap="square" rtlCol="0">
+              <a:spAutoFit/>
+            </a:bodyPr>
+            <a:lstStyle/>
+            <a:p>
+              <a:r>
+                <a:rPr lang="en-US" sz="2400" b="1" dirty="0">
+                  <a:solidFill>
+                    <a:srgbClr val="7DCEA0"/>
+                  </a:solidFill>
+                </a:rPr>
+                <a:t>Amy: 18</a:t>
+              </a:r>
+            </a:p>
+          </p:txBody>
+        </p:sp>
+      </p:grpSp>
+      <p:sp>
+        <p:nvSpPr>
+          <p:cNvPr id="6" name="Rectangle 5">
+            <a:extLst>
+              <a:ext uri="{FF2B5EF4-FFF2-40B4-BE49-F238E27FC236}">
+                <a16:creationId xmlns:a16="http://schemas.microsoft.com/office/drawing/2014/main" id="{A060F4C3-72B4-4547-ADEF-938EFAEE4913}"/>
+              </a:ext>
+            </a:extLst>
+          </p:cNvPr>
+          <p:cNvSpPr/>
+          <p:nvPr/>
+        </p:nvSpPr>
+        <p:spPr>
+          <a:xfrm>
+            <a:off x="7351776" y="4788692"/>
+            <a:ext cx="365760" cy="365760"/>
+          </a:xfrm>
+          <a:prstGeom prst="rect">
+            <a:avLst/>
+          </a:prstGeom>
+          <a:solidFill>
+            <a:schemeClr val="tx1"/>
+          </a:solidFill>
+          <a:ln>
+            <a:noFill/>
+          </a:ln>
+        </p:spPr>
+        <p:style>
+          <a:lnRef idx="2">
+            <a:schemeClr val="accent1">
+              <a:shade val="50000"/>
+            </a:schemeClr>
+          </a:lnRef>
+          <a:fillRef idx="1">
+            <a:schemeClr val="accent1"/>
+          </a:fillRef>
+          <a:effectRef idx="0">
+            <a:schemeClr val="accent1"/>
+          </a:effectRef>
+          <a:fontRef idx="minor">
+            <a:schemeClr val="lt1"/>
+          </a:fontRef>
+        </p:style>
+        <p:txBody>
+          <a:bodyPr rtlCol="0" anchor="ctr"/>
+          <a:lstStyle/>
+          <a:p>
+            <a:pPr algn="ctr"/>
+            <a:endParaRPr lang="en-US"/>
+          </a:p>
+        </p:txBody>
+      </p:sp>
+    </p:spTree>
+    <p:extLst>
+      <p:ext uri="{BB962C8B-B14F-4D97-AF65-F5344CB8AC3E}">
+        <p14:creationId xmlns:p14="http://schemas.microsoft.com/office/powerpoint/2010/main" val="1217765160"/>
+      </p:ext>
+    </p:extLst>
+  </p:cSld>
+  <p:clrMapOvr>
+    <a:masterClrMapping/>
+  </p:clrMapOvr>
+</p:sld>
+</file>
+
+<file path=ppt/slides/slide3.xml><?xml version="1.0" encoding="utf-8"?>
 <p:sld xmlns:a="http://schemas.openxmlformats.org/drawingml/2006/main" xmlns:r="http://schemas.openxmlformats.org/officeDocument/2006/relationships" xmlns:p="http://schemas.openxmlformats.org/presentationml/2006/main">
   <p:cSld>
     <p:spTree>
@@ -4491,7 +6490,7 @@
 </p:sld>
 </file>
 
-<file path=ppt/slides/slide2.xml><?xml version="1.0" encoding="utf-8"?>
+<file path=ppt/slides/slide4.xml><?xml version="1.0" encoding="utf-8"?>
 <p:sld xmlns:a="http://schemas.openxmlformats.org/drawingml/2006/main" xmlns:r="http://schemas.openxmlformats.org/officeDocument/2006/relationships" xmlns:p="http://schemas.openxmlformats.org/presentationml/2006/main" show="0">
   <p:cSld>
     <p:spTree>
@@ -4614,7 +6613,7 @@
 </p:sld>
 </file>
 
-<file path=ppt/slides/slide3.xml><?xml version="1.0" encoding="utf-8"?>
+<file path=ppt/slides/slide5.xml><?xml version="1.0" encoding="utf-8"?>
 <p:sld xmlns:a="http://schemas.openxmlformats.org/drawingml/2006/main" xmlns:r="http://schemas.openxmlformats.org/officeDocument/2006/relationships" xmlns:p="http://schemas.openxmlformats.org/presentationml/2006/main">
   <p:cSld>
     <p:spTree>
@@ -5254,7 +7253,7 @@
 </p:sld>
 </file>
 
-<file path=ppt/slides/slide4.xml><?xml version="1.0" encoding="utf-8"?>
+<file path=ppt/slides/slide6.xml><?xml version="1.0" encoding="utf-8"?>
 <p:sld xmlns:a="http://schemas.openxmlformats.org/drawingml/2006/main" xmlns:r="http://schemas.openxmlformats.org/officeDocument/2006/relationships" xmlns:p="http://schemas.openxmlformats.org/presentationml/2006/main">
   <p:cSld>
     <p:spTree>
@@ -5320,7 +7319,7 @@
 </p:sld>
 </file>
 
-<file path=ppt/slides/slide5.xml><?xml version="1.0" encoding="utf-8"?>
+<file path=ppt/slides/slide7.xml><?xml version="1.0" encoding="utf-8"?>
 <p:sld xmlns:a="http://schemas.openxmlformats.org/drawingml/2006/main" xmlns:r="http://schemas.openxmlformats.org/officeDocument/2006/relationships" xmlns:p="http://schemas.openxmlformats.org/presentationml/2006/main" show="0">
   <p:cSld>
     <p:spTree>
@@ -5422,7 +7421,7 @@
 </p:sld>
 </file>
 
-<file path=ppt/slides/slide6.xml><?xml version="1.0" encoding="utf-8"?>
+<file path=ppt/slides/slide8.xml><?xml version="1.0" encoding="utf-8"?>
 <p:sld xmlns:a="http://schemas.openxmlformats.org/drawingml/2006/main" xmlns:r="http://schemas.openxmlformats.org/officeDocument/2006/relationships" xmlns:p="http://schemas.openxmlformats.org/presentationml/2006/main">
   <p:cSld>
     <p:spTree>

</xml_diff>

<commit_message>
Update draft: from dot plot to bar plot
Change
</commit_message>
<xml_diff>
--- a/report/RO-MAN/figures/ROMAN-figures.pptx
+++ b/report/RO-MAN/figures/ROMAN-figures.pptx
@@ -5,17 +5,18 @@
     <p:sldMasterId id="2147483648" r:id="rId1"/>
   </p:sldMasterIdLst>
   <p:notesMasterIdLst>
-    <p:notesMasterId r:id="rId10"/>
+    <p:notesMasterId r:id="rId11"/>
   </p:notesMasterIdLst>
   <p:sldIdLst>
     <p:sldId id="263" r:id="rId2"/>
     <p:sldId id="264" r:id="rId3"/>
-    <p:sldId id="259" r:id="rId4"/>
-    <p:sldId id="258" r:id="rId5"/>
-    <p:sldId id="262" r:id="rId6"/>
-    <p:sldId id="256" r:id="rId7"/>
-    <p:sldId id="257" r:id="rId8"/>
-    <p:sldId id="261" r:id="rId9"/>
+    <p:sldId id="265" r:id="rId4"/>
+    <p:sldId id="259" r:id="rId5"/>
+    <p:sldId id="258" r:id="rId6"/>
+    <p:sldId id="262" r:id="rId7"/>
+    <p:sldId id="256" r:id="rId8"/>
+    <p:sldId id="257" r:id="rId9"/>
+    <p:sldId id="261" r:id="rId10"/>
   </p:sldIdLst>
   <p:sldSz cx="12192000" cy="6858000"/>
   <p:notesSz cx="6858000" cy="9144000"/>
@@ -563,7 +564,7 @@
           <a:p>
             <a:fld id="{DA1463AA-A683-4C2A-8632-07FD5D698543}" type="slidenum">
               <a:rPr lang="en-US" smtClean="0"/>
-              <a:t>3</a:t>
+              <a:t>4</a:t>
             </a:fld>
             <a:endParaRPr lang="en-US"/>
           </a:p>
@@ -702,7 +703,7 @@
           <a:p>
             <a:fld id="{DA1463AA-A683-4C2A-8632-07FD5D698543}" type="slidenum">
               <a:rPr lang="en-US" smtClean="0"/>
-              <a:t>4</a:t>
+              <a:t>5</a:t>
             </a:fld>
             <a:endParaRPr lang="en-US"/>
           </a:p>
@@ -841,7 +842,7 @@
           <a:p>
             <a:fld id="{DA1463AA-A683-4C2A-8632-07FD5D698543}" type="slidenum">
               <a:rPr lang="en-US" smtClean="0"/>
-              <a:t>5</a:t>
+              <a:t>6</a:t>
             </a:fld>
             <a:endParaRPr lang="en-US"/>
           </a:p>
@@ -918,7 +919,7 @@
                 <a:ea typeface="+mn-ea"/>
                 <a:cs typeface="+mn-cs"/>
               </a:rPr>
-              <a:t>Accuracy in the test set as a function of the number of trajectories in the training set for human data set. Each red round dot is the model accuracy in test set for each human subject. The blue triangle is the random rate, which should be the baseline to compared with. Random rates are derived for each subject by dividing 100% by the average number of targets in the trajectories. The x-axis is log-transformed for clearer illustration. The label besides each red dot is the subject </a:t>
+              <a:t>Accuracy in the test set as a function of the number of trajectories in the training set for human data set. Each red round dot is the model accuracy in test set for each human subject. The blue triangle is the random rate, which should be the baseline to compared with. Random rates are derived for each subject by dividing 100% by the average number of targets in the trajectories. The x-axis is log-transformed for clearer illustration. Each grid along the x-axis represents 100 trajectories. The label besides each red dot is the subject </a:t>
             </a:r>
             <a:r>
               <a:rPr lang="en-US" altLang="zh-TW" sz="1200" b="0" i="0" kern="1200" dirty="0">
@@ -953,7 +954,7 @@
           <a:p>
             <a:fld id="{DA1463AA-A683-4C2A-8632-07FD5D698543}" type="slidenum">
               <a:rPr lang="en-US" smtClean="0"/>
-              <a:t>6</a:t>
+              <a:t>7</a:t>
             </a:fld>
             <a:endParaRPr lang="en-US"/>
           </a:p>
@@ -1072,7 +1073,7 @@
           <a:p>
             <a:fld id="{DA1463AA-A683-4C2A-8632-07FD5D698543}" type="slidenum">
               <a:rPr lang="en-US" smtClean="0"/>
-              <a:t>7</a:t>
+              <a:t>8</a:t>
             </a:fld>
             <a:endParaRPr lang="en-US"/>
           </a:p>
@@ -1211,7 +1212,7 @@
           <a:p>
             <a:fld id="{DA1463AA-A683-4C2A-8632-07FD5D698543}" type="slidenum">
               <a:rPr lang="en-US" smtClean="0"/>
-              <a:t>8</a:t>
+              <a:t>9</a:t>
             </a:fld>
             <a:endParaRPr lang="en-US"/>
           </a:p>
@@ -6443,10 +6444,219 @@
       </p:grpSpPr>
       <p:pic>
         <p:nvPicPr>
-          <p:cNvPr id="4" name="Picture 3" descr="A close up of a colorful background&#10;&#10;Description automatically generated">
-            <a:extLst>
-              <a:ext uri="{FF2B5EF4-FFF2-40B4-BE49-F238E27FC236}">
-                <a16:creationId xmlns:a16="http://schemas.microsoft.com/office/drawing/2014/main" id="{32F31F15-2913-4F10-BCB0-4B4A4F593504}"/>
+          <p:cNvPr id="4" name="Picture 3" descr="A screenshot of a video game&#10;&#10;Description automatically generated">
+            <a:extLst>
+              <a:ext uri="{FF2B5EF4-FFF2-40B4-BE49-F238E27FC236}">
+                <a16:creationId xmlns:a16="http://schemas.microsoft.com/office/drawing/2014/main" id="{4D0E9563-08B5-45C5-9A8F-5DB73846050D}"/>
+              </a:ext>
+            </a:extLst>
+          </p:cNvPr>
+          <p:cNvPicPr>
+            <a:picLocks noChangeAspect="1"/>
+          </p:cNvPicPr>
+          <p:nvPr/>
+        </p:nvPicPr>
+        <p:blipFill>
+          <a:blip r:embed="rId2"/>
+          <a:stretch>
+            <a:fillRect/>
+          </a:stretch>
+        </p:blipFill>
+        <p:spPr>
+          <a:xfrm>
+            <a:off x="3601329" y="591892"/>
+            <a:ext cx="6077243" cy="5754251"/>
+          </a:xfrm>
+          <a:prstGeom prst="rect">
+            <a:avLst/>
+          </a:prstGeom>
+        </p:spPr>
+      </p:pic>
+      <p:sp>
+        <p:nvSpPr>
+          <p:cNvPr id="5" name="TextBox 4">
+            <a:extLst>
+              <a:ext uri="{FF2B5EF4-FFF2-40B4-BE49-F238E27FC236}">
+                <a16:creationId xmlns:a16="http://schemas.microsoft.com/office/drawing/2014/main" id="{5627B980-87BA-429E-BF6F-BDA1CE6F0DE8}"/>
+              </a:ext>
+            </a:extLst>
+          </p:cNvPr>
+          <p:cNvSpPr txBox="1"/>
+          <p:nvPr/>
+        </p:nvSpPr>
+        <p:spPr>
+          <a:xfrm>
+            <a:off x="7610619" y="2509405"/>
+            <a:ext cx="1824111" cy="369332"/>
+          </a:xfrm>
+          <a:prstGeom prst="rect">
+            <a:avLst/>
+          </a:prstGeom>
+          <a:solidFill>
+            <a:schemeClr val="bg1"/>
+          </a:solidFill>
+        </p:spPr>
+        <p:txBody>
+          <a:bodyPr wrap="square" rtlCol="0">
+            <a:spAutoFit/>
+          </a:bodyPr>
+          <a:lstStyle/>
+          <a:p>
+            <a:r>
+              <a:rPr lang="en-US" b="1" dirty="0"/>
+              <a:t>Test Query State</a:t>
+            </a:r>
+          </a:p>
+        </p:txBody>
+      </p:sp>
+      <p:sp>
+        <p:nvSpPr>
+          <p:cNvPr id="6" name="TextBox 5">
+            <a:extLst>
+              <a:ext uri="{FF2B5EF4-FFF2-40B4-BE49-F238E27FC236}">
+                <a16:creationId xmlns:a16="http://schemas.microsoft.com/office/drawing/2014/main" id="{CB8A08BC-E81D-4774-A054-8440B8D92698}"/>
+              </a:ext>
+            </a:extLst>
+          </p:cNvPr>
+          <p:cNvSpPr txBox="1"/>
+          <p:nvPr/>
+        </p:nvSpPr>
+        <p:spPr>
+          <a:xfrm>
+            <a:off x="7624685" y="5840504"/>
+            <a:ext cx="1920240" cy="369332"/>
+          </a:xfrm>
+          <a:prstGeom prst="rect">
+            <a:avLst/>
+          </a:prstGeom>
+          <a:solidFill>
+            <a:schemeClr val="bg1"/>
+          </a:solidFill>
+        </p:spPr>
+        <p:txBody>
+          <a:bodyPr wrap="square" rtlCol="0">
+            <a:spAutoFit/>
+          </a:bodyPr>
+          <a:lstStyle/>
+          <a:p>
+            <a:r>
+              <a:rPr lang="en-US" b="1" dirty="0"/>
+              <a:t>Predicted Target</a:t>
+            </a:r>
+          </a:p>
+        </p:txBody>
+      </p:sp>
+      <p:sp>
+        <p:nvSpPr>
+          <p:cNvPr id="11" name="TextBox 10">
+            <a:extLst>
+              <a:ext uri="{FF2B5EF4-FFF2-40B4-BE49-F238E27FC236}">
+                <a16:creationId xmlns:a16="http://schemas.microsoft.com/office/drawing/2014/main" id="{93BF224F-00B5-4960-92B4-4B8B147F0DA9}"/>
+              </a:ext>
+            </a:extLst>
+          </p:cNvPr>
+          <p:cNvSpPr txBox="1"/>
+          <p:nvPr/>
+        </p:nvSpPr>
+        <p:spPr>
+          <a:xfrm>
+            <a:off x="6698563" y="271346"/>
+            <a:ext cx="2980009" cy="461665"/>
+          </a:xfrm>
+          <a:prstGeom prst="rect">
+            <a:avLst/>
+          </a:prstGeom>
+          <a:solidFill>
+            <a:schemeClr val="bg1"/>
+          </a:solidFill>
+        </p:spPr>
+        <p:txBody>
+          <a:bodyPr wrap="square" rtlCol="0">
+            <a:spAutoFit/>
+          </a:bodyPr>
+          <a:lstStyle/>
+          <a:p>
+            <a:r>
+              <a:rPr lang="en-US" sz="2400" b="1" dirty="0"/>
+              <a:t>Preference Prediction</a:t>
+            </a:r>
+          </a:p>
+        </p:txBody>
+      </p:sp>
+      <p:sp>
+        <p:nvSpPr>
+          <p:cNvPr id="12" name="TextBox 11">
+            <a:extLst>
+              <a:ext uri="{FF2B5EF4-FFF2-40B4-BE49-F238E27FC236}">
+                <a16:creationId xmlns:a16="http://schemas.microsoft.com/office/drawing/2014/main" id="{E165FDF6-63F8-4F69-9ABB-68428333AE49}"/>
+              </a:ext>
+            </a:extLst>
+          </p:cNvPr>
+          <p:cNvSpPr txBox="1"/>
+          <p:nvPr/>
+        </p:nvSpPr>
+        <p:spPr>
+          <a:xfrm>
+            <a:off x="3120680" y="271345"/>
+            <a:ext cx="2980009" cy="461665"/>
+          </a:xfrm>
+          <a:prstGeom prst="rect">
+            <a:avLst/>
+          </a:prstGeom>
+          <a:solidFill>
+            <a:schemeClr val="bg1"/>
+          </a:solidFill>
+        </p:spPr>
+        <p:txBody>
+          <a:bodyPr wrap="square" rtlCol="0">
+            <a:spAutoFit/>
+          </a:bodyPr>
+          <a:lstStyle/>
+          <a:p>
+            <a:pPr algn="ctr"/>
+            <a:r>
+              <a:rPr lang="en-US" sz="2400" b="1" dirty="0"/>
+              <a:t>Model Training</a:t>
+            </a:r>
+          </a:p>
+        </p:txBody>
+      </p:sp>
+    </p:spTree>
+    <p:extLst>
+      <p:ext uri="{BB962C8B-B14F-4D97-AF65-F5344CB8AC3E}">
+        <p14:creationId xmlns:p14="http://schemas.microsoft.com/office/powerpoint/2010/main" val="4271837428"/>
+      </p:ext>
+    </p:extLst>
+  </p:cSld>
+  <p:clrMapOvr>
+    <a:masterClrMapping/>
+  </p:clrMapOvr>
+</p:sld>
+</file>
+
+<file path=ppt/slides/slide4.xml><?xml version="1.0" encoding="utf-8"?>
+<p:sld xmlns:a="http://schemas.openxmlformats.org/drawingml/2006/main" xmlns:r="http://schemas.openxmlformats.org/officeDocument/2006/relationships" xmlns:p="http://schemas.openxmlformats.org/presentationml/2006/main">
+  <p:cSld>
+    <p:spTree>
+      <p:nvGrpSpPr>
+        <p:cNvPr id="1" name=""/>
+        <p:cNvGrpSpPr/>
+        <p:nvPr/>
+      </p:nvGrpSpPr>
+      <p:grpSpPr>
+        <a:xfrm>
+          <a:off x="0" y="0"/>
+          <a:ext cx="0" cy="0"/>
+          <a:chOff x="0" y="0"/>
+          <a:chExt cx="0" cy="0"/>
+        </a:xfrm>
+      </p:grpSpPr>
+      <p:pic>
+        <p:nvPicPr>
+          <p:cNvPr id="12" name="Picture 11" descr="A screenshot of a cell phone&#10;&#10;Description automatically generated">
+            <a:extLst>
+              <a:ext uri="{FF2B5EF4-FFF2-40B4-BE49-F238E27FC236}">
+                <a16:creationId xmlns:a16="http://schemas.microsoft.com/office/drawing/2014/main" id="{FEA26B47-872D-4B61-88A6-FE024FCF0645}"/>
               </a:ext>
             </a:extLst>
           </p:cNvPr>
@@ -6469,8 +6679,8 @@
         </p:blipFill>
         <p:spPr>
           <a:xfrm>
-            <a:off x="2213310" y="197529"/>
-            <a:ext cx="8689151" cy="6516863"/>
+            <a:off x="3817029" y="1213334"/>
+            <a:ext cx="5734934" cy="4301201"/>
           </a:xfrm>
           <a:prstGeom prst="rect">
             <a:avLst/>
@@ -6490,7 +6700,7 @@
 </p:sld>
 </file>
 
-<file path=ppt/slides/slide4.xml><?xml version="1.0" encoding="utf-8"?>
+<file path=ppt/slides/slide5.xml><?xml version="1.0" encoding="utf-8"?>
 <p:sld xmlns:a="http://schemas.openxmlformats.org/drawingml/2006/main" xmlns:r="http://schemas.openxmlformats.org/officeDocument/2006/relationships" xmlns:p="http://schemas.openxmlformats.org/presentationml/2006/main" show="0">
   <p:cSld>
     <p:spTree>
@@ -6613,7 +6823,7 @@
 </p:sld>
 </file>
 
-<file path=ppt/slides/slide5.xml><?xml version="1.0" encoding="utf-8"?>
+<file path=ppt/slides/slide6.xml><?xml version="1.0" encoding="utf-8"?>
 <p:sld xmlns:a="http://schemas.openxmlformats.org/drawingml/2006/main" xmlns:r="http://schemas.openxmlformats.org/officeDocument/2006/relationships" xmlns:p="http://schemas.openxmlformats.org/presentationml/2006/main">
   <p:cSld>
     <p:spTree>
@@ -7253,7 +7463,7 @@
 </p:sld>
 </file>
 
-<file path=ppt/slides/slide6.xml><?xml version="1.0" encoding="utf-8"?>
+<file path=ppt/slides/slide7.xml><?xml version="1.0" encoding="utf-8"?>
 <p:sld xmlns:a="http://schemas.openxmlformats.org/drawingml/2006/main" xmlns:r="http://schemas.openxmlformats.org/officeDocument/2006/relationships" xmlns:p="http://schemas.openxmlformats.org/presentationml/2006/main">
   <p:cSld>
     <p:spTree>
@@ -7272,10 +7482,10 @@
       </p:grpSpPr>
       <p:pic>
         <p:nvPicPr>
-          <p:cNvPr id="9" name="Picture 8" descr="A close up of a map&#10;&#10;Description automatically generated">
-            <a:extLst>
-              <a:ext uri="{FF2B5EF4-FFF2-40B4-BE49-F238E27FC236}">
-                <a16:creationId xmlns:a16="http://schemas.microsoft.com/office/drawing/2014/main" id="{63D618A7-E9B2-4785-8803-46F2E703CBA2}"/>
+          <p:cNvPr id="7" name="Picture 6" descr="A close up of a map&#10;&#10;Description automatically generated">
+            <a:extLst>
+              <a:ext uri="{FF2B5EF4-FFF2-40B4-BE49-F238E27FC236}">
+                <a16:creationId xmlns:a16="http://schemas.microsoft.com/office/drawing/2014/main" id="{29685846-7BE5-4D76-8554-00E51A9C24DB}"/>
               </a:ext>
             </a:extLst>
           </p:cNvPr>
@@ -7298,8 +7508,8 @@
         </p:blipFill>
         <p:spPr>
           <a:xfrm>
-            <a:off x="2121407" y="192023"/>
-            <a:ext cx="8514343" cy="6385758"/>
+            <a:off x="2954215" y="963639"/>
+            <a:ext cx="6893165" cy="5169873"/>
           </a:xfrm>
           <a:prstGeom prst="rect">
             <a:avLst/>
@@ -7319,7 +7529,7 @@
 </p:sld>
 </file>
 
-<file path=ppt/slides/slide7.xml><?xml version="1.0" encoding="utf-8"?>
+<file path=ppt/slides/slide8.xml><?xml version="1.0" encoding="utf-8"?>
 <p:sld xmlns:a="http://schemas.openxmlformats.org/drawingml/2006/main" xmlns:r="http://schemas.openxmlformats.org/officeDocument/2006/relationships" xmlns:p="http://schemas.openxmlformats.org/presentationml/2006/main" show="0">
   <p:cSld>
     <p:spTree>
@@ -7421,7 +7631,7 @@
 </p:sld>
 </file>
 
-<file path=ppt/slides/slide8.xml><?xml version="1.0" encoding="utf-8"?>
+<file path=ppt/slides/slide9.xml><?xml version="1.0" encoding="utf-8"?>
 <p:sld xmlns:a="http://schemas.openxmlformats.org/drawingml/2006/main" xmlns:r="http://schemas.openxmlformats.org/officeDocument/2006/relationships" xmlns:p="http://schemas.openxmlformats.org/presentationml/2006/main">
   <p:cSld>
     <p:spTree>

</xml_diff>

<commit_message>
Update draft: concatenate two figures into a figure with two panels
</commit_message>
<xml_diff>
--- a/report/RO-MAN/figures/ROMAN-figures.pptx
+++ b/report/RO-MAN/figures/ROMAN-figures.pptx
@@ -5,7 +5,7 @@
     <p:sldMasterId id="2147483648" r:id="rId1"/>
   </p:sldMasterIdLst>
   <p:notesMasterIdLst>
-    <p:notesMasterId r:id="rId12"/>
+    <p:notesMasterId r:id="rId13"/>
   </p:notesMasterIdLst>
   <p:sldIdLst>
     <p:sldId id="263" r:id="rId2"/>
@@ -18,6 +18,7 @@
     <p:sldId id="256" r:id="rId9"/>
     <p:sldId id="257" r:id="rId10"/>
     <p:sldId id="261" r:id="rId11"/>
+    <p:sldId id="267" r:id="rId12"/>
   </p:sldIdLst>
   <p:sldSz cx="12192000" cy="6858000"/>
   <p:notesSz cx="6858000" cy="9144000"/>
@@ -124,6 +125,11 @@
             <a:srgbClr val="A4A3A4"/>
           </p15:clr>
         </p15:guide>
+        <p15:guide id="3" orient="horz" pos="2136" userDrawn="1">
+          <p15:clr>
+            <a:srgbClr val="A4A3A4"/>
+          </p15:clr>
+        </p15:guide>
       </p15:sldGuideLst>
     </p:ext>
   </p:extLst>
@@ -212,7 +218,7 @@
           <a:p>
             <a:fld id="{3F89A295-6F9E-4D51-AE54-61E02A4CE380}" type="datetimeFigureOut">
               <a:rPr lang="en-US" smtClean="0"/>
-              <a:t>3/11/2020</a:t>
+              <a:t>3/12/2020</a:t>
             </a:fld>
             <a:endParaRPr lang="en-US"/>
           </a:p>
@@ -1203,6 +1209,90 @@
 </p:notes>
 </file>
 
+<file path=ppt/notesSlides/notesSlide7.xml><?xml version="1.0" encoding="utf-8"?>
+<p:notes xmlns:a="http://schemas.openxmlformats.org/drawingml/2006/main" xmlns:r="http://schemas.openxmlformats.org/officeDocument/2006/relationships" xmlns:p="http://schemas.openxmlformats.org/presentationml/2006/main">
+  <p:cSld>
+    <p:spTree>
+      <p:nvGrpSpPr>
+        <p:cNvPr id="1" name=""/>
+        <p:cNvGrpSpPr/>
+        <p:nvPr/>
+      </p:nvGrpSpPr>
+      <p:grpSpPr>
+        <a:xfrm>
+          <a:off x="0" y="0"/>
+          <a:ext cx="0" cy="0"/>
+          <a:chOff x="0" y="0"/>
+          <a:chExt cx="0" cy="0"/>
+        </a:xfrm>
+      </p:grpSpPr>
+      <p:sp>
+        <p:nvSpPr>
+          <p:cNvPr id="2" name="Slide Image Placeholder 1"/>
+          <p:cNvSpPr>
+            <a:spLocks noGrp="1" noRot="1" noChangeAspect="1"/>
+          </p:cNvSpPr>
+          <p:nvPr>
+            <p:ph type="sldImg"/>
+          </p:nvPr>
+        </p:nvSpPr>
+        <p:spPr/>
+      </p:sp>
+      <p:sp>
+        <p:nvSpPr>
+          <p:cNvPr id="3" name="Notes Placeholder 2"/>
+          <p:cNvSpPr>
+            <a:spLocks noGrp="1"/>
+          </p:cNvSpPr>
+          <p:nvPr>
+            <p:ph type="body" idx="1"/>
+          </p:nvPr>
+        </p:nvSpPr>
+        <p:spPr/>
+        <p:txBody>
+          <a:bodyPr/>
+          <a:lstStyle/>
+          <a:p>
+            <a:endParaRPr lang="en-US" dirty="0"/>
+          </a:p>
+        </p:txBody>
+      </p:sp>
+      <p:sp>
+        <p:nvSpPr>
+          <p:cNvPr id="4" name="Slide Number Placeholder 3"/>
+          <p:cNvSpPr>
+            <a:spLocks noGrp="1"/>
+          </p:cNvSpPr>
+          <p:nvPr>
+            <p:ph type="sldNum" sz="quarter" idx="5"/>
+          </p:nvPr>
+        </p:nvSpPr>
+        <p:spPr/>
+        <p:txBody>
+          <a:bodyPr/>
+          <a:lstStyle/>
+          <a:p>
+            <a:fld id="{DA1463AA-A683-4C2A-8632-07FD5D698543}" type="slidenum">
+              <a:rPr lang="en-US" smtClean="0"/>
+              <a:t>11</a:t>
+            </a:fld>
+            <a:endParaRPr lang="en-US"/>
+          </a:p>
+        </p:txBody>
+      </p:sp>
+    </p:spTree>
+    <p:extLst>
+      <p:ext uri="{BB962C8B-B14F-4D97-AF65-F5344CB8AC3E}">
+        <p14:creationId xmlns:p14="http://schemas.microsoft.com/office/powerpoint/2010/main" val="3350396218"/>
+      </p:ext>
+    </p:extLst>
+  </p:cSld>
+  <p:clrMapOvr>
+    <a:masterClrMapping/>
+  </p:clrMapOvr>
+</p:notes>
+</file>
+
 <file path=ppt/slideLayouts/slideLayout1.xml><?xml version="1.0" encoding="utf-8"?>
 <p:sldLayout xmlns:a="http://schemas.openxmlformats.org/drawingml/2006/main" xmlns:r="http://schemas.openxmlformats.org/officeDocument/2006/relationships" xmlns:p="http://schemas.openxmlformats.org/presentationml/2006/main" type="title" preserve="1">
   <p:cSld name="Title Slide">
@@ -1350,7 +1440,7 @@
           <a:p>
             <a:fld id="{F4E53FB3-0E6D-400E-94D0-294D549E0F65}" type="datetimeFigureOut">
               <a:rPr lang="en-US" smtClean="0"/>
-              <a:t>3/11/2020</a:t>
+              <a:t>3/12/2020</a:t>
             </a:fld>
             <a:endParaRPr lang="en-US"/>
           </a:p>
@@ -1548,7 +1638,7 @@
           <a:p>
             <a:fld id="{F4E53FB3-0E6D-400E-94D0-294D549E0F65}" type="datetimeFigureOut">
               <a:rPr lang="en-US" smtClean="0"/>
-              <a:t>3/11/2020</a:t>
+              <a:t>3/12/2020</a:t>
             </a:fld>
             <a:endParaRPr lang="en-US"/>
           </a:p>
@@ -1756,7 +1846,7 @@
           <a:p>
             <a:fld id="{F4E53FB3-0E6D-400E-94D0-294D549E0F65}" type="datetimeFigureOut">
               <a:rPr lang="en-US" smtClean="0"/>
-              <a:t>3/11/2020</a:t>
+              <a:t>3/12/2020</a:t>
             </a:fld>
             <a:endParaRPr lang="en-US"/>
           </a:p>
@@ -1954,7 +2044,7 @@
           <a:p>
             <a:fld id="{F4E53FB3-0E6D-400E-94D0-294D549E0F65}" type="datetimeFigureOut">
               <a:rPr lang="en-US" smtClean="0"/>
-              <a:t>3/11/2020</a:t>
+              <a:t>3/12/2020</a:t>
             </a:fld>
             <a:endParaRPr lang="en-US"/>
           </a:p>
@@ -2229,7 +2319,7 @@
           <a:p>
             <a:fld id="{F4E53FB3-0E6D-400E-94D0-294D549E0F65}" type="datetimeFigureOut">
               <a:rPr lang="en-US" smtClean="0"/>
-              <a:t>3/11/2020</a:t>
+              <a:t>3/12/2020</a:t>
             </a:fld>
             <a:endParaRPr lang="en-US"/>
           </a:p>
@@ -2494,7 +2584,7 @@
           <a:p>
             <a:fld id="{F4E53FB3-0E6D-400E-94D0-294D549E0F65}" type="datetimeFigureOut">
               <a:rPr lang="en-US" smtClean="0"/>
-              <a:t>3/11/2020</a:t>
+              <a:t>3/12/2020</a:t>
             </a:fld>
             <a:endParaRPr lang="en-US"/>
           </a:p>
@@ -2906,7 +2996,7 @@
           <a:p>
             <a:fld id="{F4E53FB3-0E6D-400E-94D0-294D549E0F65}" type="datetimeFigureOut">
               <a:rPr lang="en-US" smtClean="0"/>
-              <a:t>3/11/2020</a:t>
+              <a:t>3/12/2020</a:t>
             </a:fld>
             <a:endParaRPr lang="en-US"/>
           </a:p>
@@ -3047,7 +3137,7 @@
           <a:p>
             <a:fld id="{F4E53FB3-0E6D-400E-94D0-294D549E0F65}" type="datetimeFigureOut">
               <a:rPr lang="en-US" smtClean="0"/>
-              <a:t>3/11/2020</a:t>
+              <a:t>3/12/2020</a:t>
             </a:fld>
             <a:endParaRPr lang="en-US"/>
           </a:p>
@@ -3160,7 +3250,7 @@
           <a:p>
             <a:fld id="{F4E53FB3-0E6D-400E-94D0-294D549E0F65}" type="datetimeFigureOut">
               <a:rPr lang="en-US" smtClean="0"/>
-              <a:t>3/11/2020</a:t>
+              <a:t>3/12/2020</a:t>
             </a:fld>
             <a:endParaRPr lang="en-US"/>
           </a:p>
@@ -3471,7 +3561,7 @@
           <a:p>
             <a:fld id="{F4E53FB3-0E6D-400E-94D0-294D549E0F65}" type="datetimeFigureOut">
               <a:rPr lang="en-US" smtClean="0"/>
-              <a:t>3/11/2020</a:t>
+              <a:t>3/12/2020</a:t>
             </a:fld>
             <a:endParaRPr lang="en-US"/>
           </a:p>
@@ -3759,7 +3849,7 @@
           <a:p>
             <a:fld id="{F4E53FB3-0E6D-400E-94D0-294D549E0F65}" type="datetimeFigureOut">
               <a:rPr lang="en-US" smtClean="0"/>
-              <a:t>3/11/2020</a:t>
+              <a:t>3/12/2020</a:t>
             </a:fld>
             <a:endParaRPr lang="en-US"/>
           </a:p>
@@ -4000,7 +4090,7 @@
           <a:p>
             <a:fld id="{F4E53FB3-0E6D-400E-94D0-294D549E0F65}" type="datetimeFigureOut">
               <a:rPr lang="en-US" smtClean="0"/>
-              <a:t>3/11/2020</a:t>
+              <a:t>3/12/2020</a:t>
             </a:fld>
             <a:endParaRPr lang="en-US"/>
           </a:p>
@@ -5909,6 +5999,1466 @@
     <p:extLst>
       <p:ext uri="{BB962C8B-B14F-4D97-AF65-F5344CB8AC3E}">
         <p14:creationId xmlns:p14="http://schemas.microsoft.com/office/powerpoint/2010/main" val="1773979766"/>
+      </p:ext>
+    </p:extLst>
+  </p:cSld>
+  <p:clrMapOvr>
+    <a:masterClrMapping/>
+  </p:clrMapOvr>
+</p:sld>
+</file>
+
+<file path=ppt/slides/slide11.xml><?xml version="1.0" encoding="utf-8"?>
+<p:sld xmlns:a="http://schemas.openxmlformats.org/drawingml/2006/main" xmlns:r="http://schemas.openxmlformats.org/officeDocument/2006/relationships" xmlns:p="http://schemas.openxmlformats.org/presentationml/2006/main">
+  <p:cSld>
+    <p:spTree>
+      <p:nvGrpSpPr>
+        <p:cNvPr id="1" name=""/>
+        <p:cNvGrpSpPr/>
+        <p:nvPr/>
+      </p:nvGrpSpPr>
+      <p:grpSpPr>
+        <a:xfrm>
+          <a:off x="0" y="0"/>
+          <a:ext cx="0" cy="0"/>
+          <a:chOff x="0" y="0"/>
+          <a:chExt cx="0" cy="0"/>
+        </a:xfrm>
+      </p:grpSpPr>
+      <p:pic>
+        <p:nvPicPr>
+          <p:cNvPr id="26" name="Picture 25" descr="A picture containing clock&#10;&#10;Description automatically generated">
+            <a:extLst>
+              <a:ext uri="{FF2B5EF4-FFF2-40B4-BE49-F238E27FC236}">
+                <a16:creationId xmlns:a16="http://schemas.microsoft.com/office/drawing/2014/main" id="{BB0887E7-AC55-48C2-AFD1-88BCDFE7FFF7}"/>
+              </a:ext>
+            </a:extLst>
+          </p:cNvPr>
+          <p:cNvPicPr>
+            <a:picLocks noChangeAspect="1"/>
+          </p:cNvPicPr>
+          <p:nvPr/>
+        </p:nvPicPr>
+        <p:blipFill rotWithShape="1">
+          <a:blip r:embed="rId3">
+            <a:extLst>
+              <a:ext uri="{28A0092B-C50C-407E-A947-70E740481C1C}">
+                <a14:useLocalDpi xmlns:a14="http://schemas.microsoft.com/office/drawing/2010/main" val="0"/>
+              </a:ext>
+            </a:extLst>
+          </a:blip>
+          <a:srcRect l="10814" r="32776"/>
+          <a:stretch/>
+        </p:blipFill>
+        <p:spPr>
+          <a:xfrm>
+            <a:off x="6471372" y="397825"/>
+            <a:ext cx="2625969" cy="6264695"/>
+          </a:xfrm>
+          <a:prstGeom prst="rect">
+            <a:avLst/>
+          </a:prstGeom>
+        </p:spPr>
+      </p:pic>
+      <p:pic>
+        <p:nvPicPr>
+          <p:cNvPr id="27" name="Picture 26">
+            <a:extLst>
+              <a:ext uri="{FF2B5EF4-FFF2-40B4-BE49-F238E27FC236}">
+                <a16:creationId xmlns:a16="http://schemas.microsoft.com/office/drawing/2014/main" id="{37A0300A-6DF9-4707-B77C-C5D4AADF8D0A}"/>
+              </a:ext>
+            </a:extLst>
+          </p:cNvPr>
+          <p:cNvPicPr>
+            <a:picLocks noChangeAspect="1"/>
+          </p:cNvPicPr>
+          <p:nvPr/>
+        </p:nvPicPr>
+        <p:blipFill rotWithShape="1">
+          <a:blip r:embed="rId4">
+            <a:extLst>
+              <a:ext uri="{28A0092B-C50C-407E-A947-70E740481C1C}">
+                <a14:useLocalDpi xmlns:a14="http://schemas.microsoft.com/office/drawing/2010/main" val="0"/>
+              </a:ext>
+            </a:extLst>
+          </a:blip>
+          <a:srcRect l="10162" r="29688"/>
+          <a:stretch/>
+        </p:blipFill>
+        <p:spPr>
+          <a:xfrm>
+            <a:off x="9183027" y="411895"/>
+            <a:ext cx="2784651" cy="6230274"/>
+          </a:xfrm>
+          <a:prstGeom prst="rect">
+            <a:avLst/>
+          </a:prstGeom>
+        </p:spPr>
+      </p:pic>
+      <p:sp>
+        <p:nvSpPr>
+          <p:cNvPr id="28" name="TextBox 27">
+            <a:extLst>
+              <a:ext uri="{FF2B5EF4-FFF2-40B4-BE49-F238E27FC236}">
+                <a16:creationId xmlns:a16="http://schemas.microsoft.com/office/drawing/2014/main" id="{99F4C3E1-8EE8-40DD-80AB-07CBF96E7EAE}"/>
+              </a:ext>
+            </a:extLst>
+          </p:cNvPr>
+          <p:cNvSpPr txBox="1"/>
+          <p:nvPr/>
+        </p:nvSpPr>
+        <p:spPr>
+          <a:xfrm>
+            <a:off x="12149858" y="1789524"/>
+            <a:ext cx="1578334" cy="830997"/>
+          </a:xfrm>
+          <a:prstGeom prst="rect">
+            <a:avLst/>
+          </a:prstGeom>
+          <a:noFill/>
+        </p:spPr>
+        <p:txBody>
+          <a:bodyPr wrap="square" rtlCol="0">
+            <a:spAutoFit/>
+          </a:bodyPr>
+          <a:lstStyle/>
+          <a:p>
+            <a:r>
+              <a:rPr lang="en-US" sz="2400" dirty="0"/>
+              <a:t>Rank by</a:t>
+            </a:r>
+          </a:p>
+          <a:p>
+            <a:r>
+              <a:rPr lang="en-US" sz="2400" dirty="0"/>
+              <a:t>Preference</a:t>
+            </a:r>
+          </a:p>
+        </p:txBody>
+      </p:sp>
+      <p:pic>
+        <p:nvPicPr>
+          <p:cNvPr id="29" name="Picture 28" descr="A close up of a logo&#10;&#10;Description automatically generated">
+            <a:extLst>
+              <a:ext uri="{FF2B5EF4-FFF2-40B4-BE49-F238E27FC236}">
+                <a16:creationId xmlns:a16="http://schemas.microsoft.com/office/drawing/2014/main" id="{667236C7-89C5-4E78-B054-26C6863E0A41}"/>
+              </a:ext>
+            </a:extLst>
+          </p:cNvPr>
+          <p:cNvPicPr>
+            <a:picLocks noChangeAspect="1"/>
+          </p:cNvPicPr>
+          <p:nvPr/>
+        </p:nvPicPr>
+        <p:blipFill rotWithShape="1">
+          <a:blip r:embed="rId5">
+            <a:extLst>
+              <a:ext uri="{28A0092B-C50C-407E-A947-70E740481C1C}">
+                <a14:useLocalDpi xmlns:a14="http://schemas.microsoft.com/office/drawing/2010/main" val="0"/>
+              </a:ext>
+            </a:extLst>
+          </a:blip>
+          <a:srcRect l="73004" t="42701" r="17406" b="41504"/>
+          <a:stretch/>
+        </p:blipFill>
+        <p:spPr>
+          <a:xfrm>
+            <a:off x="12106544" y="2620521"/>
+            <a:ext cx="1281864" cy="2903050"/>
+          </a:xfrm>
+          <a:prstGeom prst="rect">
+            <a:avLst/>
+          </a:prstGeom>
+        </p:spPr>
+      </p:pic>
+      <p:sp>
+        <p:nvSpPr>
+          <p:cNvPr id="30" name="TextBox 29">
+            <a:extLst>
+              <a:ext uri="{FF2B5EF4-FFF2-40B4-BE49-F238E27FC236}">
+                <a16:creationId xmlns:a16="http://schemas.microsoft.com/office/drawing/2014/main" id="{27CA8C75-75FF-44A4-9987-6BBBA81944EE}"/>
+              </a:ext>
+            </a:extLst>
+          </p:cNvPr>
+          <p:cNvSpPr txBox="1"/>
+          <p:nvPr/>
+        </p:nvSpPr>
+        <p:spPr>
+          <a:xfrm>
+            <a:off x="6915788" y="50733"/>
+            <a:ext cx="2106526" cy="461665"/>
+          </a:xfrm>
+          <a:prstGeom prst="rect">
+            <a:avLst/>
+          </a:prstGeom>
+          <a:noFill/>
+        </p:spPr>
+        <p:txBody>
+          <a:bodyPr wrap="square" rtlCol="0">
+            <a:spAutoFit/>
+          </a:bodyPr>
+          <a:lstStyle/>
+          <a:p>
+            <a:r>
+              <a:rPr lang="en-US" sz="2400" dirty="0"/>
+              <a:t>Ground-Truth</a:t>
+            </a:r>
+          </a:p>
+        </p:txBody>
+      </p:sp>
+      <p:sp>
+        <p:nvSpPr>
+          <p:cNvPr id="31" name="TextBox 30">
+            <a:extLst>
+              <a:ext uri="{FF2B5EF4-FFF2-40B4-BE49-F238E27FC236}">
+                <a16:creationId xmlns:a16="http://schemas.microsoft.com/office/drawing/2014/main" id="{8ED676C3-E5EB-449B-8007-860B0CA3EE1A}"/>
+              </a:ext>
+            </a:extLst>
+          </p:cNvPr>
+          <p:cNvSpPr txBox="1"/>
+          <p:nvPr/>
+        </p:nvSpPr>
+        <p:spPr>
+          <a:xfrm>
+            <a:off x="9587687" y="50733"/>
+            <a:ext cx="2106526" cy="461665"/>
+          </a:xfrm>
+          <a:prstGeom prst="rect">
+            <a:avLst/>
+          </a:prstGeom>
+          <a:noFill/>
+        </p:spPr>
+        <p:txBody>
+          <a:bodyPr wrap="square" rtlCol="0">
+            <a:spAutoFit/>
+          </a:bodyPr>
+          <a:lstStyle/>
+          <a:p>
+            <a:r>
+              <a:rPr lang="en-US" sz="2400" dirty="0"/>
+              <a:t>Reconstructed</a:t>
+            </a:r>
+          </a:p>
+        </p:txBody>
+      </p:sp>
+      <p:sp>
+        <p:nvSpPr>
+          <p:cNvPr id="32" name="TextBox 31">
+            <a:extLst>
+              <a:ext uri="{FF2B5EF4-FFF2-40B4-BE49-F238E27FC236}">
+                <a16:creationId xmlns:a16="http://schemas.microsoft.com/office/drawing/2014/main" id="{77CD2619-B77C-4AD3-8539-78A4516566DF}"/>
+              </a:ext>
+            </a:extLst>
+          </p:cNvPr>
+          <p:cNvSpPr txBox="1"/>
+          <p:nvPr/>
+        </p:nvSpPr>
+        <p:spPr>
+          <a:xfrm>
+            <a:off x="5886182" y="516246"/>
+            <a:ext cx="731520" cy="369332"/>
+          </a:xfrm>
+          <a:prstGeom prst="rect">
+            <a:avLst/>
+          </a:prstGeom>
+          <a:noFill/>
+        </p:spPr>
+        <p:txBody>
+          <a:bodyPr wrap="square" rtlCol="0">
+            <a:spAutoFit/>
+          </a:bodyPr>
+          <a:lstStyle/>
+          <a:p>
+            <a:r>
+              <a:rPr lang="en-US" i="1" dirty="0"/>
+              <a:t>7.07</a:t>
+            </a:r>
+          </a:p>
+        </p:txBody>
+      </p:sp>
+      <p:sp>
+        <p:nvSpPr>
+          <p:cNvPr id="33" name="TextBox 32">
+            <a:extLst>
+              <a:ext uri="{FF2B5EF4-FFF2-40B4-BE49-F238E27FC236}">
+                <a16:creationId xmlns:a16="http://schemas.microsoft.com/office/drawing/2014/main" id="{6370E5E1-3FEE-4315-B3AA-4A379A03C4AB}"/>
+              </a:ext>
+            </a:extLst>
+          </p:cNvPr>
+          <p:cNvSpPr txBox="1"/>
+          <p:nvPr/>
+        </p:nvSpPr>
+        <p:spPr>
+          <a:xfrm>
+            <a:off x="5886182" y="968408"/>
+            <a:ext cx="731520" cy="369332"/>
+          </a:xfrm>
+          <a:prstGeom prst="rect">
+            <a:avLst/>
+          </a:prstGeom>
+          <a:noFill/>
+        </p:spPr>
+        <p:txBody>
+          <a:bodyPr wrap="square" rtlCol="0">
+            <a:spAutoFit/>
+          </a:bodyPr>
+          <a:lstStyle/>
+          <a:p>
+            <a:r>
+              <a:rPr lang="en-US" i="1" dirty="0"/>
+              <a:t>6.66</a:t>
+            </a:r>
+          </a:p>
+        </p:txBody>
+      </p:sp>
+      <p:sp>
+        <p:nvSpPr>
+          <p:cNvPr id="34" name="TextBox 33">
+            <a:extLst>
+              <a:ext uri="{FF2B5EF4-FFF2-40B4-BE49-F238E27FC236}">
+                <a16:creationId xmlns:a16="http://schemas.microsoft.com/office/drawing/2014/main" id="{03BF971E-7EC9-43A7-BCC6-A64D737914B0}"/>
+              </a:ext>
+            </a:extLst>
+          </p:cNvPr>
+          <p:cNvSpPr txBox="1"/>
+          <p:nvPr/>
+        </p:nvSpPr>
+        <p:spPr>
+          <a:xfrm>
+            <a:off x="5886182" y="1420570"/>
+            <a:ext cx="731520" cy="369332"/>
+          </a:xfrm>
+          <a:prstGeom prst="rect">
+            <a:avLst/>
+          </a:prstGeom>
+          <a:noFill/>
+        </p:spPr>
+        <p:txBody>
+          <a:bodyPr wrap="square" rtlCol="0">
+            <a:spAutoFit/>
+          </a:bodyPr>
+          <a:lstStyle/>
+          <a:p>
+            <a:r>
+              <a:rPr lang="en-US" i="1" dirty="0"/>
+              <a:t>6.29</a:t>
+            </a:r>
+          </a:p>
+        </p:txBody>
+      </p:sp>
+      <p:sp>
+        <p:nvSpPr>
+          <p:cNvPr id="35" name="TextBox 34">
+            <a:extLst>
+              <a:ext uri="{FF2B5EF4-FFF2-40B4-BE49-F238E27FC236}">
+                <a16:creationId xmlns:a16="http://schemas.microsoft.com/office/drawing/2014/main" id="{DF516545-7CFF-4C15-BE2E-1ABD1A866638}"/>
+              </a:ext>
+            </a:extLst>
+          </p:cNvPr>
+          <p:cNvSpPr txBox="1"/>
+          <p:nvPr/>
+        </p:nvSpPr>
+        <p:spPr>
+          <a:xfrm>
+            <a:off x="5886182" y="1872732"/>
+            <a:ext cx="731520" cy="369332"/>
+          </a:xfrm>
+          <a:prstGeom prst="rect">
+            <a:avLst/>
+          </a:prstGeom>
+          <a:noFill/>
+        </p:spPr>
+        <p:txBody>
+          <a:bodyPr wrap="square" rtlCol="0">
+            <a:spAutoFit/>
+          </a:bodyPr>
+          <a:lstStyle/>
+          <a:p>
+            <a:r>
+              <a:rPr lang="en-US" i="1" dirty="0"/>
+              <a:t>3.77</a:t>
+            </a:r>
+          </a:p>
+        </p:txBody>
+      </p:sp>
+      <p:sp>
+        <p:nvSpPr>
+          <p:cNvPr id="36" name="TextBox 35">
+            <a:extLst>
+              <a:ext uri="{FF2B5EF4-FFF2-40B4-BE49-F238E27FC236}">
+                <a16:creationId xmlns:a16="http://schemas.microsoft.com/office/drawing/2014/main" id="{0F1BB2F4-13A0-47EC-AA3C-A2AD2C6A1EF2}"/>
+              </a:ext>
+            </a:extLst>
+          </p:cNvPr>
+          <p:cNvSpPr txBox="1"/>
+          <p:nvPr/>
+        </p:nvSpPr>
+        <p:spPr>
+          <a:xfrm>
+            <a:off x="5886182" y="2324894"/>
+            <a:ext cx="731520" cy="369332"/>
+          </a:xfrm>
+          <a:prstGeom prst="rect">
+            <a:avLst/>
+          </a:prstGeom>
+          <a:noFill/>
+        </p:spPr>
+        <p:txBody>
+          <a:bodyPr wrap="square" rtlCol="0">
+            <a:spAutoFit/>
+          </a:bodyPr>
+          <a:lstStyle/>
+          <a:p>
+            <a:r>
+              <a:rPr lang="en-US" i="1" dirty="0"/>
+              <a:t>3.37</a:t>
+            </a:r>
+          </a:p>
+        </p:txBody>
+      </p:sp>
+      <p:sp>
+        <p:nvSpPr>
+          <p:cNvPr id="37" name="TextBox 36">
+            <a:extLst>
+              <a:ext uri="{FF2B5EF4-FFF2-40B4-BE49-F238E27FC236}">
+                <a16:creationId xmlns:a16="http://schemas.microsoft.com/office/drawing/2014/main" id="{DD14178E-D2A7-49CF-90C9-2BE1C70630D1}"/>
+              </a:ext>
+            </a:extLst>
+          </p:cNvPr>
+          <p:cNvSpPr txBox="1"/>
+          <p:nvPr/>
+        </p:nvSpPr>
+        <p:spPr>
+          <a:xfrm>
+            <a:off x="5886182" y="2777056"/>
+            <a:ext cx="731520" cy="369332"/>
+          </a:xfrm>
+          <a:prstGeom prst="rect">
+            <a:avLst/>
+          </a:prstGeom>
+          <a:noFill/>
+        </p:spPr>
+        <p:txBody>
+          <a:bodyPr wrap="square" rtlCol="0">
+            <a:spAutoFit/>
+          </a:bodyPr>
+          <a:lstStyle/>
+          <a:p>
+            <a:r>
+              <a:rPr lang="en-US" i="1" dirty="0"/>
+              <a:t>3.32</a:t>
+            </a:r>
+          </a:p>
+        </p:txBody>
+      </p:sp>
+      <p:sp>
+        <p:nvSpPr>
+          <p:cNvPr id="38" name="TextBox 37">
+            <a:extLst>
+              <a:ext uri="{FF2B5EF4-FFF2-40B4-BE49-F238E27FC236}">
+                <a16:creationId xmlns:a16="http://schemas.microsoft.com/office/drawing/2014/main" id="{25C383A5-C951-47E3-846C-65DF32898169}"/>
+              </a:ext>
+            </a:extLst>
+          </p:cNvPr>
+          <p:cNvSpPr txBox="1"/>
+          <p:nvPr/>
+        </p:nvSpPr>
+        <p:spPr>
+          <a:xfrm>
+            <a:off x="5886182" y="3229218"/>
+            <a:ext cx="731520" cy="369332"/>
+          </a:xfrm>
+          <a:prstGeom prst="rect">
+            <a:avLst/>
+          </a:prstGeom>
+          <a:noFill/>
+        </p:spPr>
+        <p:txBody>
+          <a:bodyPr wrap="square" rtlCol="0">
+            <a:spAutoFit/>
+          </a:bodyPr>
+          <a:lstStyle/>
+          <a:p>
+            <a:r>
+              <a:rPr lang="en-US" i="1" dirty="0"/>
+              <a:t>2.87</a:t>
+            </a:r>
+          </a:p>
+        </p:txBody>
+      </p:sp>
+      <p:sp>
+        <p:nvSpPr>
+          <p:cNvPr id="39" name="TextBox 38">
+            <a:extLst>
+              <a:ext uri="{FF2B5EF4-FFF2-40B4-BE49-F238E27FC236}">
+                <a16:creationId xmlns:a16="http://schemas.microsoft.com/office/drawing/2014/main" id="{16917911-87C7-4DF5-959E-9E8BED8FBD6D}"/>
+              </a:ext>
+            </a:extLst>
+          </p:cNvPr>
+          <p:cNvSpPr txBox="1"/>
+          <p:nvPr/>
+        </p:nvSpPr>
+        <p:spPr>
+          <a:xfrm>
+            <a:off x="5886182" y="3681380"/>
+            <a:ext cx="731520" cy="369332"/>
+          </a:xfrm>
+          <a:prstGeom prst="rect">
+            <a:avLst/>
+          </a:prstGeom>
+          <a:noFill/>
+        </p:spPr>
+        <p:txBody>
+          <a:bodyPr wrap="square" rtlCol="0">
+            <a:spAutoFit/>
+          </a:bodyPr>
+          <a:lstStyle/>
+          <a:p>
+            <a:r>
+              <a:rPr lang="en-US" i="1" dirty="0"/>
+              <a:t>2.45</a:t>
+            </a:r>
+          </a:p>
+        </p:txBody>
+      </p:sp>
+      <p:sp>
+        <p:nvSpPr>
+          <p:cNvPr id="40" name="TextBox 39">
+            <a:extLst>
+              <a:ext uri="{FF2B5EF4-FFF2-40B4-BE49-F238E27FC236}">
+                <a16:creationId xmlns:a16="http://schemas.microsoft.com/office/drawing/2014/main" id="{2C44C6AC-061F-4589-A4F4-7E3B77A3D860}"/>
+              </a:ext>
+            </a:extLst>
+          </p:cNvPr>
+          <p:cNvSpPr txBox="1"/>
+          <p:nvPr/>
+        </p:nvSpPr>
+        <p:spPr>
+          <a:xfrm>
+            <a:off x="5886182" y="4133542"/>
+            <a:ext cx="731520" cy="369332"/>
+          </a:xfrm>
+          <a:prstGeom prst="rect">
+            <a:avLst/>
+          </a:prstGeom>
+          <a:noFill/>
+        </p:spPr>
+        <p:txBody>
+          <a:bodyPr wrap="square" rtlCol="0">
+            <a:spAutoFit/>
+          </a:bodyPr>
+          <a:lstStyle/>
+          <a:p>
+            <a:r>
+              <a:rPr lang="en-US" i="1" dirty="0"/>
+              <a:t>2.36</a:t>
+            </a:r>
+          </a:p>
+        </p:txBody>
+      </p:sp>
+      <p:sp>
+        <p:nvSpPr>
+          <p:cNvPr id="41" name="TextBox 40">
+            <a:extLst>
+              <a:ext uri="{FF2B5EF4-FFF2-40B4-BE49-F238E27FC236}">
+                <a16:creationId xmlns:a16="http://schemas.microsoft.com/office/drawing/2014/main" id="{63F0F759-FEFB-45E5-96E8-BF542FF32506}"/>
+              </a:ext>
+            </a:extLst>
+          </p:cNvPr>
+          <p:cNvSpPr txBox="1"/>
+          <p:nvPr/>
+        </p:nvSpPr>
+        <p:spPr>
+          <a:xfrm>
+            <a:off x="5886182" y="4585704"/>
+            <a:ext cx="731520" cy="369332"/>
+          </a:xfrm>
+          <a:prstGeom prst="rect">
+            <a:avLst/>
+          </a:prstGeom>
+          <a:noFill/>
+        </p:spPr>
+        <p:txBody>
+          <a:bodyPr wrap="square" rtlCol="0">
+            <a:spAutoFit/>
+          </a:bodyPr>
+          <a:lstStyle/>
+          <a:p>
+            <a:r>
+              <a:rPr lang="en-US" i="1" dirty="0"/>
+              <a:t>2.06</a:t>
+            </a:r>
+          </a:p>
+        </p:txBody>
+      </p:sp>
+      <p:sp>
+        <p:nvSpPr>
+          <p:cNvPr id="42" name="TextBox 41">
+            <a:extLst>
+              <a:ext uri="{FF2B5EF4-FFF2-40B4-BE49-F238E27FC236}">
+                <a16:creationId xmlns:a16="http://schemas.microsoft.com/office/drawing/2014/main" id="{F31D36E4-3ACF-42C6-A90E-7FDC1B6AE96B}"/>
+              </a:ext>
+            </a:extLst>
+          </p:cNvPr>
+          <p:cNvSpPr txBox="1"/>
+          <p:nvPr/>
+        </p:nvSpPr>
+        <p:spPr>
+          <a:xfrm>
+            <a:off x="5886182" y="5037866"/>
+            <a:ext cx="731520" cy="369332"/>
+          </a:xfrm>
+          <a:prstGeom prst="rect">
+            <a:avLst/>
+          </a:prstGeom>
+          <a:noFill/>
+        </p:spPr>
+        <p:txBody>
+          <a:bodyPr wrap="square" rtlCol="0">
+            <a:spAutoFit/>
+          </a:bodyPr>
+          <a:lstStyle/>
+          <a:p>
+            <a:r>
+              <a:rPr lang="en-US" i="1" dirty="0"/>
+              <a:t>1.73</a:t>
+            </a:r>
+          </a:p>
+        </p:txBody>
+      </p:sp>
+      <p:sp>
+        <p:nvSpPr>
+          <p:cNvPr id="43" name="TextBox 42">
+            <a:extLst>
+              <a:ext uri="{FF2B5EF4-FFF2-40B4-BE49-F238E27FC236}">
+                <a16:creationId xmlns:a16="http://schemas.microsoft.com/office/drawing/2014/main" id="{8709CAB3-5AC7-4615-96F9-B40B2F948D3B}"/>
+              </a:ext>
+            </a:extLst>
+          </p:cNvPr>
+          <p:cNvSpPr txBox="1"/>
+          <p:nvPr/>
+        </p:nvSpPr>
+        <p:spPr>
+          <a:xfrm>
+            <a:off x="5886182" y="5490028"/>
+            <a:ext cx="731520" cy="369332"/>
+          </a:xfrm>
+          <a:prstGeom prst="rect">
+            <a:avLst/>
+          </a:prstGeom>
+          <a:noFill/>
+        </p:spPr>
+        <p:txBody>
+          <a:bodyPr wrap="square" rtlCol="0">
+            <a:spAutoFit/>
+          </a:bodyPr>
+          <a:lstStyle/>
+          <a:p>
+            <a:r>
+              <a:rPr lang="en-US" i="1" dirty="0"/>
+              <a:t>1.00</a:t>
+            </a:r>
+          </a:p>
+        </p:txBody>
+      </p:sp>
+      <p:sp>
+        <p:nvSpPr>
+          <p:cNvPr id="44" name="TextBox 43">
+            <a:extLst>
+              <a:ext uri="{FF2B5EF4-FFF2-40B4-BE49-F238E27FC236}">
+                <a16:creationId xmlns:a16="http://schemas.microsoft.com/office/drawing/2014/main" id="{E58CBCEE-8AFC-4F71-917B-1D37760F0D3C}"/>
+              </a:ext>
+            </a:extLst>
+          </p:cNvPr>
+          <p:cNvSpPr txBox="1"/>
+          <p:nvPr/>
+        </p:nvSpPr>
+        <p:spPr>
+          <a:xfrm>
+            <a:off x="5886182" y="5942192"/>
+            <a:ext cx="731520" cy="369332"/>
+          </a:xfrm>
+          <a:prstGeom prst="rect">
+            <a:avLst/>
+          </a:prstGeom>
+          <a:noFill/>
+        </p:spPr>
+        <p:txBody>
+          <a:bodyPr wrap="square" rtlCol="0">
+            <a:spAutoFit/>
+          </a:bodyPr>
+          <a:lstStyle/>
+          <a:p>
+            <a:r>
+              <a:rPr lang="en-US" i="1" dirty="0"/>
+              <a:t>1.00</a:t>
+            </a:r>
+          </a:p>
+        </p:txBody>
+      </p:sp>
+      <p:sp>
+        <p:nvSpPr>
+          <p:cNvPr id="47" name="TextBox 46">
+            <a:extLst>
+              <a:ext uri="{FF2B5EF4-FFF2-40B4-BE49-F238E27FC236}">
+                <a16:creationId xmlns:a16="http://schemas.microsoft.com/office/drawing/2014/main" id="{A8CB7327-4B7C-4CFF-BF8F-1EC69FFBE0D4}"/>
+              </a:ext>
+            </a:extLst>
+          </p:cNvPr>
+          <p:cNvSpPr txBox="1"/>
+          <p:nvPr/>
+        </p:nvSpPr>
+        <p:spPr>
+          <a:xfrm>
+            <a:off x="1100439" y="50733"/>
+            <a:ext cx="2106526" cy="461665"/>
+          </a:xfrm>
+          <a:prstGeom prst="rect">
+            <a:avLst/>
+          </a:prstGeom>
+          <a:noFill/>
+        </p:spPr>
+        <p:txBody>
+          <a:bodyPr wrap="square" rtlCol="0">
+            <a:spAutoFit/>
+          </a:bodyPr>
+          <a:lstStyle/>
+          <a:p>
+            <a:r>
+              <a:rPr lang="en-US" sz="2400" dirty="0"/>
+              <a:t>Ground-Truth</a:t>
+            </a:r>
+          </a:p>
+        </p:txBody>
+      </p:sp>
+      <p:sp>
+        <p:nvSpPr>
+          <p:cNvPr id="48" name="TextBox 47">
+            <a:extLst>
+              <a:ext uri="{FF2B5EF4-FFF2-40B4-BE49-F238E27FC236}">
+                <a16:creationId xmlns:a16="http://schemas.microsoft.com/office/drawing/2014/main" id="{A2D8AA5B-2C88-4914-B375-A438676E4637}"/>
+              </a:ext>
+            </a:extLst>
+          </p:cNvPr>
+          <p:cNvSpPr txBox="1"/>
+          <p:nvPr/>
+        </p:nvSpPr>
+        <p:spPr>
+          <a:xfrm>
+            <a:off x="3384066" y="50733"/>
+            <a:ext cx="2106526" cy="461665"/>
+          </a:xfrm>
+          <a:prstGeom prst="rect">
+            <a:avLst/>
+          </a:prstGeom>
+          <a:noFill/>
+        </p:spPr>
+        <p:txBody>
+          <a:bodyPr wrap="square" rtlCol="0">
+            <a:spAutoFit/>
+          </a:bodyPr>
+          <a:lstStyle/>
+          <a:p>
+            <a:r>
+              <a:rPr lang="en-US" sz="2400" dirty="0"/>
+              <a:t>Reconstructed</a:t>
+            </a:r>
+          </a:p>
+        </p:txBody>
+      </p:sp>
+      <p:cxnSp>
+        <p:nvCxnSpPr>
+          <p:cNvPr id="49" name="Straight Connector 48">
+            <a:extLst>
+              <a:ext uri="{FF2B5EF4-FFF2-40B4-BE49-F238E27FC236}">
+                <a16:creationId xmlns:a16="http://schemas.microsoft.com/office/drawing/2014/main" id="{64FAC628-AEE1-4473-9B9F-CF78BBB43CB4}"/>
+              </a:ext>
+            </a:extLst>
+          </p:cNvPr>
+          <p:cNvCxnSpPr>
+            <a:cxnSpLocks/>
+          </p:cNvCxnSpPr>
+          <p:nvPr/>
+        </p:nvCxnSpPr>
+        <p:spPr>
+          <a:xfrm>
+            <a:off x="880283" y="647737"/>
+            <a:ext cx="0" cy="2103120"/>
+          </a:xfrm>
+          <a:prstGeom prst="line">
+            <a:avLst/>
+          </a:prstGeom>
+          <a:ln w="28575"/>
+        </p:spPr>
+        <p:style>
+          <a:lnRef idx="1">
+            <a:schemeClr val="dk1"/>
+          </a:lnRef>
+          <a:fillRef idx="0">
+            <a:schemeClr val="dk1"/>
+          </a:fillRef>
+          <a:effectRef idx="0">
+            <a:schemeClr val="dk1"/>
+          </a:effectRef>
+          <a:fontRef idx="minor">
+            <a:schemeClr val="tx1"/>
+          </a:fontRef>
+        </p:style>
+      </p:cxnSp>
+      <p:cxnSp>
+        <p:nvCxnSpPr>
+          <p:cNvPr id="50" name="Straight Connector 49">
+            <a:extLst>
+              <a:ext uri="{FF2B5EF4-FFF2-40B4-BE49-F238E27FC236}">
+                <a16:creationId xmlns:a16="http://schemas.microsoft.com/office/drawing/2014/main" id="{95EF20A3-3698-40CA-92B5-6536DC0559ED}"/>
+              </a:ext>
+            </a:extLst>
+          </p:cNvPr>
+          <p:cNvCxnSpPr>
+            <a:cxnSpLocks/>
+          </p:cNvCxnSpPr>
+          <p:nvPr/>
+        </p:nvCxnSpPr>
+        <p:spPr>
+          <a:xfrm>
+            <a:off x="880283" y="2994691"/>
+            <a:ext cx="0" cy="2011680"/>
+          </a:xfrm>
+          <a:prstGeom prst="line">
+            <a:avLst/>
+          </a:prstGeom>
+          <a:ln w="28575"/>
+        </p:spPr>
+        <p:style>
+          <a:lnRef idx="1">
+            <a:schemeClr val="dk1"/>
+          </a:lnRef>
+          <a:fillRef idx="0">
+            <a:schemeClr val="dk1"/>
+          </a:fillRef>
+          <a:effectRef idx="0">
+            <a:schemeClr val="dk1"/>
+          </a:effectRef>
+          <a:fontRef idx="minor">
+            <a:schemeClr val="tx1"/>
+          </a:fontRef>
+        </p:style>
+      </p:cxnSp>
+      <p:cxnSp>
+        <p:nvCxnSpPr>
+          <p:cNvPr id="51" name="Straight Connector 50">
+            <a:extLst>
+              <a:ext uri="{FF2B5EF4-FFF2-40B4-BE49-F238E27FC236}">
+                <a16:creationId xmlns:a16="http://schemas.microsoft.com/office/drawing/2014/main" id="{07126E32-7588-472B-B7C2-8E79B69E2D6A}"/>
+              </a:ext>
+            </a:extLst>
+          </p:cNvPr>
+          <p:cNvCxnSpPr>
+            <a:cxnSpLocks/>
+          </p:cNvCxnSpPr>
+          <p:nvPr/>
+        </p:nvCxnSpPr>
+        <p:spPr>
+          <a:xfrm>
+            <a:off x="880283" y="5243176"/>
+            <a:ext cx="0" cy="1097280"/>
+          </a:xfrm>
+          <a:prstGeom prst="line">
+            <a:avLst/>
+          </a:prstGeom>
+          <a:ln w="28575"/>
+        </p:spPr>
+        <p:style>
+          <a:lnRef idx="1">
+            <a:schemeClr val="dk1"/>
+          </a:lnRef>
+          <a:fillRef idx="0">
+            <a:schemeClr val="dk1"/>
+          </a:fillRef>
+          <a:effectRef idx="0">
+            <a:schemeClr val="dk1"/>
+          </a:effectRef>
+          <a:fontRef idx="minor">
+            <a:schemeClr val="tx1"/>
+          </a:fontRef>
+        </p:style>
+      </p:cxnSp>
+      <p:sp>
+        <p:nvSpPr>
+          <p:cNvPr id="52" name="TextBox 51">
+            <a:extLst>
+              <a:ext uri="{FF2B5EF4-FFF2-40B4-BE49-F238E27FC236}">
+                <a16:creationId xmlns:a16="http://schemas.microsoft.com/office/drawing/2014/main" id="{9A278843-17F6-4EB6-B61D-47143CF04B00}"/>
+              </a:ext>
+            </a:extLst>
+          </p:cNvPr>
+          <p:cNvSpPr txBox="1"/>
+          <p:nvPr/>
+        </p:nvSpPr>
+        <p:spPr>
+          <a:xfrm rot="16200000">
+            <a:off x="-115044" y="1352402"/>
+            <a:ext cx="1375948" cy="461665"/>
+          </a:xfrm>
+          <a:prstGeom prst="rect">
+            <a:avLst/>
+          </a:prstGeom>
+          <a:noFill/>
+        </p:spPr>
+        <p:txBody>
+          <a:bodyPr wrap="square" rtlCol="0">
+            <a:spAutoFit/>
+          </a:bodyPr>
+          <a:lstStyle/>
+          <a:p>
+            <a:r>
+              <a:rPr lang="en-US" sz="2400" i="1" dirty="0"/>
+              <a:t>SD = 2.1</a:t>
+            </a:r>
+          </a:p>
+        </p:txBody>
+      </p:sp>
+      <p:sp>
+        <p:nvSpPr>
+          <p:cNvPr id="53" name="TextBox 52">
+            <a:extLst>
+              <a:ext uri="{FF2B5EF4-FFF2-40B4-BE49-F238E27FC236}">
+                <a16:creationId xmlns:a16="http://schemas.microsoft.com/office/drawing/2014/main" id="{41E90634-0A6F-4934-A748-F65921C873A0}"/>
+              </a:ext>
+            </a:extLst>
+          </p:cNvPr>
+          <p:cNvSpPr txBox="1"/>
+          <p:nvPr/>
+        </p:nvSpPr>
+        <p:spPr>
+          <a:xfrm rot="16200000">
+            <a:off x="-115045" y="3779622"/>
+            <a:ext cx="1375948" cy="461665"/>
+          </a:xfrm>
+          <a:prstGeom prst="rect">
+            <a:avLst/>
+          </a:prstGeom>
+          <a:noFill/>
+        </p:spPr>
+        <p:txBody>
+          <a:bodyPr wrap="square" rtlCol="0">
+            <a:spAutoFit/>
+          </a:bodyPr>
+          <a:lstStyle/>
+          <a:p>
+            <a:r>
+              <a:rPr lang="en-US" sz="2400" i="1" dirty="0"/>
+              <a:t>SD = 1.1</a:t>
+            </a:r>
+          </a:p>
+        </p:txBody>
+      </p:sp>
+      <p:sp>
+        <p:nvSpPr>
+          <p:cNvPr id="54" name="TextBox 53">
+            <a:extLst>
+              <a:ext uri="{FF2B5EF4-FFF2-40B4-BE49-F238E27FC236}">
+                <a16:creationId xmlns:a16="http://schemas.microsoft.com/office/drawing/2014/main" id="{73414921-1F21-4432-B55D-F52557A71192}"/>
+              </a:ext>
+            </a:extLst>
+          </p:cNvPr>
+          <p:cNvSpPr txBox="1"/>
+          <p:nvPr/>
+        </p:nvSpPr>
+        <p:spPr>
+          <a:xfrm rot="16200000">
+            <a:off x="-110547" y="5518867"/>
+            <a:ext cx="1375948" cy="461665"/>
+          </a:xfrm>
+          <a:prstGeom prst="rect">
+            <a:avLst/>
+          </a:prstGeom>
+          <a:noFill/>
+        </p:spPr>
+        <p:txBody>
+          <a:bodyPr wrap="square" rtlCol="0">
+            <a:spAutoFit/>
+          </a:bodyPr>
+          <a:lstStyle/>
+          <a:p>
+            <a:r>
+              <a:rPr lang="en-US" sz="2400" i="1" dirty="0"/>
+              <a:t>SD = 0.1</a:t>
+            </a:r>
+          </a:p>
+        </p:txBody>
+      </p:sp>
+      <p:cxnSp>
+        <p:nvCxnSpPr>
+          <p:cNvPr id="55" name="Straight Connector 54">
+            <a:extLst>
+              <a:ext uri="{FF2B5EF4-FFF2-40B4-BE49-F238E27FC236}">
+                <a16:creationId xmlns:a16="http://schemas.microsoft.com/office/drawing/2014/main" id="{4B2DA128-8902-4CAA-873F-556D1FA1DEF6}"/>
+              </a:ext>
+            </a:extLst>
+          </p:cNvPr>
+          <p:cNvCxnSpPr>
+            <a:cxnSpLocks/>
+          </p:cNvCxnSpPr>
+          <p:nvPr/>
+        </p:nvCxnSpPr>
+        <p:spPr>
+          <a:xfrm>
+            <a:off x="497001" y="2898565"/>
+            <a:ext cx="5394960" cy="0"/>
+          </a:xfrm>
+          <a:prstGeom prst="line">
+            <a:avLst/>
+          </a:prstGeom>
+          <a:ln w="28575">
+            <a:solidFill>
+              <a:schemeClr val="bg1"/>
+            </a:solidFill>
+          </a:ln>
+        </p:spPr>
+        <p:style>
+          <a:lnRef idx="1">
+            <a:schemeClr val="dk1"/>
+          </a:lnRef>
+          <a:fillRef idx="0">
+            <a:schemeClr val="dk1"/>
+          </a:fillRef>
+          <a:effectRef idx="0">
+            <a:schemeClr val="dk1"/>
+          </a:effectRef>
+          <a:fontRef idx="minor">
+            <a:schemeClr val="tx1"/>
+          </a:fontRef>
+        </p:style>
+      </p:cxnSp>
+      <p:cxnSp>
+        <p:nvCxnSpPr>
+          <p:cNvPr id="56" name="Straight Connector 55">
+            <a:extLst>
+              <a:ext uri="{FF2B5EF4-FFF2-40B4-BE49-F238E27FC236}">
+                <a16:creationId xmlns:a16="http://schemas.microsoft.com/office/drawing/2014/main" id="{4DB1ED83-D280-4C4D-91AA-53C981FBED1C}"/>
+              </a:ext>
+            </a:extLst>
+          </p:cNvPr>
+          <p:cNvCxnSpPr>
+            <a:cxnSpLocks/>
+          </p:cNvCxnSpPr>
+          <p:nvPr/>
+        </p:nvCxnSpPr>
+        <p:spPr>
+          <a:xfrm>
+            <a:off x="423371" y="5336963"/>
+            <a:ext cx="5394960" cy="0"/>
+          </a:xfrm>
+          <a:prstGeom prst="line">
+            <a:avLst/>
+          </a:prstGeom>
+          <a:ln w="28575">
+            <a:solidFill>
+              <a:schemeClr val="bg1"/>
+            </a:solidFill>
+          </a:ln>
+        </p:spPr>
+        <p:style>
+          <a:lnRef idx="1">
+            <a:schemeClr val="dk1"/>
+          </a:lnRef>
+          <a:fillRef idx="0">
+            <a:schemeClr val="dk1"/>
+          </a:fillRef>
+          <a:effectRef idx="0">
+            <a:schemeClr val="dk1"/>
+          </a:effectRef>
+          <a:fontRef idx="minor">
+            <a:schemeClr val="tx1"/>
+          </a:fontRef>
+        </p:style>
+      </p:cxnSp>
+      <p:pic>
+        <p:nvPicPr>
+          <p:cNvPr id="57" name="Picture 56" descr="A close up of a logo&#10;&#10;Description automatically generated">
+            <a:extLst>
+              <a:ext uri="{FF2B5EF4-FFF2-40B4-BE49-F238E27FC236}">
+                <a16:creationId xmlns:a16="http://schemas.microsoft.com/office/drawing/2014/main" id="{9506BAD9-B9B6-4C77-9D4F-0A14DA68271F}"/>
+              </a:ext>
+            </a:extLst>
+          </p:cNvPr>
+          <p:cNvPicPr>
+            <a:picLocks noChangeAspect="1"/>
+          </p:cNvPicPr>
+          <p:nvPr/>
+        </p:nvPicPr>
+        <p:blipFill rotWithShape="1">
+          <a:blip r:embed="rId6">
+            <a:extLst>
+              <a:ext uri="{28A0092B-C50C-407E-A947-70E740481C1C}">
+                <a14:useLocalDpi xmlns:a14="http://schemas.microsoft.com/office/drawing/2010/main" val="0"/>
+              </a:ext>
+            </a:extLst>
+          </a:blip>
+          <a:srcRect l="12111" t="1003" r="30632" b="-109"/>
+          <a:stretch/>
+        </p:blipFill>
+        <p:spPr>
+          <a:xfrm>
+            <a:off x="3425099" y="439581"/>
+            <a:ext cx="2354839" cy="6222944"/>
+          </a:xfrm>
+          <a:prstGeom prst="rect">
+            <a:avLst/>
+          </a:prstGeom>
+        </p:spPr>
+      </p:pic>
+      <p:pic>
+        <p:nvPicPr>
+          <p:cNvPr id="58" name="Picture 57" descr="A screenshot of a cell phone&#10;&#10;Description automatically generated">
+            <a:extLst>
+              <a:ext uri="{FF2B5EF4-FFF2-40B4-BE49-F238E27FC236}">
+                <a16:creationId xmlns:a16="http://schemas.microsoft.com/office/drawing/2014/main" id="{B2AC8455-2284-44AA-A50A-791A8A381519}"/>
+              </a:ext>
+            </a:extLst>
+          </p:cNvPr>
+          <p:cNvPicPr>
+            <a:picLocks noChangeAspect="1"/>
+          </p:cNvPicPr>
+          <p:nvPr/>
+        </p:nvPicPr>
+        <p:blipFill rotWithShape="1">
+          <a:blip r:embed="rId7">
+            <a:extLst>
+              <a:ext uri="{28A0092B-C50C-407E-A947-70E740481C1C}">
+                <a14:useLocalDpi xmlns:a14="http://schemas.microsoft.com/office/drawing/2010/main" val="0"/>
+              </a:ext>
+            </a:extLst>
+          </a:blip>
+          <a:srcRect l="11487" t="448" r="34299" b="448"/>
+          <a:stretch/>
+        </p:blipFill>
+        <p:spPr>
+          <a:xfrm>
+            <a:off x="1054283" y="439581"/>
+            <a:ext cx="2289814" cy="6205644"/>
+          </a:xfrm>
+          <a:prstGeom prst="rect">
+            <a:avLst/>
+          </a:prstGeom>
+        </p:spPr>
+      </p:pic>
+      <p:cxnSp>
+        <p:nvCxnSpPr>
+          <p:cNvPr id="59" name="Straight Connector 58">
+            <a:extLst>
+              <a:ext uri="{FF2B5EF4-FFF2-40B4-BE49-F238E27FC236}">
+                <a16:creationId xmlns:a16="http://schemas.microsoft.com/office/drawing/2014/main" id="{71504BDE-DD04-42BB-816D-AB254520B5CE}"/>
+              </a:ext>
+            </a:extLst>
+          </p:cNvPr>
+          <p:cNvCxnSpPr>
+            <a:cxnSpLocks/>
+          </p:cNvCxnSpPr>
+          <p:nvPr/>
+        </p:nvCxnSpPr>
+        <p:spPr>
+          <a:xfrm>
+            <a:off x="643011" y="2813824"/>
+            <a:ext cx="5394960" cy="0"/>
+          </a:xfrm>
+          <a:prstGeom prst="line">
+            <a:avLst/>
+          </a:prstGeom>
+          <a:ln w="28575">
+            <a:solidFill>
+              <a:schemeClr val="bg1"/>
+            </a:solidFill>
+          </a:ln>
+        </p:spPr>
+        <p:style>
+          <a:lnRef idx="1">
+            <a:schemeClr val="dk1"/>
+          </a:lnRef>
+          <a:fillRef idx="0">
+            <a:schemeClr val="dk1"/>
+          </a:fillRef>
+          <a:effectRef idx="0">
+            <a:schemeClr val="dk1"/>
+          </a:effectRef>
+          <a:fontRef idx="minor">
+            <a:schemeClr val="tx1"/>
+          </a:fontRef>
+        </p:style>
+      </p:cxnSp>
+      <p:cxnSp>
+        <p:nvCxnSpPr>
+          <p:cNvPr id="60" name="Straight Connector 59">
+            <a:extLst>
+              <a:ext uri="{FF2B5EF4-FFF2-40B4-BE49-F238E27FC236}">
+                <a16:creationId xmlns:a16="http://schemas.microsoft.com/office/drawing/2014/main" id="{81593978-7F8C-4489-AE66-9315A0CC1D6C}"/>
+              </a:ext>
+            </a:extLst>
+          </p:cNvPr>
+          <p:cNvCxnSpPr>
+            <a:cxnSpLocks/>
+          </p:cNvCxnSpPr>
+          <p:nvPr/>
+        </p:nvCxnSpPr>
+        <p:spPr>
+          <a:xfrm>
+            <a:off x="604434" y="5168147"/>
+            <a:ext cx="5394960" cy="0"/>
+          </a:xfrm>
+          <a:prstGeom prst="line">
+            <a:avLst/>
+          </a:prstGeom>
+          <a:ln w="28575">
+            <a:solidFill>
+              <a:schemeClr val="bg1"/>
+            </a:solidFill>
+          </a:ln>
+        </p:spPr>
+        <p:style>
+          <a:lnRef idx="1">
+            <a:schemeClr val="dk1"/>
+          </a:lnRef>
+          <a:fillRef idx="0">
+            <a:schemeClr val="dk1"/>
+          </a:fillRef>
+          <a:effectRef idx="0">
+            <a:schemeClr val="dk1"/>
+          </a:effectRef>
+          <a:fontRef idx="minor">
+            <a:schemeClr val="tx1"/>
+          </a:fontRef>
+        </p:style>
+      </p:cxnSp>
+      <p:sp>
+        <p:nvSpPr>
+          <p:cNvPr id="61" name="TextBox 60">
+            <a:extLst>
+              <a:ext uri="{FF2B5EF4-FFF2-40B4-BE49-F238E27FC236}">
+                <a16:creationId xmlns:a16="http://schemas.microsoft.com/office/drawing/2014/main" id="{0C53B937-2AB9-49C1-A1BE-82C31ECBE918}"/>
+              </a:ext>
+            </a:extLst>
+          </p:cNvPr>
+          <p:cNvSpPr txBox="1"/>
+          <p:nvPr/>
+        </p:nvSpPr>
+        <p:spPr>
+          <a:xfrm>
+            <a:off x="6134430" y="-82827"/>
+            <a:ext cx="568590" cy="523220"/>
+          </a:xfrm>
+          <a:prstGeom prst="rect">
+            <a:avLst/>
+          </a:prstGeom>
+          <a:noFill/>
+        </p:spPr>
+        <p:txBody>
+          <a:bodyPr wrap="square" rtlCol="0">
+            <a:spAutoFit/>
+          </a:bodyPr>
+          <a:lstStyle>
+            <a:defPPr>
+              <a:defRPr lang="en-US"/>
+            </a:defPPr>
+            <a:lvl1pPr>
+              <a:defRPr sz="2800" b="1"/>
+            </a:lvl1pPr>
+          </a:lstStyle>
+          <a:p>
+            <a:r>
+              <a:rPr lang="en-US" dirty="0"/>
+              <a:t>B</a:t>
+            </a:r>
+          </a:p>
+        </p:txBody>
+      </p:sp>
+      <p:sp>
+        <p:nvSpPr>
+          <p:cNvPr id="62" name="TextBox 61">
+            <a:extLst>
+              <a:ext uri="{FF2B5EF4-FFF2-40B4-BE49-F238E27FC236}">
+                <a16:creationId xmlns:a16="http://schemas.microsoft.com/office/drawing/2014/main" id="{9C1C1A92-57F0-4FD9-ABB3-89A1B1619DCB}"/>
+              </a:ext>
+            </a:extLst>
+          </p:cNvPr>
+          <p:cNvSpPr txBox="1"/>
+          <p:nvPr/>
+        </p:nvSpPr>
+        <p:spPr>
+          <a:xfrm>
+            <a:off x="688249" y="-82827"/>
+            <a:ext cx="568590" cy="523220"/>
+          </a:xfrm>
+          <a:prstGeom prst="rect">
+            <a:avLst/>
+          </a:prstGeom>
+          <a:noFill/>
+        </p:spPr>
+        <p:txBody>
+          <a:bodyPr wrap="square" rtlCol="0">
+            <a:spAutoFit/>
+          </a:bodyPr>
+          <a:lstStyle/>
+          <a:p>
+            <a:r>
+              <a:rPr lang="en-US" sz="2800" b="1" dirty="0"/>
+              <a:t>A</a:t>
+            </a:r>
+          </a:p>
+        </p:txBody>
+      </p:sp>
+      <p:sp>
+        <p:nvSpPr>
+          <p:cNvPr id="45" name="TextBox 44">
+            <a:extLst>
+              <a:ext uri="{FF2B5EF4-FFF2-40B4-BE49-F238E27FC236}">
+                <a16:creationId xmlns:a16="http://schemas.microsoft.com/office/drawing/2014/main" id="{5B097C8F-188D-49B0-B975-731EFCADB2CD}"/>
+              </a:ext>
+            </a:extLst>
+          </p:cNvPr>
+          <p:cNvSpPr txBox="1"/>
+          <p:nvPr/>
+        </p:nvSpPr>
+        <p:spPr>
+          <a:xfrm>
+            <a:off x="1566559" y="6470082"/>
+            <a:ext cx="1231314" cy="400110"/>
+          </a:xfrm>
+          <a:prstGeom prst="rect">
+            <a:avLst/>
+          </a:prstGeom>
+          <a:solidFill>
+            <a:schemeClr val="bg1"/>
+          </a:solidFill>
+        </p:spPr>
+        <p:txBody>
+          <a:bodyPr wrap="square" rtlCol="0">
+            <a:spAutoFit/>
+          </a:bodyPr>
+          <a:lstStyle/>
+          <a:p>
+            <a:r>
+              <a:rPr lang="en-US" sz="2000" dirty="0"/>
+              <a:t>Target ID</a:t>
+            </a:r>
+          </a:p>
+        </p:txBody>
+      </p:sp>
+      <p:sp>
+        <p:nvSpPr>
+          <p:cNvPr id="46" name="TextBox 45">
+            <a:extLst>
+              <a:ext uri="{FF2B5EF4-FFF2-40B4-BE49-F238E27FC236}">
+                <a16:creationId xmlns:a16="http://schemas.microsoft.com/office/drawing/2014/main" id="{EB65CB1A-CCBC-4A58-88D3-2C8E1DC6E33C}"/>
+              </a:ext>
+            </a:extLst>
+          </p:cNvPr>
+          <p:cNvSpPr txBox="1"/>
+          <p:nvPr/>
+        </p:nvSpPr>
+        <p:spPr>
+          <a:xfrm>
+            <a:off x="4010556" y="6470082"/>
+            <a:ext cx="1231314" cy="400110"/>
+          </a:xfrm>
+          <a:prstGeom prst="rect">
+            <a:avLst/>
+          </a:prstGeom>
+          <a:solidFill>
+            <a:schemeClr val="bg1"/>
+          </a:solidFill>
+        </p:spPr>
+        <p:txBody>
+          <a:bodyPr wrap="square" rtlCol="0">
+            <a:spAutoFit/>
+          </a:bodyPr>
+          <a:lstStyle/>
+          <a:p>
+            <a:r>
+              <a:rPr lang="en-US" sz="2000" dirty="0"/>
+              <a:t>Target ID</a:t>
+            </a:r>
+          </a:p>
+        </p:txBody>
+      </p:sp>
+      <p:sp>
+        <p:nvSpPr>
+          <p:cNvPr id="63" name="TextBox 62">
+            <a:extLst>
+              <a:ext uri="{FF2B5EF4-FFF2-40B4-BE49-F238E27FC236}">
+                <a16:creationId xmlns:a16="http://schemas.microsoft.com/office/drawing/2014/main" id="{A93DEDC6-6DC5-44EA-A12D-9441CE5D163D}"/>
+              </a:ext>
+            </a:extLst>
+          </p:cNvPr>
+          <p:cNvSpPr txBox="1"/>
+          <p:nvPr/>
+        </p:nvSpPr>
+        <p:spPr>
+          <a:xfrm>
+            <a:off x="7288520" y="6470082"/>
+            <a:ext cx="1231314" cy="400110"/>
+          </a:xfrm>
+          <a:prstGeom prst="rect">
+            <a:avLst/>
+          </a:prstGeom>
+          <a:solidFill>
+            <a:schemeClr val="bg1"/>
+          </a:solidFill>
+        </p:spPr>
+        <p:txBody>
+          <a:bodyPr wrap="square" rtlCol="0">
+            <a:spAutoFit/>
+          </a:bodyPr>
+          <a:lstStyle/>
+          <a:p>
+            <a:r>
+              <a:rPr lang="en-US" sz="2000" dirty="0"/>
+              <a:t>Target ID</a:t>
+            </a:r>
+          </a:p>
+        </p:txBody>
+      </p:sp>
+      <p:sp>
+        <p:nvSpPr>
+          <p:cNvPr id="64" name="TextBox 63">
+            <a:extLst>
+              <a:ext uri="{FF2B5EF4-FFF2-40B4-BE49-F238E27FC236}">
+                <a16:creationId xmlns:a16="http://schemas.microsoft.com/office/drawing/2014/main" id="{1FABE4CF-BC81-4D4F-B33F-052005AEC6A2}"/>
+              </a:ext>
+            </a:extLst>
+          </p:cNvPr>
+          <p:cNvSpPr txBox="1"/>
+          <p:nvPr/>
+        </p:nvSpPr>
+        <p:spPr>
+          <a:xfrm>
+            <a:off x="10190140" y="6470082"/>
+            <a:ext cx="1231314" cy="400110"/>
+          </a:xfrm>
+          <a:prstGeom prst="rect">
+            <a:avLst/>
+          </a:prstGeom>
+          <a:solidFill>
+            <a:schemeClr val="bg1"/>
+          </a:solidFill>
+        </p:spPr>
+        <p:txBody>
+          <a:bodyPr wrap="square" rtlCol="0">
+            <a:spAutoFit/>
+          </a:bodyPr>
+          <a:lstStyle/>
+          <a:p>
+            <a:r>
+              <a:rPr lang="en-US" sz="2000" dirty="0"/>
+              <a:t>Target ID</a:t>
+            </a:r>
+          </a:p>
+        </p:txBody>
+      </p:sp>
+    </p:spTree>
+    <p:extLst>
+      <p:ext uri="{BB962C8B-B14F-4D97-AF65-F5344CB8AC3E}">
+        <p14:creationId xmlns:p14="http://schemas.microsoft.com/office/powerpoint/2010/main" val="299593662"/>
       </p:ext>
     </p:extLst>
   </p:cSld>
@@ -7593,8 +9143,8 @@
           </a:p>
         </p:txBody>
       </p:sp>
-      <mc:AlternateContent xmlns:mc="http://schemas.openxmlformats.org/markup-compatibility/2006">
-        <mc:Choice xmlns:a14="http://schemas.microsoft.com/office/drawing/2010/main" Requires="a14">
+      <mc:AlternateContent xmlns:mc="http://schemas.openxmlformats.org/markup-compatibility/2006" xmlns:a14="http://schemas.microsoft.com/office/drawing/2010/main">
+        <mc:Choice Requires="a14">
           <p:sp>
             <p:nvSpPr>
               <p:cNvPr id="72" name="Rectangle 71">
@@ -7695,7 +9245,7 @@
             </p:txBody>
           </p:sp>
         </mc:Choice>
-        <mc:Fallback>
+        <mc:Fallback xmlns="">
           <p:sp>
             <p:nvSpPr>
               <p:cNvPr id="72" name="Rectangle 71">
@@ -7743,8 +9293,8 @@
           </p:sp>
         </mc:Fallback>
       </mc:AlternateContent>
-      <mc:AlternateContent xmlns:mc="http://schemas.openxmlformats.org/markup-compatibility/2006">
-        <mc:Choice xmlns:a14="http://schemas.microsoft.com/office/drawing/2010/main" Requires="a14">
+      <mc:AlternateContent xmlns:mc="http://schemas.openxmlformats.org/markup-compatibility/2006" xmlns:a14="http://schemas.microsoft.com/office/drawing/2010/main">
+        <mc:Choice Requires="a14">
           <p:sp>
             <p:nvSpPr>
               <p:cNvPr id="73" name="Rectangle 72">
@@ -7845,7 +9395,7 @@
             </p:txBody>
           </p:sp>
         </mc:Choice>
-        <mc:Fallback>
+        <mc:Fallback xmlns="">
           <p:sp>
             <p:nvSpPr>
               <p:cNvPr id="73" name="Rectangle 72">
@@ -7893,8 +9443,8 @@
           </p:sp>
         </mc:Fallback>
       </mc:AlternateContent>
-      <mc:AlternateContent xmlns:mc="http://schemas.openxmlformats.org/markup-compatibility/2006">
-        <mc:Choice xmlns:a14="http://schemas.microsoft.com/office/drawing/2010/main" Requires="a14">
+      <mc:AlternateContent xmlns:mc="http://schemas.openxmlformats.org/markup-compatibility/2006" xmlns:a14="http://schemas.microsoft.com/office/drawing/2010/main">
+        <mc:Choice Requires="a14">
           <p:sp>
             <p:nvSpPr>
               <p:cNvPr id="74" name="Rectangle 73">
@@ -7995,7 +9545,7 @@
             </p:txBody>
           </p:sp>
         </mc:Choice>
-        <mc:Fallback>
+        <mc:Fallback xmlns="">
           <p:sp>
             <p:nvSpPr>
               <p:cNvPr id="74" name="Rectangle 73">
@@ -8253,8 +9803,8 @@
           </a:p>
         </p:txBody>
       </p:sp>
-      <mc:AlternateContent xmlns:mc="http://schemas.openxmlformats.org/markup-compatibility/2006">
-        <mc:Choice xmlns:a14="http://schemas.microsoft.com/office/drawing/2010/main" Requires="a14">
+      <mc:AlternateContent xmlns:mc="http://schemas.openxmlformats.org/markup-compatibility/2006" xmlns:a14="http://schemas.microsoft.com/office/drawing/2010/main">
+        <mc:Choice Requires="a14">
           <p:sp>
             <p:nvSpPr>
               <p:cNvPr id="85" name="Rectangle 84">
@@ -8355,7 +9905,7 @@
             </p:txBody>
           </p:sp>
         </mc:Choice>
-        <mc:Fallback>
+        <mc:Fallback xmlns="">
           <p:sp>
             <p:nvSpPr>
               <p:cNvPr id="85" name="Rectangle 84">
@@ -8403,8 +9953,8 @@
           </p:sp>
         </mc:Fallback>
       </mc:AlternateContent>
-      <mc:AlternateContent xmlns:mc="http://schemas.openxmlformats.org/markup-compatibility/2006">
-        <mc:Choice xmlns:a14="http://schemas.microsoft.com/office/drawing/2010/main" Requires="a14">
+      <mc:AlternateContent xmlns:mc="http://schemas.openxmlformats.org/markup-compatibility/2006" xmlns:a14="http://schemas.microsoft.com/office/drawing/2010/main">
+        <mc:Choice Requires="a14">
           <p:sp>
             <p:nvSpPr>
               <p:cNvPr id="86" name="Rectangle 85">
@@ -8505,7 +10055,7 @@
             </p:txBody>
           </p:sp>
         </mc:Choice>
-        <mc:Fallback>
+        <mc:Fallback xmlns="">
           <p:sp>
             <p:nvSpPr>
               <p:cNvPr id="86" name="Rectangle 85">
@@ -8553,8 +10103,8 @@
           </p:sp>
         </mc:Fallback>
       </mc:AlternateContent>
-      <mc:AlternateContent xmlns:mc="http://schemas.openxmlformats.org/markup-compatibility/2006">
-        <mc:Choice xmlns:a14="http://schemas.microsoft.com/office/drawing/2010/main" Requires="a14">
+      <mc:AlternateContent xmlns:mc="http://schemas.openxmlformats.org/markup-compatibility/2006" xmlns:a14="http://schemas.microsoft.com/office/drawing/2010/main">
+        <mc:Choice Requires="a14">
           <p:sp>
             <p:nvSpPr>
               <p:cNvPr id="87" name="Rectangle 86">
@@ -8655,7 +10205,7 @@
             </p:txBody>
           </p:sp>
         </mc:Choice>
-        <mc:Fallback>
+        <mc:Fallback xmlns="">
           <p:sp>
             <p:nvSpPr>
               <p:cNvPr id="87" name="Rectangle 86">
@@ -8703,8 +10253,8 @@
           </p:sp>
         </mc:Fallback>
       </mc:AlternateContent>
-      <mc:AlternateContent xmlns:mc="http://schemas.openxmlformats.org/markup-compatibility/2006">
-        <mc:Choice xmlns:a14="http://schemas.microsoft.com/office/drawing/2010/main" Requires="a14">
+      <mc:AlternateContent xmlns:mc="http://schemas.openxmlformats.org/markup-compatibility/2006" xmlns:a14="http://schemas.microsoft.com/office/drawing/2010/main">
+        <mc:Choice Requires="a14">
           <p:sp>
             <p:nvSpPr>
               <p:cNvPr id="88" name="Oval 87">
@@ -8788,7 +10338,7 @@
             </p:txBody>
           </p:sp>
         </mc:Choice>
-        <mc:Fallback>
+        <mc:Fallback xmlns="">
           <p:sp>
             <p:nvSpPr>
               <p:cNvPr id="88" name="Oval 87">
@@ -8836,8 +10386,8 @@
           </p:sp>
         </mc:Fallback>
       </mc:AlternateContent>
-      <mc:AlternateContent xmlns:mc="http://schemas.openxmlformats.org/markup-compatibility/2006">
-        <mc:Choice xmlns:a14="http://schemas.microsoft.com/office/drawing/2010/main" Requires="a14">
+      <mc:AlternateContent xmlns:mc="http://schemas.openxmlformats.org/markup-compatibility/2006" xmlns:a14="http://schemas.microsoft.com/office/drawing/2010/main">
+        <mc:Choice Requires="a14">
           <p:sp>
             <p:nvSpPr>
               <p:cNvPr id="89" name="Rectangle 88">
@@ -8938,7 +10488,7 @@
             </p:txBody>
           </p:sp>
         </mc:Choice>
-        <mc:Fallback>
+        <mc:Fallback xmlns="">
           <p:sp>
             <p:nvSpPr>
               <p:cNvPr id="89" name="Rectangle 88">
@@ -8986,8 +10536,8 @@
           </p:sp>
         </mc:Fallback>
       </mc:AlternateContent>
-      <mc:AlternateContent xmlns:mc="http://schemas.openxmlformats.org/markup-compatibility/2006">
-        <mc:Choice xmlns:a14="http://schemas.microsoft.com/office/drawing/2010/main" Requires="a14">
+      <mc:AlternateContent xmlns:mc="http://schemas.openxmlformats.org/markup-compatibility/2006" xmlns:a14="http://schemas.microsoft.com/office/drawing/2010/main">
+        <mc:Choice Requires="a14">
           <p:sp>
             <p:nvSpPr>
               <p:cNvPr id="90" name="Oval 89">
@@ -9071,7 +10621,7 @@
             </p:txBody>
           </p:sp>
         </mc:Choice>
-        <mc:Fallback>
+        <mc:Fallback xmlns="">
           <p:sp>
             <p:nvSpPr>
               <p:cNvPr id="90" name="Oval 89">
@@ -9455,8 +11005,8 @@
           </a:p>
         </p:txBody>
       </p:sp>
-      <mc:AlternateContent xmlns:mc="http://schemas.openxmlformats.org/markup-compatibility/2006">
-        <mc:Choice xmlns:a14="http://schemas.microsoft.com/office/drawing/2010/main" Requires="a14">
+      <mc:AlternateContent xmlns:mc="http://schemas.openxmlformats.org/markup-compatibility/2006" xmlns:a14="http://schemas.microsoft.com/office/drawing/2010/main">
+        <mc:Choice Requires="a14">
           <p:sp>
             <p:nvSpPr>
               <p:cNvPr id="97" name="Rectangle 96">
@@ -9490,6 +11040,7 @@
                 </a:r>
               </a:p>
               <a:p>
+                <a:pPr/>
                 <a14:m>
                   <m:oMathPara xmlns:m="http://schemas.openxmlformats.org/officeDocument/2006/math">
                     <m:oMathParaPr>
@@ -9535,7 +11086,7 @@
             </p:txBody>
           </p:sp>
         </mc:Choice>
-        <mc:Fallback>
+        <mc:Fallback xmlns="">
           <p:sp>
             <p:nvSpPr>
               <p:cNvPr id="97" name="Rectangle 96">
@@ -9810,8 +11361,8 @@
           </a:fontRef>
         </p:style>
       </p:cxnSp>
-      <mc:AlternateContent xmlns:mc="http://schemas.openxmlformats.org/markup-compatibility/2006">
-        <mc:Choice xmlns:a14="http://schemas.microsoft.com/office/drawing/2010/main" Requires="a14">
+      <mc:AlternateContent xmlns:mc="http://schemas.openxmlformats.org/markup-compatibility/2006" xmlns:a14="http://schemas.microsoft.com/office/drawing/2010/main">
+        <mc:Choice Requires="a14">
           <p:sp>
             <p:nvSpPr>
               <p:cNvPr id="116" name="Oval 115">
@@ -9941,7 +11492,7 @@
             </p:txBody>
           </p:sp>
         </mc:Choice>
-        <mc:Fallback>
+        <mc:Fallback xmlns="">
           <p:sp>
             <p:nvSpPr>
               <p:cNvPr id="116" name="Oval 115">
@@ -10069,8 +11620,8 @@
           </a:fontRef>
         </p:style>
       </p:cxnSp>
-      <mc:AlternateContent xmlns:mc="http://schemas.openxmlformats.org/markup-compatibility/2006">
-        <mc:Choice xmlns:a14="http://schemas.microsoft.com/office/drawing/2010/main" Requires="a14">
+      <mc:AlternateContent xmlns:mc="http://schemas.openxmlformats.org/markup-compatibility/2006" xmlns:a14="http://schemas.microsoft.com/office/drawing/2010/main">
+        <mc:Choice Requires="a14">
           <p:sp>
             <p:nvSpPr>
               <p:cNvPr id="119" name="Rectangle 118">
@@ -10098,6 +11649,7 @@
               </a:bodyPr>
               <a:lstStyle/>
               <a:p>
+                <a:pPr/>
                 <a14:m>
                   <m:oMathPara xmlns:m="http://schemas.openxmlformats.org/officeDocument/2006/math">
                     <m:oMathParaPr>
@@ -10157,7 +11709,7 @@
             </p:txBody>
           </p:sp>
         </mc:Choice>
-        <mc:Fallback>
+        <mc:Fallback xmlns="">
           <p:sp>
             <p:nvSpPr>
               <p:cNvPr id="119" name="Rectangle 118">
@@ -10321,8 +11873,8 @@
           </a:p>
         </p:txBody>
       </p:sp>
-      <mc:AlternateContent xmlns:mc="http://schemas.openxmlformats.org/markup-compatibility/2006">
-        <mc:Choice xmlns:a14="http://schemas.microsoft.com/office/drawing/2010/main" Requires="a14">
+      <mc:AlternateContent xmlns:mc="http://schemas.openxmlformats.org/markup-compatibility/2006" xmlns:a14="http://schemas.microsoft.com/office/drawing/2010/main">
+        <mc:Choice Requires="a14">
           <p:sp>
             <p:nvSpPr>
               <p:cNvPr id="125" name="Rectangle 124">
@@ -10356,6 +11908,7 @@
                 </a:r>
               </a:p>
               <a:p>
+                <a:pPr/>
                 <a14:m>
                   <m:oMathPara xmlns:m="http://schemas.openxmlformats.org/officeDocument/2006/math">
                     <m:oMathParaPr>
@@ -10365,7 +11918,7 @@
                       <m:sSub>
                         <m:sSubPr>
                           <m:ctrlPr>
-                            <a:rPr lang="en-US" sz="2400" b="1" smtClean="0">
+                            <a:rPr lang="en-US" sz="2400" b="1" i="1" smtClean="0">
                               <a:latin typeface="Cambria Math" panose="02040503050406030204" pitchFamily="18" charset="0"/>
                             </a:rPr>
                           </m:ctrlPr>
@@ -10395,7 +11948,7 @@
             </p:txBody>
           </p:sp>
         </mc:Choice>
-        <mc:Fallback>
+        <mc:Fallback xmlns="">
           <p:sp>
             <p:nvSpPr>
               <p:cNvPr id="125" name="Rectangle 124">
@@ -10494,8 +12047,8 @@
           </a:p>
         </p:txBody>
       </p:sp>
-      <mc:AlternateContent xmlns:mc="http://schemas.openxmlformats.org/markup-compatibility/2006">
-        <mc:Choice xmlns:a14="http://schemas.microsoft.com/office/drawing/2010/main" Requires="a14">
+      <mc:AlternateContent xmlns:mc="http://schemas.openxmlformats.org/markup-compatibility/2006" xmlns:a14="http://schemas.microsoft.com/office/drawing/2010/main">
+        <mc:Choice Requires="a14">
           <p:sp>
             <p:nvSpPr>
               <p:cNvPr id="130" name="Rectangle 129">
@@ -10596,7 +12149,7 @@
             </p:txBody>
           </p:sp>
         </mc:Choice>
-        <mc:Fallback>
+        <mc:Fallback xmlns="">
           <p:sp>
             <p:nvSpPr>
               <p:cNvPr id="130" name="Rectangle 129">
@@ -10644,8 +12197,8 @@
           </p:sp>
         </mc:Fallback>
       </mc:AlternateContent>
-      <mc:AlternateContent xmlns:mc="http://schemas.openxmlformats.org/markup-compatibility/2006">
-        <mc:Choice xmlns:a14="http://schemas.microsoft.com/office/drawing/2010/main" Requires="a14">
+      <mc:AlternateContent xmlns:mc="http://schemas.openxmlformats.org/markup-compatibility/2006" xmlns:a14="http://schemas.microsoft.com/office/drawing/2010/main">
+        <mc:Choice Requires="a14">
           <p:sp>
             <p:nvSpPr>
               <p:cNvPr id="131" name="Rectangle 130">
@@ -10746,7 +12299,7 @@
             </p:txBody>
           </p:sp>
         </mc:Choice>
-        <mc:Fallback>
+        <mc:Fallback xmlns="">
           <p:sp>
             <p:nvSpPr>
               <p:cNvPr id="131" name="Rectangle 130">
@@ -10794,8 +12347,8 @@
           </p:sp>
         </mc:Fallback>
       </mc:AlternateContent>
-      <mc:AlternateContent xmlns:mc="http://schemas.openxmlformats.org/markup-compatibility/2006">
-        <mc:Choice xmlns:a14="http://schemas.microsoft.com/office/drawing/2010/main" Requires="a14">
+      <mc:AlternateContent xmlns:mc="http://schemas.openxmlformats.org/markup-compatibility/2006" xmlns:a14="http://schemas.microsoft.com/office/drawing/2010/main">
+        <mc:Choice Requires="a14">
           <p:sp>
             <p:nvSpPr>
               <p:cNvPr id="132" name="Rectangle 131">
@@ -10896,7 +12449,7 @@
             </p:txBody>
           </p:sp>
         </mc:Choice>
-        <mc:Fallback>
+        <mc:Fallback xmlns="">
           <p:sp>
             <p:nvSpPr>
               <p:cNvPr id="132" name="Rectangle 131">
@@ -11154,8 +12707,8 @@
           </a:p>
         </p:txBody>
       </p:sp>
-      <mc:AlternateContent xmlns:mc="http://schemas.openxmlformats.org/markup-compatibility/2006">
-        <mc:Choice xmlns:a14="http://schemas.microsoft.com/office/drawing/2010/main" Requires="a14">
+      <mc:AlternateContent xmlns:mc="http://schemas.openxmlformats.org/markup-compatibility/2006" xmlns:a14="http://schemas.microsoft.com/office/drawing/2010/main">
+        <mc:Choice Requires="a14">
           <p:sp>
             <p:nvSpPr>
               <p:cNvPr id="137" name="Rectangle 136">
@@ -11256,7 +12809,7 @@
             </p:txBody>
           </p:sp>
         </mc:Choice>
-        <mc:Fallback>
+        <mc:Fallback xmlns="">
           <p:sp>
             <p:nvSpPr>
               <p:cNvPr id="137" name="Rectangle 136">
@@ -11304,8 +12857,8 @@
           </p:sp>
         </mc:Fallback>
       </mc:AlternateContent>
-      <mc:AlternateContent xmlns:mc="http://schemas.openxmlformats.org/markup-compatibility/2006">
-        <mc:Choice xmlns:a14="http://schemas.microsoft.com/office/drawing/2010/main" Requires="a14">
+      <mc:AlternateContent xmlns:mc="http://schemas.openxmlformats.org/markup-compatibility/2006" xmlns:a14="http://schemas.microsoft.com/office/drawing/2010/main">
+        <mc:Choice Requires="a14">
           <p:sp>
             <p:nvSpPr>
               <p:cNvPr id="138" name="Rectangle 137">
@@ -11406,7 +12959,7 @@
             </p:txBody>
           </p:sp>
         </mc:Choice>
-        <mc:Fallback>
+        <mc:Fallback xmlns="">
           <p:sp>
             <p:nvSpPr>
               <p:cNvPr id="138" name="Rectangle 137">
@@ -11454,8 +13007,8 @@
           </p:sp>
         </mc:Fallback>
       </mc:AlternateContent>
-      <mc:AlternateContent xmlns:mc="http://schemas.openxmlformats.org/markup-compatibility/2006">
-        <mc:Choice xmlns:a14="http://schemas.microsoft.com/office/drawing/2010/main" Requires="a14">
+      <mc:AlternateContent xmlns:mc="http://schemas.openxmlformats.org/markup-compatibility/2006" xmlns:a14="http://schemas.microsoft.com/office/drawing/2010/main">
+        <mc:Choice Requires="a14">
           <p:sp>
             <p:nvSpPr>
               <p:cNvPr id="139" name="Rectangle 138">
@@ -11556,7 +13109,7 @@
             </p:txBody>
           </p:sp>
         </mc:Choice>
-        <mc:Fallback>
+        <mc:Fallback xmlns="">
           <p:sp>
             <p:nvSpPr>
               <p:cNvPr id="139" name="Rectangle 138">
@@ -11604,8 +13157,8 @@
           </p:sp>
         </mc:Fallback>
       </mc:AlternateContent>
-      <mc:AlternateContent xmlns:mc="http://schemas.openxmlformats.org/markup-compatibility/2006">
-        <mc:Choice xmlns:a14="http://schemas.microsoft.com/office/drawing/2010/main" Requires="a14">
+      <mc:AlternateContent xmlns:mc="http://schemas.openxmlformats.org/markup-compatibility/2006" xmlns:a14="http://schemas.microsoft.com/office/drawing/2010/main">
+        <mc:Choice Requires="a14">
           <p:sp>
             <p:nvSpPr>
               <p:cNvPr id="140" name="Oval 139">
@@ -11689,7 +13242,7 @@
             </p:txBody>
           </p:sp>
         </mc:Choice>
-        <mc:Fallback>
+        <mc:Fallback xmlns="">
           <p:sp>
             <p:nvSpPr>
               <p:cNvPr id="140" name="Oval 139">
@@ -11737,8 +13290,8 @@
           </p:sp>
         </mc:Fallback>
       </mc:AlternateContent>
-      <mc:AlternateContent xmlns:mc="http://schemas.openxmlformats.org/markup-compatibility/2006">
-        <mc:Choice xmlns:a14="http://schemas.microsoft.com/office/drawing/2010/main" Requires="a14">
+      <mc:AlternateContent xmlns:mc="http://schemas.openxmlformats.org/markup-compatibility/2006" xmlns:a14="http://schemas.microsoft.com/office/drawing/2010/main">
+        <mc:Choice Requires="a14">
           <p:sp>
             <p:nvSpPr>
               <p:cNvPr id="141" name="Rectangle 140">
@@ -11839,7 +13392,7 @@
             </p:txBody>
           </p:sp>
         </mc:Choice>
-        <mc:Fallback>
+        <mc:Fallback xmlns="">
           <p:sp>
             <p:nvSpPr>
               <p:cNvPr id="141" name="Rectangle 140">
@@ -11887,8 +13440,8 @@
           </p:sp>
         </mc:Fallback>
       </mc:AlternateContent>
-      <mc:AlternateContent xmlns:mc="http://schemas.openxmlformats.org/markup-compatibility/2006">
-        <mc:Choice xmlns:a14="http://schemas.microsoft.com/office/drawing/2010/main" Requires="a14">
+      <mc:AlternateContent xmlns:mc="http://schemas.openxmlformats.org/markup-compatibility/2006" xmlns:a14="http://schemas.microsoft.com/office/drawing/2010/main">
+        <mc:Choice Requires="a14">
           <p:sp>
             <p:nvSpPr>
               <p:cNvPr id="142" name="Oval 141">
@@ -11972,7 +13525,7 @@
             </p:txBody>
           </p:sp>
         </mc:Choice>
-        <mc:Fallback>
+        <mc:Fallback xmlns="">
           <p:sp>
             <p:nvSpPr>
               <p:cNvPr id="142" name="Oval 141">
@@ -12356,8 +13909,8 @@
           </a:p>
         </p:txBody>
       </p:sp>
-      <mc:AlternateContent xmlns:mc="http://schemas.openxmlformats.org/markup-compatibility/2006">
-        <mc:Choice xmlns:a14="http://schemas.microsoft.com/office/drawing/2010/main" Requires="a14">
+      <mc:AlternateContent xmlns:mc="http://schemas.openxmlformats.org/markup-compatibility/2006" xmlns:a14="http://schemas.microsoft.com/office/drawing/2010/main">
+        <mc:Choice Requires="a14">
           <p:sp>
             <p:nvSpPr>
               <p:cNvPr id="149" name="Rectangle 148">
@@ -12397,6 +13950,7 @@
                 </a:r>
               </a:p>
               <a:p>
+                <a:pPr/>
                 <a14:m>
                   <m:oMathPara xmlns:m="http://schemas.openxmlformats.org/officeDocument/2006/math">
                     <m:oMathParaPr>
@@ -12450,7 +14004,7 @@
             </p:txBody>
           </p:sp>
         </mc:Choice>
-        <mc:Fallback>
+        <mc:Fallback xmlns="">
           <p:sp>
             <p:nvSpPr>
               <p:cNvPr id="149" name="Rectangle 148">
@@ -12727,8 +14281,8 @@
           </a:fontRef>
         </p:style>
       </p:cxnSp>
-      <mc:AlternateContent xmlns:mc="http://schemas.openxmlformats.org/markup-compatibility/2006">
-        <mc:Choice xmlns:a14="http://schemas.microsoft.com/office/drawing/2010/main" Requires="a14">
+      <mc:AlternateContent xmlns:mc="http://schemas.openxmlformats.org/markup-compatibility/2006" xmlns:a14="http://schemas.microsoft.com/office/drawing/2010/main">
+        <mc:Choice Requires="a14">
           <p:sp>
             <p:nvSpPr>
               <p:cNvPr id="154" name="Oval 153">
@@ -12858,7 +14412,7 @@
             </p:txBody>
           </p:sp>
         </mc:Choice>
-        <mc:Fallback>
+        <mc:Fallback xmlns="">
           <p:sp>
             <p:nvSpPr>
               <p:cNvPr id="154" name="Oval 153">
@@ -13071,8 +14625,8 @@
           </a:fontRef>
         </p:style>
       </p:cxnSp>
-      <mc:AlternateContent xmlns:mc="http://schemas.openxmlformats.org/markup-compatibility/2006">
-        <mc:Choice xmlns:a14="http://schemas.microsoft.com/office/drawing/2010/main" Requires="a14">
+      <mc:AlternateContent xmlns:mc="http://schemas.openxmlformats.org/markup-compatibility/2006" xmlns:a14="http://schemas.microsoft.com/office/drawing/2010/main">
+        <mc:Choice Requires="a14">
           <p:sp>
             <p:nvSpPr>
               <p:cNvPr id="166" name="Rectangle 165">
@@ -13173,7 +14727,7 @@
             </p:txBody>
           </p:sp>
         </mc:Choice>
-        <mc:Fallback>
+        <mc:Fallback xmlns="">
           <p:sp>
             <p:nvSpPr>
               <p:cNvPr id="166" name="Rectangle 165">
@@ -13221,8 +14775,8 @@
           </p:sp>
         </mc:Fallback>
       </mc:AlternateContent>
-      <mc:AlternateContent xmlns:mc="http://schemas.openxmlformats.org/markup-compatibility/2006">
-        <mc:Choice xmlns:a14="http://schemas.microsoft.com/office/drawing/2010/main" Requires="a14">
+      <mc:AlternateContent xmlns:mc="http://schemas.openxmlformats.org/markup-compatibility/2006" xmlns:a14="http://schemas.microsoft.com/office/drawing/2010/main">
+        <mc:Choice Requires="a14">
           <p:sp>
             <p:nvSpPr>
               <p:cNvPr id="167" name="Rectangle 166">
@@ -13328,7 +14882,7 @@
             </p:txBody>
           </p:sp>
         </mc:Choice>
-        <mc:Fallback>
+        <mc:Fallback xmlns="">
           <p:sp>
             <p:nvSpPr>
               <p:cNvPr id="167" name="Rectangle 166">
@@ -13417,8 +14971,8 @@
           </a:fontRef>
         </p:style>
       </p:cxnSp>
-      <mc:AlternateContent xmlns:mc="http://schemas.openxmlformats.org/markup-compatibility/2006">
-        <mc:Choice xmlns:a14="http://schemas.microsoft.com/office/drawing/2010/main" Requires="a14">
+      <mc:AlternateContent xmlns:mc="http://schemas.openxmlformats.org/markup-compatibility/2006" xmlns:a14="http://schemas.microsoft.com/office/drawing/2010/main">
+        <mc:Choice Requires="a14">
           <p:sp>
             <p:nvSpPr>
               <p:cNvPr id="169" name="Rectangle 168">
@@ -13524,7 +15078,7 @@
             </p:txBody>
           </p:sp>
         </mc:Choice>
-        <mc:Fallback>
+        <mc:Fallback xmlns="">
           <p:sp>
             <p:nvSpPr>
               <p:cNvPr id="169" name="Rectangle 168">
@@ -13613,8 +15167,8 @@
           </a:fontRef>
         </p:style>
       </p:cxnSp>
-      <mc:AlternateContent xmlns:mc="http://schemas.openxmlformats.org/markup-compatibility/2006">
-        <mc:Choice xmlns:a14="http://schemas.microsoft.com/office/drawing/2010/main" Requires="a14">
+      <mc:AlternateContent xmlns:mc="http://schemas.openxmlformats.org/markup-compatibility/2006" xmlns:a14="http://schemas.microsoft.com/office/drawing/2010/main">
+        <mc:Choice Requires="a14">
           <p:sp>
             <p:nvSpPr>
               <p:cNvPr id="173" name="Rectangle 172">
@@ -13663,7 +15217,7 @@
             </p:txBody>
           </p:sp>
         </mc:Choice>
-        <mc:Fallback>
+        <mc:Fallback xmlns="">
           <p:sp>
             <p:nvSpPr>
               <p:cNvPr id="173" name="Rectangle 172">
@@ -13708,8 +15262,8 @@
           </p:sp>
         </mc:Fallback>
       </mc:AlternateContent>
-      <mc:AlternateContent xmlns:mc="http://schemas.openxmlformats.org/markup-compatibility/2006">
-        <mc:Choice xmlns:a14="http://schemas.microsoft.com/office/drawing/2010/main" Requires="a14">
+      <mc:AlternateContent xmlns:mc="http://schemas.openxmlformats.org/markup-compatibility/2006" xmlns:a14="http://schemas.microsoft.com/office/drawing/2010/main">
+        <mc:Choice Requires="a14">
           <p:sp>
             <p:nvSpPr>
               <p:cNvPr id="174" name="Rectangle 173">
@@ -13743,6 +15297,7 @@
                 </a:r>
               </a:p>
               <a:p>
+                <a:pPr/>
                 <a14:m>
                   <m:oMathPara xmlns:m="http://schemas.openxmlformats.org/officeDocument/2006/math">
                     <m:oMathParaPr>
@@ -13752,7 +15307,7 @@
                       <m:sSub>
                         <m:sSubPr>
                           <m:ctrlPr>
-                            <a:rPr lang="en-US" sz="2400" b="1" smtClean="0">
+                            <a:rPr lang="en-US" sz="2400" b="1" i="1" smtClean="0">
                               <a:latin typeface="Cambria Math" panose="02040503050406030204" pitchFamily="18" charset="0"/>
                             </a:rPr>
                           </m:ctrlPr>
@@ -13782,7 +15337,7 @@
             </p:txBody>
           </p:sp>
         </mc:Choice>
-        <mc:Fallback>
+        <mc:Fallback xmlns="">
           <p:sp>
             <p:nvSpPr>
               <p:cNvPr id="174" name="Rectangle 173">

</xml_diff>

<commit_message>
Clean up the draft and send to Josh
</commit_message>
<xml_diff>
--- a/report/RO-MAN/figures/ROMAN-figures.pptx
+++ b/report/RO-MAN/figures/ROMAN-figures.pptx
@@ -15167,8 +15167,8 @@
           </a:fontRef>
         </p:style>
       </p:cxnSp>
-      <mc:AlternateContent xmlns:mc="http://schemas.openxmlformats.org/markup-compatibility/2006" xmlns:a14="http://schemas.microsoft.com/office/drawing/2010/main">
-        <mc:Choice Requires="a14">
+      <mc:AlternateContent xmlns:mc="http://schemas.openxmlformats.org/markup-compatibility/2006">
+        <mc:Choice xmlns:a14="http://schemas.microsoft.com/office/drawing/2010/main" Requires="a14">
           <p:sp>
             <p:nvSpPr>
               <p:cNvPr id="173" name="Rectangle 172">
@@ -15184,7 +15184,7 @@
             <p:spPr>
               <a:xfrm>
                 <a:off x="9959923" y="1481146"/>
-                <a:ext cx="1016337" cy="400110"/>
+                <a:ext cx="1016337" cy="417358"/>
               </a:xfrm>
               <a:prstGeom prst="rect">
                 <a:avLst/>
@@ -15203,12 +15203,24 @@
                       <m:jc m:val="centerGroup"/>
                     </m:oMathParaPr>
                     <m:oMath xmlns:m="http://schemas.openxmlformats.org/officeDocument/2006/math">
-                      <m:r>
-                        <a:rPr lang="en-US" sz="2000" b="1" i="1" smtClean="0">
-                          <a:latin typeface="Cambria Math" panose="02040503050406030204" pitchFamily="18" charset="0"/>
-                        </a:rPr>
-                        <m:t>𝒑𝒓𝒆𝒇</m:t>
-                      </m:r>
+                      <m:acc>
+                        <m:accPr>
+                          <m:chr m:val="̂"/>
+                          <m:ctrlPr>
+                            <a:rPr lang="en-US" sz="2000" b="1" i="1" smtClean="0">
+                              <a:latin typeface="Cambria Math" panose="02040503050406030204" pitchFamily="18" charset="0"/>
+                            </a:rPr>
+                          </m:ctrlPr>
+                        </m:accPr>
+                        <m:e>
+                          <m:r>
+                            <a:rPr lang="en-US" sz="2000" b="1" i="1">
+                              <a:latin typeface="Cambria Math" panose="02040503050406030204" pitchFamily="18" charset="0"/>
+                            </a:rPr>
+                            <m:t>𝒑𝒓𝒆𝒇</m:t>
+                          </m:r>
+                        </m:e>
+                      </m:acc>
                     </m:oMath>
                   </m:oMathPara>
                 </a14:m>
@@ -15217,7 +15229,7 @@
             </p:txBody>
           </p:sp>
         </mc:Choice>
-        <mc:Fallback xmlns="">
+        <mc:Fallback>
           <p:sp>
             <p:nvSpPr>
               <p:cNvPr id="173" name="Rectangle 172">
@@ -15235,7 +15247,7 @@
             <p:spPr>
               <a:xfrm>
                 <a:off x="9959923" y="1481146"/>
-                <a:ext cx="1016337" cy="400110"/>
+                <a:ext cx="1016337" cy="417358"/>
               </a:xfrm>
               <a:prstGeom prst="rect">
                 <a:avLst/>
@@ -15243,7 +15255,7 @@
               <a:blipFill>
                 <a:blip r:embed="rId29"/>
                 <a:stretch>
-                  <a:fillRect b="-13636"/>
+                  <a:fillRect t="-8824" r="-15569" b="-14706"/>
                 </a:stretch>
               </a:blipFill>
             </p:spPr>

</xml_diff>

<commit_message>
Add TODO for the manuscript
</commit_message>
<xml_diff>
--- a/report/RO-MAN/figures/ROMAN-figures.pptx
+++ b/report/RO-MAN/figures/ROMAN-figures.pptx
@@ -130,7 +130,7 @@
             <a:srgbClr val="A4A3A4"/>
           </p15:clr>
         </p15:guide>
-        <p15:guide id="3" orient="horz" pos="2136" userDrawn="1">
+        <p15:guide id="3" orient="horz" pos="2160" userDrawn="1">
           <p15:clr>
             <a:srgbClr val="A4A3A4"/>
           </p15:clr>
@@ -223,7 +223,7 @@
           <a:p>
             <a:fld id="{3F89A295-6F9E-4D51-AE54-61E02A4CE380}" type="datetimeFigureOut">
               <a:rPr lang="en-US" smtClean="0"/>
-              <a:t>3/18/2020</a:t>
+              <a:t>3/20/2020</a:t>
             </a:fld>
             <a:endParaRPr lang="en-US"/>
           </a:p>
@@ -1445,7 +1445,7 @@
           <a:p>
             <a:fld id="{F4E53FB3-0E6D-400E-94D0-294D549E0F65}" type="datetimeFigureOut">
               <a:rPr lang="en-US" smtClean="0"/>
-              <a:t>3/18/2020</a:t>
+              <a:t>3/20/2020</a:t>
             </a:fld>
             <a:endParaRPr lang="en-US"/>
           </a:p>
@@ -1643,7 +1643,7 @@
           <a:p>
             <a:fld id="{F4E53FB3-0E6D-400E-94D0-294D549E0F65}" type="datetimeFigureOut">
               <a:rPr lang="en-US" smtClean="0"/>
-              <a:t>3/18/2020</a:t>
+              <a:t>3/20/2020</a:t>
             </a:fld>
             <a:endParaRPr lang="en-US"/>
           </a:p>
@@ -1851,7 +1851,7 @@
           <a:p>
             <a:fld id="{F4E53FB3-0E6D-400E-94D0-294D549E0F65}" type="datetimeFigureOut">
               <a:rPr lang="en-US" smtClean="0"/>
-              <a:t>3/18/2020</a:t>
+              <a:t>3/20/2020</a:t>
             </a:fld>
             <a:endParaRPr lang="en-US"/>
           </a:p>
@@ -2049,7 +2049,7 @@
           <a:p>
             <a:fld id="{F4E53FB3-0E6D-400E-94D0-294D549E0F65}" type="datetimeFigureOut">
               <a:rPr lang="en-US" smtClean="0"/>
-              <a:t>3/18/2020</a:t>
+              <a:t>3/20/2020</a:t>
             </a:fld>
             <a:endParaRPr lang="en-US"/>
           </a:p>
@@ -2324,7 +2324,7 @@
           <a:p>
             <a:fld id="{F4E53FB3-0E6D-400E-94D0-294D549E0F65}" type="datetimeFigureOut">
               <a:rPr lang="en-US" smtClean="0"/>
-              <a:t>3/18/2020</a:t>
+              <a:t>3/20/2020</a:t>
             </a:fld>
             <a:endParaRPr lang="en-US"/>
           </a:p>
@@ -2589,7 +2589,7 @@
           <a:p>
             <a:fld id="{F4E53FB3-0E6D-400E-94D0-294D549E0F65}" type="datetimeFigureOut">
               <a:rPr lang="en-US" smtClean="0"/>
-              <a:t>3/18/2020</a:t>
+              <a:t>3/20/2020</a:t>
             </a:fld>
             <a:endParaRPr lang="en-US"/>
           </a:p>
@@ -3001,7 +3001,7 @@
           <a:p>
             <a:fld id="{F4E53FB3-0E6D-400E-94D0-294D549E0F65}" type="datetimeFigureOut">
               <a:rPr lang="en-US" smtClean="0"/>
-              <a:t>3/18/2020</a:t>
+              <a:t>3/20/2020</a:t>
             </a:fld>
             <a:endParaRPr lang="en-US"/>
           </a:p>
@@ -3142,7 +3142,7 @@
           <a:p>
             <a:fld id="{F4E53FB3-0E6D-400E-94D0-294D549E0F65}" type="datetimeFigureOut">
               <a:rPr lang="en-US" smtClean="0"/>
-              <a:t>3/18/2020</a:t>
+              <a:t>3/20/2020</a:t>
             </a:fld>
             <a:endParaRPr lang="en-US"/>
           </a:p>
@@ -3255,7 +3255,7 @@
           <a:p>
             <a:fld id="{F4E53FB3-0E6D-400E-94D0-294D549E0F65}" type="datetimeFigureOut">
               <a:rPr lang="en-US" smtClean="0"/>
-              <a:t>3/18/2020</a:t>
+              <a:t>3/20/2020</a:t>
             </a:fld>
             <a:endParaRPr lang="en-US"/>
           </a:p>
@@ -3566,7 +3566,7 @@
           <a:p>
             <a:fld id="{F4E53FB3-0E6D-400E-94D0-294D549E0F65}" type="datetimeFigureOut">
               <a:rPr lang="en-US" smtClean="0"/>
-              <a:t>3/18/2020</a:t>
+              <a:t>3/20/2020</a:t>
             </a:fld>
             <a:endParaRPr lang="en-US"/>
           </a:p>
@@ -3854,7 +3854,7 @@
           <a:p>
             <a:fld id="{F4E53FB3-0E6D-400E-94D0-294D549E0F65}" type="datetimeFigureOut">
               <a:rPr lang="en-US" smtClean="0"/>
-              <a:t>3/18/2020</a:t>
+              <a:t>3/20/2020</a:t>
             </a:fld>
             <a:endParaRPr lang="en-US"/>
           </a:p>
@@ -4095,7 +4095,7 @@
           <a:p>
             <a:fld id="{F4E53FB3-0E6D-400E-94D0-294D549E0F65}" type="datetimeFigureOut">
               <a:rPr lang="en-US" smtClean="0"/>
-              <a:t>3/18/2020</a:t>
+              <a:t>3/20/2020</a:t>
             </a:fld>
             <a:endParaRPr lang="en-US"/>
           </a:p>
@@ -6488,7 +6488,7 @@
         </p:nvSpPr>
         <p:spPr>
           <a:xfrm>
-            <a:off x="5886182" y="968408"/>
+            <a:off x="5886182" y="933626"/>
             <a:ext cx="731520" cy="369332"/>
           </a:xfrm>
           <a:prstGeom prst="rect">
@@ -6523,7 +6523,7 @@
         </p:nvSpPr>
         <p:spPr>
           <a:xfrm>
-            <a:off x="5886182" y="1420570"/>
+            <a:off x="5886182" y="1351006"/>
             <a:ext cx="731520" cy="369332"/>
           </a:xfrm>
           <a:prstGeom prst="rect">
@@ -6558,7 +6558,7 @@
         </p:nvSpPr>
         <p:spPr>
           <a:xfrm>
-            <a:off x="5886182" y="1872732"/>
+            <a:off x="5886182" y="1768386"/>
             <a:ext cx="731520" cy="369332"/>
           </a:xfrm>
           <a:prstGeom prst="rect">
@@ -6593,7 +6593,7 @@
         </p:nvSpPr>
         <p:spPr>
           <a:xfrm>
-            <a:off x="5886182" y="2324894"/>
+            <a:off x="5886182" y="2185766"/>
             <a:ext cx="731520" cy="369332"/>
           </a:xfrm>
           <a:prstGeom prst="rect">
@@ -6628,7 +6628,7 @@
         </p:nvSpPr>
         <p:spPr>
           <a:xfrm>
-            <a:off x="5886182" y="2777056"/>
+            <a:off x="5886182" y="2603146"/>
             <a:ext cx="731520" cy="369332"/>
           </a:xfrm>
           <a:prstGeom prst="rect">
@@ -6663,7 +6663,7 @@
         </p:nvSpPr>
         <p:spPr>
           <a:xfrm>
-            <a:off x="5886182" y="3229218"/>
+            <a:off x="5886182" y="3020526"/>
             <a:ext cx="731520" cy="369332"/>
           </a:xfrm>
           <a:prstGeom prst="rect">
@@ -6698,7 +6698,7 @@
         </p:nvSpPr>
         <p:spPr>
           <a:xfrm>
-            <a:off x="5886182" y="3681380"/>
+            <a:off x="5886182" y="3437906"/>
             <a:ext cx="731520" cy="369332"/>
           </a:xfrm>
           <a:prstGeom prst="rect">
@@ -6733,7 +6733,7 @@
         </p:nvSpPr>
         <p:spPr>
           <a:xfrm>
-            <a:off x="5886182" y="4133542"/>
+            <a:off x="5886182" y="3855286"/>
             <a:ext cx="731520" cy="369332"/>
           </a:xfrm>
           <a:prstGeom prst="rect">
@@ -6768,7 +6768,7 @@
         </p:nvSpPr>
         <p:spPr>
           <a:xfrm>
-            <a:off x="5886182" y="4585704"/>
+            <a:off x="5886182" y="4690046"/>
             <a:ext cx="731520" cy="369332"/>
           </a:xfrm>
           <a:prstGeom prst="rect">
@@ -6803,7 +6803,7 @@
         </p:nvSpPr>
         <p:spPr>
           <a:xfrm>
-            <a:off x="5886182" y="5037866"/>
+            <a:off x="5886182" y="5107426"/>
             <a:ext cx="731520" cy="369332"/>
           </a:xfrm>
           <a:prstGeom prst="rect">
@@ -6838,7 +6838,7 @@
         </p:nvSpPr>
         <p:spPr>
           <a:xfrm>
-            <a:off x="5886182" y="5490028"/>
+            <a:off x="5886182" y="5524806"/>
             <a:ext cx="731520" cy="369332"/>
           </a:xfrm>
           <a:prstGeom prst="rect">
@@ -7653,6 +7653,41 @@
           </a:p>
         </p:txBody>
       </p:sp>
+      <p:sp>
+        <p:nvSpPr>
+          <p:cNvPr id="65" name="TextBox 64">
+            <a:extLst>
+              <a:ext uri="{FF2B5EF4-FFF2-40B4-BE49-F238E27FC236}">
+                <a16:creationId xmlns:a16="http://schemas.microsoft.com/office/drawing/2014/main" id="{E6DBA21B-5E90-42AF-9115-9D63E39C3114}"/>
+              </a:ext>
+            </a:extLst>
+          </p:cNvPr>
+          <p:cNvSpPr txBox="1"/>
+          <p:nvPr/>
+        </p:nvSpPr>
+        <p:spPr>
+          <a:xfrm>
+            <a:off x="5886182" y="4272666"/>
+            <a:ext cx="731520" cy="369332"/>
+          </a:xfrm>
+          <a:prstGeom prst="rect">
+            <a:avLst/>
+          </a:prstGeom>
+          <a:noFill/>
+        </p:spPr>
+        <p:txBody>
+          <a:bodyPr wrap="square" rtlCol="0">
+            <a:spAutoFit/>
+          </a:bodyPr>
+          <a:lstStyle/>
+          <a:p>
+            <a:r>
+              <a:rPr lang="en-US" i="1" dirty="0"/>
+              <a:t>2.06</a:t>
+            </a:r>
+          </a:p>
+        </p:txBody>
+      </p:sp>
     </p:spTree>
     <p:extLst>
       <p:ext uri="{BB962C8B-B14F-4D97-AF65-F5344CB8AC3E}">
@@ -7685,10 +7720,10 @@
       </p:grpSpPr>
       <p:pic>
         <p:nvPicPr>
-          <p:cNvPr id="6" name="Picture 5">
+          <p:cNvPr id="2" name="Picture 1">
             <a:extLst>
               <a:ext uri="{FF2B5EF4-FFF2-40B4-BE49-F238E27FC236}">
-                <a16:creationId xmlns:a16="http://schemas.microsoft.com/office/drawing/2014/main" id="{89EFF932-211A-4CCE-9227-27DE43194E3C}"/>
+                <a16:creationId xmlns:a16="http://schemas.microsoft.com/office/drawing/2014/main" id="{83373A20-DE69-4C43-8E12-94A26CC305EA}"/>
               </a:ext>
             </a:extLst>
           </p:cNvPr>
@@ -7711,9 +7746,6 @@
           <a:prstGeom prst="rect">
             <a:avLst/>
           </a:prstGeom>
-          <a:solidFill>
-            <a:schemeClr val="bg1"/>
-          </a:solidFill>
         </p:spPr>
       </p:pic>
     </p:spTree>
@@ -7898,8 +7930,8 @@
           </a:fontRef>
         </p:style>
       </p:cxnSp>
-      <mc:AlternateContent xmlns:mc="http://schemas.openxmlformats.org/markup-compatibility/2006">
-        <mc:Choice xmlns:a14="http://schemas.microsoft.com/office/drawing/2010/main" Requires="a14">
+      <mc:AlternateContent xmlns:mc="http://schemas.openxmlformats.org/markup-compatibility/2006" xmlns:a14="http://schemas.microsoft.com/office/drawing/2010/main">
+        <mc:Choice Requires="a14">
           <p:sp>
             <p:nvSpPr>
               <p:cNvPr id="2" name="Rectangle 1">
@@ -7993,7 +8025,7 @@
             </p:txBody>
           </p:sp>
         </mc:Choice>
-        <mc:Fallback>
+        <mc:Fallback xmlns="">
           <p:sp>
             <p:nvSpPr>
               <p:cNvPr id="2" name="Rectangle 1">
@@ -8041,8 +8073,8 @@
           </p:sp>
         </mc:Fallback>
       </mc:AlternateContent>
-      <mc:AlternateContent xmlns:mc="http://schemas.openxmlformats.org/markup-compatibility/2006">
-        <mc:Choice xmlns:a14="http://schemas.microsoft.com/office/drawing/2010/main" Requires="a14">
+      <mc:AlternateContent xmlns:mc="http://schemas.openxmlformats.org/markup-compatibility/2006" xmlns:a14="http://schemas.microsoft.com/office/drawing/2010/main">
+        <mc:Choice Requires="a14">
           <p:sp>
             <p:nvSpPr>
               <p:cNvPr id="3" name="Oval 2">
@@ -8152,7 +8184,7 @@
             </p:txBody>
           </p:sp>
         </mc:Choice>
-        <mc:Fallback>
+        <mc:Fallback xmlns="">
           <p:sp>
             <p:nvSpPr>
               <p:cNvPr id="3" name="Oval 2">
@@ -8200,8 +8232,8 @@
           </p:sp>
         </mc:Fallback>
       </mc:AlternateContent>
-      <mc:AlternateContent xmlns:mc="http://schemas.openxmlformats.org/markup-compatibility/2006">
-        <mc:Choice xmlns:a14="http://schemas.microsoft.com/office/drawing/2010/main" Requires="a14">
+      <mc:AlternateContent xmlns:mc="http://schemas.openxmlformats.org/markup-compatibility/2006" xmlns:a14="http://schemas.microsoft.com/office/drawing/2010/main">
+        <mc:Choice Requires="a14">
           <p:sp>
             <p:nvSpPr>
               <p:cNvPr id="5" name="Oval 4">
@@ -8311,7 +8343,7 @@
             </p:txBody>
           </p:sp>
         </mc:Choice>
-        <mc:Fallback>
+        <mc:Fallback xmlns="">
           <p:sp>
             <p:nvSpPr>
               <p:cNvPr id="5" name="Oval 4">
@@ -8359,8 +8391,8 @@
           </p:sp>
         </mc:Fallback>
       </mc:AlternateContent>
-      <mc:AlternateContent xmlns:mc="http://schemas.openxmlformats.org/markup-compatibility/2006">
-        <mc:Choice xmlns:a14="http://schemas.microsoft.com/office/drawing/2010/main" Requires="a14">
+      <mc:AlternateContent xmlns:mc="http://schemas.openxmlformats.org/markup-compatibility/2006" xmlns:a14="http://schemas.microsoft.com/office/drawing/2010/main">
+        <mc:Choice Requires="a14">
           <p:sp>
             <p:nvSpPr>
               <p:cNvPr id="6" name="Oval 5">
@@ -8470,7 +8502,7 @@
             </p:txBody>
           </p:sp>
         </mc:Choice>
-        <mc:Fallback>
+        <mc:Fallback xmlns="">
           <p:sp>
             <p:nvSpPr>
               <p:cNvPr id="6" name="Oval 5">
@@ -8518,8 +8550,8 @@
           </p:sp>
         </mc:Fallback>
       </mc:AlternateContent>
-      <mc:AlternateContent xmlns:mc="http://schemas.openxmlformats.org/markup-compatibility/2006">
-        <mc:Choice xmlns:a14="http://schemas.microsoft.com/office/drawing/2010/main" Requires="a14">
+      <mc:AlternateContent xmlns:mc="http://schemas.openxmlformats.org/markup-compatibility/2006" xmlns:a14="http://schemas.microsoft.com/office/drawing/2010/main">
+        <mc:Choice Requires="a14">
           <p:sp>
             <p:nvSpPr>
               <p:cNvPr id="7" name="Oval 6">
@@ -8629,7 +8661,7 @@
             </p:txBody>
           </p:sp>
         </mc:Choice>
-        <mc:Fallback>
+        <mc:Fallback xmlns="">
           <p:sp>
             <p:nvSpPr>
               <p:cNvPr id="7" name="Oval 6">
@@ -8677,8 +8709,8 @@
           </p:sp>
         </mc:Fallback>
       </mc:AlternateContent>
-      <mc:AlternateContent xmlns:mc="http://schemas.openxmlformats.org/markup-compatibility/2006">
-        <mc:Choice xmlns:a14="http://schemas.microsoft.com/office/drawing/2010/main" Requires="a14">
+      <mc:AlternateContent xmlns:mc="http://schemas.openxmlformats.org/markup-compatibility/2006" xmlns:a14="http://schemas.microsoft.com/office/drawing/2010/main">
+        <mc:Choice Requires="a14">
           <p:graphicFrame>
             <p:nvGraphicFramePr>
               <p:cNvPr id="14" name="Table 14">
@@ -9619,7 +9651,7 @@
             </a:graphic>
           </p:graphicFrame>
         </mc:Choice>
-        <mc:Fallback>
+        <mc:Fallback xmlns="">
           <p:graphicFrame>
             <p:nvGraphicFramePr>
               <p:cNvPr id="14" name="Table 14">

</xml_diff>

<commit_message>
Add presentation slides for ROMAN 2020
</commit_message>
<xml_diff>
--- a/report/RO-MAN/figures/ROMAN-figures.pptx
+++ b/report/RO-MAN/figures/ROMAN-figures.pptx
@@ -231,7 +231,7 @@
           <a:p>
             <a:fld id="{3F89A295-6F9E-4D51-AE54-61E02A4CE380}" type="datetimeFigureOut">
               <a:rPr lang="en-US" smtClean="0"/>
-              <a:t>4/12/2020</a:t>
+              <a:t>8/10/20</a:t>
             </a:fld>
             <a:endParaRPr lang="en-US"/>
           </a:p>
@@ -1873,7 +1873,7 @@
           <a:p>
             <a:fld id="{F4E53FB3-0E6D-400E-94D0-294D549E0F65}" type="datetimeFigureOut">
               <a:rPr lang="en-US" smtClean="0"/>
-              <a:t>4/12/2020</a:t>
+              <a:t>8/10/20</a:t>
             </a:fld>
             <a:endParaRPr lang="en-US"/>
           </a:p>
@@ -2071,7 +2071,7 @@
           <a:p>
             <a:fld id="{F4E53FB3-0E6D-400E-94D0-294D549E0F65}" type="datetimeFigureOut">
               <a:rPr lang="en-US" smtClean="0"/>
-              <a:t>4/12/2020</a:t>
+              <a:t>8/10/20</a:t>
             </a:fld>
             <a:endParaRPr lang="en-US"/>
           </a:p>
@@ -2279,7 +2279,7 @@
           <a:p>
             <a:fld id="{F4E53FB3-0E6D-400E-94D0-294D549E0F65}" type="datetimeFigureOut">
               <a:rPr lang="en-US" smtClean="0"/>
-              <a:t>4/12/2020</a:t>
+              <a:t>8/10/20</a:t>
             </a:fld>
             <a:endParaRPr lang="en-US"/>
           </a:p>
@@ -2477,7 +2477,7 @@
           <a:p>
             <a:fld id="{F4E53FB3-0E6D-400E-94D0-294D549E0F65}" type="datetimeFigureOut">
               <a:rPr lang="en-US" smtClean="0"/>
-              <a:t>4/12/2020</a:t>
+              <a:t>8/10/20</a:t>
             </a:fld>
             <a:endParaRPr lang="en-US"/>
           </a:p>
@@ -2752,7 +2752,7 @@
           <a:p>
             <a:fld id="{F4E53FB3-0E6D-400E-94D0-294D549E0F65}" type="datetimeFigureOut">
               <a:rPr lang="en-US" smtClean="0"/>
-              <a:t>4/12/2020</a:t>
+              <a:t>8/10/20</a:t>
             </a:fld>
             <a:endParaRPr lang="en-US"/>
           </a:p>
@@ -3017,7 +3017,7 @@
           <a:p>
             <a:fld id="{F4E53FB3-0E6D-400E-94D0-294D549E0F65}" type="datetimeFigureOut">
               <a:rPr lang="en-US" smtClean="0"/>
-              <a:t>4/12/2020</a:t>
+              <a:t>8/10/20</a:t>
             </a:fld>
             <a:endParaRPr lang="en-US"/>
           </a:p>
@@ -3429,7 +3429,7 @@
           <a:p>
             <a:fld id="{F4E53FB3-0E6D-400E-94D0-294D549E0F65}" type="datetimeFigureOut">
               <a:rPr lang="en-US" smtClean="0"/>
-              <a:t>4/12/2020</a:t>
+              <a:t>8/10/20</a:t>
             </a:fld>
             <a:endParaRPr lang="en-US"/>
           </a:p>
@@ -3570,7 +3570,7 @@
           <a:p>
             <a:fld id="{F4E53FB3-0E6D-400E-94D0-294D549E0F65}" type="datetimeFigureOut">
               <a:rPr lang="en-US" smtClean="0"/>
-              <a:t>4/12/2020</a:t>
+              <a:t>8/10/20</a:t>
             </a:fld>
             <a:endParaRPr lang="en-US"/>
           </a:p>
@@ -3683,7 +3683,7 @@
           <a:p>
             <a:fld id="{F4E53FB3-0E6D-400E-94D0-294D549E0F65}" type="datetimeFigureOut">
               <a:rPr lang="en-US" smtClean="0"/>
-              <a:t>4/12/2020</a:t>
+              <a:t>8/10/20</a:t>
             </a:fld>
             <a:endParaRPr lang="en-US"/>
           </a:p>
@@ -3994,7 +3994,7 @@
           <a:p>
             <a:fld id="{F4E53FB3-0E6D-400E-94D0-294D549E0F65}" type="datetimeFigureOut">
               <a:rPr lang="en-US" smtClean="0"/>
-              <a:t>4/12/2020</a:t>
+              <a:t>8/10/20</a:t>
             </a:fld>
             <a:endParaRPr lang="en-US"/>
           </a:p>
@@ -4282,7 +4282,7 @@
           <a:p>
             <a:fld id="{F4E53FB3-0E6D-400E-94D0-294D549E0F65}" type="datetimeFigureOut">
               <a:rPr lang="en-US" smtClean="0"/>
-              <a:t>4/12/2020</a:t>
+              <a:t>8/10/20</a:t>
             </a:fld>
             <a:endParaRPr lang="en-US"/>
           </a:p>
@@ -4523,7 +4523,7 @@
           <a:p>
             <a:fld id="{F4E53FB3-0E6D-400E-94D0-294D549E0F65}" type="datetimeFigureOut">
               <a:rPr lang="en-US" smtClean="0"/>
-              <a:t>4/12/2020</a:t>
+              <a:t>8/10/20</a:t>
             </a:fld>
             <a:endParaRPr lang="en-US"/>
           </a:p>
@@ -7330,8 +7330,8 @@
           </a:p>
         </p:txBody>
       </p:sp>
-      <mc:AlternateContent xmlns:mc="http://schemas.openxmlformats.org/markup-compatibility/2006">
-        <mc:Choice xmlns:a14="http://schemas.microsoft.com/office/drawing/2010/main" Requires="a14">
+      <mc:AlternateContent xmlns:mc="http://schemas.openxmlformats.org/markup-compatibility/2006" xmlns:a14="http://schemas.microsoft.com/office/drawing/2010/main">
+        <mc:Choice Requires="a14">
           <p:sp>
             <p:nvSpPr>
               <p:cNvPr id="198" name="Rectangle 197">
@@ -7396,7 +7396,7 @@
             </p:txBody>
           </p:sp>
         </mc:Choice>
-        <mc:Fallback>
+        <mc:Fallback xmlns="">
           <p:sp>
             <p:nvSpPr>
               <p:cNvPr id="198" name="Rectangle 197">
@@ -7575,8 +7575,8 @@
           </a:p>
         </p:txBody>
       </p:sp>
-      <mc:AlternateContent xmlns:mc="http://schemas.openxmlformats.org/markup-compatibility/2006">
-        <mc:Choice xmlns:a14="http://schemas.microsoft.com/office/drawing/2010/main" Requires="a14">
+      <mc:AlternateContent xmlns:mc="http://schemas.openxmlformats.org/markup-compatibility/2006" xmlns:a14="http://schemas.microsoft.com/office/drawing/2010/main">
+        <mc:Choice Requires="a14">
           <p:sp>
             <p:nvSpPr>
               <p:cNvPr id="242" name="Oval 241">
@@ -7706,7 +7706,7 @@
             </p:txBody>
           </p:sp>
         </mc:Choice>
-        <mc:Fallback>
+        <mc:Fallback xmlns="">
           <p:sp>
             <p:nvSpPr>
               <p:cNvPr id="242" name="Oval 241">
@@ -8646,8 +8646,8 @@
           </a:fontRef>
         </p:style>
       </p:cxnSp>
-      <mc:AlternateContent xmlns:mc="http://schemas.openxmlformats.org/markup-compatibility/2006">
-        <mc:Choice xmlns:a14="http://schemas.microsoft.com/office/drawing/2010/main" Requires="a14">
+      <mc:AlternateContent xmlns:mc="http://schemas.openxmlformats.org/markup-compatibility/2006" xmlns:a14="http://schemas.microsoft.com/office/drawing/2010/main">
+        <mc:Choice Requires="a14">
           <p:sp>
             <p:nvSpPr>
               <p:cNvPr id="269" name="Rectangle 268">
@@ -8735,7 +8735,7 @@
             </p:txBody>
           </p:sp>
         </mc:Choice>
-        <mc:Fallback>
+        <mc:Fallback xmlns="">
           <p:sp>
             <p:nvSpPr>
               <p:cNvPr id="269" name="Rectangle 268">
@@ -19827,7 +19827,7 @@
                 <p:spPr>
                   <a:xfrm>
                     <a:off x="3980162" y="3189162"/>
-                    <a:ext cx="1190552" cy="430887"/>
+                    <a:ext cx="1190552" cy="382209"/>
                   </a:xfrm>
                   <a:prstGeom prst="rect">
                     <a:avLst/>
@@ -19848,12 +19848,12 @@
                       </a:tabLst>
                     </a:pPr>
                     <a:r>
-                      <a:rPr kumimoji="1" lang="zh-CN" altLang="en-US" sz="2200" dirty="0">
+                      <a:rPr kumimoji="1" lang="en-US" altLang="zh-TW" sz="2200" dirty="0">
                         <a:solidFill>
                           <a:srgbClr val="FF3AA6"/>
                         </a:solidFill>
                       </a:rPr>
-                      <a:t>小明</a:t>
+                      <a:t>Anne</a:t>
                     </a:r>
                     <a:r>
                       <a:rPr kumimoji="1" lang="en-US" altLang="zh-CN" sz="2200" dirty="0">
@@ -19886,7 +19886,7 @@
                 <p:spPr>
                   <a:xfrm>
                     <a:off x="3969276" y="3670851"/>
-                    <a:ext cx="1277638" cy="430887"/>
+                    <a:ext cx="1277638" cy="382209"/>
                   </a:xfrm>
                   <a:prstGeom prst="rect">
                     <a:avLst/>
@@ -19907,7 +19907,7 @@
                       </a:tabLst>
                     </a:pPr>
                     <a:r>
-                      <a:rPr kumimoji="1" lang="zh-CN" altLang="en-US" sz="2200" dirty="0">
+                      <a:rPr kumimoji="1" lang="en-US" altLang="zh-TW" sz="2200" dirty="0">
                         <a:solidFill>
                           <a:schemeClr val="accent4">
                             <a:lumMod val="60000"/>
@@ -19915,7 +19915,7 @@
                           </a:schemeClr>
                         </a:solidFill>
                       </a:rPr>
-                      <a:t>小美</a:t>
+                      <a:t>Ben</a:t>
                     </a:r>
                     <a:r>
                       <a:rPr kumimoji="1" lang="en-US" altLang="zh-CN" sz="2200" dirty="0">
@@ -19954,7 +19954,7 @@
                 <p:spPr>
                   <a:xfrm>
                     <a:off x="3980162" y="4165996"/>
-                    <a:ext cx="1190552" cy="430887"/>
+                    <a:ext cx="1190552" cy="382209"/>
                   </a:xfrm>
                   <a:prstGeom prst="rect">
                     <a:avLst/>
@@ -19975,14 +19975,14 @@
                       </a:tabLst>
                     </a:pPr>
                     <a:r>
-                      <a:rPr kumimoji="1" lang="zh-CN" altLang="en-US" sz="2200" dirty="0">
+                      <a:rPr kumimoji="1" lang="en-US" altLang="zh-TW" sz="2200" dirty="0">
                         <a:solidFill>
                           <a:schemeClr val="accent2">
                             <a:lumMod val="75000"/>
                           </a:schemeClr>
                         </a:solidFill>
                       </a:rPr>
-                      <a:t>小熊</a:t>
+                      <a:t>Matt</a:t>
                     </a:r>
                     <a:r>
                       <a:rPr kumimoji="1" lang="en-US" altLang="zh-CN" sz="2200" dirty="0">
@@ -20019,7 +20019,7 @@
                 <p:spPr>
                   <a:xfrm>
                     <a:off x="3969276" y="4723648"/>
-                    <a:ext cx="1201438" cy="430887"/>
+                    <a:ext cx="1201438" cy="382209"/>
                   </a:xfrm>
                   <a:prstGeom prst="rect">
                     <a:avLst/>
@@ -20040,7 +20040,7 @@
                       </a:tabLst>
                     </a:pPr>
                     <a:r>
-                      <a:rPr kumimoji="1" lang="zh-CN" altLang="en-US" sz="2200" dirty="0">
+                      <a:rPr kumimoji="1" lang="en-US" altLang="zh-TW" sz="2200" dirty="0">
                         <a:solidFill>
                           <a:schemeClr val="accent6">
                             <a:lumMod val="60000"/>
@@ -20048,7 +20048,7 @@
                           </a:schemeClr>
                         </a:solidFill>
                       </a:rPr>
-                      <a:t>小樹</a:t>
+                      <a:t>Amy</a:t>
                     </a:r>
                     <a:r>
                       <a:rPr kumimoji="1" lang="en-US" altLang="zh-CN" sz="2200" dirty="0">
@@ -20462,8 +20462,12 @@
           </a:p>
           <a:p>
             <a:r>
+              <a:rPr kumimoji="1" lang="en-US" altLang="zh-TW" sz="4000"/>
+              <a:t>which person </a:t>
+            </a:r>
+            <a:r>
               <a:rPr kumimoji="1" lang="en-US" altLang="zh-TW" sz="4000" dirty="0"/>
-              <a:t>which target do you want to reach?”</a:t>
+              <a:t>do you want to reach?”</a:t>
             </a:r>
             <a:endParaRPr kumimoji="1" lang="zh-TW" altLang="en-US" sz="4000" dirty="0"/>
           </a:p>

</xml_diff>